<commit_message>
ckessler new edits to powerpoint
</commit_message>
<xml_diff>
--- a/The Cost Benefit Analysis of Obtaining Postsecondary Eduction.pptx
+++ b/The Cost Benefit Analysis of Obtaining Postsecondary Eduction.pptx
@@ -6,13 +6,15 @@
   </p:sldMasterIdLst>
   <p:sldIdLst>
     <p:sldId id="256" r:id="rId2"/>
-    <p:sldId id="257" r:id="rId3"/>
-    <p:sldId id="260" r:id="rId4"/>
-    <p:sldId id="258" r:id="rId5"/>
-    <p:sldId id="259" r:id="rId6"/>
-    <p:sldId id="261" r:id="rId7"/>
-    <p:sldId id="262" r:id="rId8"/>
+    <p:sldId id="267" r:id="rId3"/>
+    <p:sldId id="257" r:id="rId4"/>
+    <p:sldId id="259" r:id="rId5"/>
+    <p:sldId id="268" r:id="rId6"/>
+    <p:sldId id="265" r:id="rId7"/>
+    <p:sldId id="266" r:id="rId8"/>
     <p:sldId id="263" r:id="rId9"/>
+    <p:sldId id="264" r:id="rId10"/>
+    <p:sldId id="258" r:id="rId11"/>
   </p:sldIdLst>
   <p:sldSz cx="12192000" cy="6858000"/>
   <p:notesSz cx="6858000" cy="9144000"/>
@@ -119,194 +121,24 @@
 </p:presentation>
 </file>
 
+<file path=ppt/commentAuthors.xml><?xml version="1.0" encoding="utf-8"?>
+<p:cmAuthorLst xmlns:a="http://schemas.openxmlformats.org/drawingml/2006/main" xmlns:r="http://schemas.openxmlformats.org/officeDocument/2006/relationships" xmlns:p="http://schemas.openxmlformats.org/presentationml/2006/main">
+  <p:cmAuthor id="1" name="Je Black" initials="JB" lastIdx="1" clrIdx="0">
+    <p:extLst>
+      <p:ext uri="{19B8F6BF-5375-455C-9EA6-DF929625EA0E}">
+        <p15:presenceInfo xmlns:p15="http://schemas.microsoft.com/office/powerpoint/2012/main" userId="04a79c57e8958fbf" providerId="Windows Live"/>
+      </p:ext>
+    </p:extLst>
+  </p:cmAuthor>
+</p:cmAuthorLst>
+</file>
+
 <file path=ppt/revisionInfo.xml><?xml version="1.0" encoding="utf-8"?>
 <p1510:revInfo xmlns:a="http://schemas.openxmlformats.org/drawingml/2006/main" xmlns:r="http://schemas.openxmlformats.org/officeDocument/2006/relationships" xmlns:p1510="http://schemas.microsoft.com/office/powerpoint/2015/10/main">
   <p1510:revLst>
-    <p1510:client id="{5D6B19F2-E6FC-4D7E-854F-F1578481618C}" v="15" dt="2020-04-09T00:18:20.571"/>
+    <p1510:client id="{38AE765C-4FE4-4D75-8C7A-84FC62D9CAD0}" v="2" dt="2020-04-10T16:42:46.067"/>
   </p1510:revLst>
 </p1510:revInfo>
-</file>
-
-<file path=ppt/changesInfos/changesInfo1.xml><?xml version="1.0" encoding="utf-8"?>
-<pc:chgInfo xmlns:a="http://schemas.openxmlformats.org/drawingml/2006/main" xmlns:r="http://schemas.openxmlformats.org/officeDocument/2006/relationships" xmlns:ac="http://schemas.microsoft.com/office/drawing/2013/main/command" xmlns:pc="http://schemas.microsoft.com/office/powerpoint/2013/main/command">
-  <pc:docChgLst>
-    <pc:chgData name="C K" userId="7af9c94c150dfcbf" providerId="LiveId" clId="{5D6B19F2-E6FC-4D7E-854F-F1578481618C}"/>
-    <pc:docChg chg="custSel addSld modSld">
-      <pc:chgData name="C K" userId="7af9c94c150dfcbf" providerId="LiveId" clId="{5D6B19F2-E6FC-4D7E-854F-F1578481618C}" dt="2020-04-10T03:50:59.817" v="3502" actId="27636"/>
-      <pc:docMkLst>
-        <pc:docMk/>
-      </pc:docMkLst>
-      <pc:sldChg chg="modSp">
-        <pc:chgData name="C K" userId="7af9c94c150dfcbf" providerId="LiveId" clId="{5D6B19F2-E6FC-4D7E-854F-F1578481618C}" dt="2020-04-09T01:11:23.440" v="3324" actId="20577"/>
-        <pc:sldMkLst>
-          <pc:docMk/>
-          <pc:sldMk cId="1084433470" sldId="256"/>
-        </pc:sldMkLst>
-        <pc:spChg chg="mod">
-          <ac:chgData name="C K" userId="7af9c94c150dfcbf" providerId="LiveId" clId="{5D6B19F2-E6FC-4D7E-854F-F1578481618C}" dt="2020-04-09T01:11:23.440" v="3324" actId="20577"/>
-          <ac:spMkLst>
-            <pc:docMk/>
-            <pc:sldMk cId="1084433470" sldId="256"/>
-            <ac:spMk id="2" creationId="{518939E2-5ED7-4B4F-B457-2E9407F8D1A0}"/>
-          </ac:spMkLst>
-        </pc:spChg>
-      </pc:sldChg>
-      <pc:sldChg chg="modSp add">
-        <pc:chgData name="C K" userId="7af9c94c150dfcbf" providerId="LiveId" clId="{5D6B19F2-E6FC-4D7E-854F-F1578481618C}" dt="2020-04-10T03:02:28.085" v="3500" actId="20577"/>
-        <pc:sldMkLst>
-          <pc:docMk/>
-          <pc:sldMk cId="3976791779" sldId="257"/>
-        </pc:sldMkLst>
-        <pc:spChg chg="mod">
-          <ac:chgData name="C K" userId="7af9c94c150dfcbf" providerId="LiveId" clId="{5D6B19F2-E6FC-4D7E-854F-F1578481618C}" dt="2020-04-08T22:51:39.344" v="28" actId="20577"/>
-          <ac:spMkLst>
-            <pc:docMk/>
-            <pc:sldMk cId="3976791779" sldId="257"/>
-            <ac:spMk id="2" creationId="{7F69E59C-1FB1-4D6F-B5E8-94563E0DB5AD}"/>
-          </ac:spMkLst>
-        </pc:spChg>
-        <pc:spChg chg="mod">
-          <ac:chgData name="C K" userId="7af9c94c150dfcbf" providerId="LiveId" clId="{5D6B19F2-E6FC-4D7E-854F-F1578481618C}" dt="2020-04-10T03:02:28.085" v="3500" actId="20577"/>
-          <ac:spMkLst>
-            <pc:docMk/>
-            <pc:sldMk cId="3976791779" sldId="257"/>
-            <ac:spMk id="3" creationId="{2A6319EF-6730-4ED6-B49D-AC3C7B7ECBCA}"/>
-          </ac:spMkLst>
-        </pc:spChg>
-      </pc:sldChg>
-      <pc:sldChg chg="modSp add">
-        <pc:chgData name="C K" userId="7af9c94c150dfcbf" providerId="LiveId" clId="{5D6B19F2-E6FC-4D7E-854F-F1578481618C}" dt="2020-04-10T03:50:59.817" v="3502" actId="27636"/>
-        <pc:sldMkLst>
-          <pc:docMk/>
-          <pc:sldMk cId="1092047461" sldId="258"/>
-        </pc:sldMkLst>
-        <pc:spChg chg="mod">
-          <ac:chgData name="C K" userId="7af9c94c150dfcbf" providerId="LiveId" clId="{5D6B19F2-E6FC-4D7E-854F-F1578481618C}" dt="2020-04-08T23:47:12.805" v="807" actId="20577"/>
-          <ac:spMkLst>
-            <pc:docMk/>
-            <pc:sldMk cId="1092047461" sldId="258"/>
-            <ac:spMk id="2" creationId="{29435016-57F1-4285-BB0B-B7C58E03138C}"/>
-          </ac:spMkLst>
-        </pc:spChg>
-        <pc:spChg chg="mod">
-          <ac:chgData name="C K" userId="7af9c94c150dfcbf" providerId="LiveId" clId="{5D6B19F2-E6FC-4D7E-854F-F1578481618C}" dt="2020-04-10T03:50:59.817" v="3502" actId="27636"/>
-          <ac:spMkLst>
-            <pc:docMk/>
-            <pc:sldMk cId="1092047461" sldId="258"/>
-            <ac:spMk id="3" creationId="{6135DCA6-026A-4543-88BE-0722DE6917F9}"/>
-          </ac:spMkLst>
-        </pc:spChg>
-      </pc:sldChg>
-      <pc:sldChg chg="modSp add">
-        <pc:chgData name="C K" userId="7af9c94c150dfcbf" providerId="LiveId" clId="{5D6B19F2-E6FC-4D7E-854F-F1578481618C}" dt="2020-04-09T00:03:48.859" v="1795" actId="20577"/>
-        <pc:sldMkLst>
-          <pc:docMk/>
-          <pc:sldMk cId="458413207" sldId="259"/>
-        </pc:sldMkLst>
-        <pc:spChg chg="mod">
-          <ac:chgData name="C K" userId="7af9c94c150dfcbf" providerId="LiveId" clId="{5D6B19F2-E6FC-4D7E-854F-F1578481618C}" dt="2020-04-09T00:00:35.796" v="1209" actId="20577"/>
-          <ac:spMkLst>
-            <pc:docMk/>
-            <pc:sldMk cId="458413207" sldId="259"/>
-            <ac:spMk id="2" creationId="{399739D6-8CE3-4F3E-954D-C7A182B0FF16}"/>
-          </ac:spMkLst>
-        </pc:spChg>
-        <pc:spChg chg="mod">
-          <ac:chgData name="C K" userId="7af9c94c150dfcbf" providerId="LiveId" clId="{5D6B19F2-E6FC-4D7E-854F-F1578481618C}" dt="2020-04-09T00:03:48.859" v="1795" actId="20577"/>
-          <ac:spMkLst>
-            <pc:docMk/>
-            <pc:sldMk cId="458413207" sldId="259"/>
-            <ac:spMk id="3" creationId="{9A02F5CA-7E1D-471C-A889-9105F6332308}"/>
-          </ac:spMkLst>
-        </pc:spChg>
-      </pc:sldChg>
-      <pc:sldChg chg="modSp add">
-        <pc:chgData name="C K" userId="7af9c94c150dfcbf" providerId="LiveId" clId="{5D6B19F2-E6FC-4D7E-854F-F1578481618C}" dt="2020-04-09T00:26:07.403" v="3048" actId="20577"/>
-        <pc:sldMkLst>
-          <pc:docMk/>
-          <pc:sldMk cId="3481018803" sldId="260"/>
-        </pc:sldMkLst>
-        <pc:spChg chg="mod">
-          <ac:chgData name="C K" userId="7af9c94c150dfcbf" providerId="LiveId" clId="{5D6B19F2-E6FC-4D7E-854F-F1578481618C}" dt="2020-04-09T00:13:50.697" v="2495" actId="20577"/>
-          <ac:spMkLst>
-            <pc:docMk/>
-            <pc:sldMk cId="3481018803" sldId="260"/>
-            <ac:spMk id="2" creationId="{5C01BE12-11D0-4E11-A8AE-1E1F2E1625B8}"/>
-          </ac:spMkLst>
-        </pc:spChg>
-        <pc:spChg chg="mod">
-          <ac:chgData name="C K" userId="7af9c94c150dfcbf" providerId="LiveId" clId="{5D6B19F2-E6FC-4D7E-854F-F1578481618C}" dt="2020-04-09T00:26:07.403" v="3048" actId="20577"/>
-          <ac:spMkLst>
-            <pc:docMk/>
-            <pc:sldMk cId="3481018803" sldId="260"/>
-            <ac:spMk id="3" creationId="{A9103996-2A62-44B9-B61A-DD743CF51587}"/>
-          </ac:spMkLst>
-        </pc:spChg>
-      </pc:sldChg>
-      <pc:sldChg chg="modSp add">
-        <pc:chgData name="C K" userId="7af9c94c150dfcbf" providerId="LiveId" clId="{5D6B19F2-E6FC-4D7E-854F-F1578481618C}" dt="2020-04-09T00:26:34.941" v="3107" actId="20577"/>
-        <pc:sldMkLst>
-          <pc:docMk/>
-          <pc:sldMk cId="3838206852" sldId="261"/>
-        </pc:sldMkLst>
-        <pc:spChg chg="mod">
-          <ac:chgData name="C K" userId="7af9c94c150dfcbf" providerId="LiveId" clId="{5D6B19F2-E6FC-4D7E-854F-F1578481618C}" dt="2020-04-09T00:09:45.892" v="1923" actId="20577"/>
-          <ac:spMkLst>
-            <pc:docMk/>
-            <pc:sldMk cId="3838206852" sldId="261"/>
-            <ac:spMk id="2" creationId="{25FCE990-6391-4ED0-AA3E-F60033CDC1F6}"/>
-          </ac:spMkLst>
-        </pc:spChg>
-        <pc:spChg chg="mod">
-          <ac:chgData name="C K" userId="7af9c94c150dfcbf" providerId="LiveId" clId="{5D6B19F2-E6FC-4D7E-854F-F1578481618C}" dt="2020-04-09T00:26:34.941" v="3107" actId="20577"/>
-          <ac:spMkLst>
-            <pc:docMk/>
-            <pc:sldMk cId="3838206852" sldId="261"/>
-            <ac:spMk id="3" creationId="{2DA9D7A0-008E-4687-BEF4-59BB76315294}"/>
-          </ac:spMkLst>
-        </pc:spChg>
-      </pc:sldChg>
-      <pc:sldChg chg="modSp add">
-        <pc:chgData name="C K" userId="7af9c94c150dfcbf" providerId="LiveId" clId="{5D6B19F2-E6FC-4D7E-854F-F1578481618C}" dt="2020-04-09T00:26:45.360" v="3108" actId="20577"/>
-        <pc:sldMkLst>
-          <pc:docMk/>
-          <pc:sldMk cId="1024695393" sldId="262"/>
-        </pc:sldMkLst>
-        <pc:spChg chg="mod">
-          <ac:chgData name="C K" userId="7af9c94c150dfcbf" providerId="LiveId" clId="{5D6B19F2-E6FC-4D7E-854F-F1578481618C}" dt="2020-04-09T00:16:08.180" v="2773" actId="20577"/>
-          <ac:spMkLst>
-            <pc:docMk/>
-            <pc:sldMk cId="1024695393" sldId="262"/>
-            <ac:spMk id="2" creationId="{EAF6C44D-BC17-40A4-9FDC-253B8A47ACF4}"/>
-          </ac:spMkLst>
-        </pc:spChg>
-        <pc:spChg chg="mod">
-          <ac:chgData name="C K" userId="7af9c94c150dfcbf" providerId="LiveId" clId="{5D6B19F2-E6FC-4D7E-854F-F1578481618C}" dt="2020-04-09T00:26:45.360" v="3108" actId="20577"/>
-          <ac:spMkLst>
-            <pc:docMk/>
-            <pc:sldMk cId="1024695393" sldId="262"/>
-            <ac:spMk id="3" creationId="{1844F5F8-01AC-4FBD-BCEC-CF00FA1459B7}"/>
-          </ac:spMkLst>
-        </pc:spChg>
-      </pc:sldChg>
-      <pc:sldChg chg="modSp add">
-        <pc:chgData name="C K" userId="7af9c94c150dfcbf" providerId="LiveId" clId="{5D6B19F2-E6FC-4D7E-854F-F1578481618C}" dt="2020-04-09T00:17:47.958" v="2901" actId="14100"/>
-        <pc:sldMkLst>
-          <pc:docMk/>
-          <pc:sldMk cId="3965359202" sldId="263"/>
-        </pc:sldMkLst>
-        <pc:spChg chg="mod">
-          <ac:chgData name="C K" userId="7af9c94c150dfcbf" providerId="LiveId" clId="{5D6B19F2-E6FC-4D7E-854F-F1578481618C}" dt="2020-04-09T00:17:47.958" v="2901" actId="14100"/>
-          <ac:spMkLst>
-            <pc:docMk/>
-            <pc:sldMk cId="3965359202" sldId="263"/>
-            <ac:spMk id="2" creationId="{0858D08D-A084-4AE2-89DA-D1FCA795959A}"/>
-          </ac:spMkLst>
-        </pc:spChg>
-      </pc:sldChg>
-    </pc:docChg>
-  </pc:docChgLst>
-</pc:chgInfo>
 </file>
 
 <file path=ppt/slideLayouts/slideLayout1.xml><?xml version="1.0" encoding="utf-8"?>
@@ -456,7 +288,7 @@
           <a:p>
             <a:fld id="{7CA5828A-255D-400E-8883-13442DBF8143}" type="datetimeFigureOut">
               <a:rPr lang="en-US" smtClean="0"/>
-              <a:t>4/9/2020</a:t>
+              <a:t>4/10/2020</a:t>
             </a:fld>
             <a:endParaRPr lang="en-US"/>
           </a:p>
@@ -654,7 +486,7 @@
           <a:p>
             <a:fld id="{7CA5828A-255D-400E-8883-13442DBF8143}" type="datetimeFigureOut">
               <a:rPr lang="en-US" smtClean="0"/>
-              <a:t>4/9/2020</a:t>
+              <a:t>4/10/2020</a:t>
             </a:fld>
             <a:endParaRPr lang="en-US"/>
           </a:p>
@@ -862,7 +694,7 @@
           <a:p>
             <a:fld id="{7CA5828A-255D-400E-8883-13442DBF8143}" type="datetimeFigureOut">
               <a:rPr lang="en-US" smtClean="0"/>
-              <a:t>4/9/2020</a:t>
+              <a:t>4/10/2020</a:t>
             </a:fld>
             <a:endParaRPr lang="en-US"/>
           </a:p>
@@ -1060,7 +892,7 @@
           <a:p>
             <a:fld id="{7CA5828A-255D-400E-8883-13442DBF8143}" type="datetimeFigureOut">
               <a:rPr lang="en-US" smtClean="0"/>
-              <a:t>4/9/2020</a:t>
+              <a:t>4/10/2020</a:t>
             </a:fld>
             <a:endParaRPr lang="en-US"/>
           </a:p>
@@ -1335,7 +1167,7 @@
           <a:p>
             <a:fld id="{7CA5828A-255D-400E-8883-13442DBF8143}" type="datetimeFigureOut">
               <a:rPr lang="en-US" smtClean="0"/>
-              <a:t>4/9/2020</a:t>
+              <a:t>4/10/2020</a:t>
             </a:fld>
             <a:endParaRPr lang="en-US"/>
           </a:p>
@@ -1600,7 +1432,7 @@
           <a:p>
             <a:fld id="{7CA5828A-255D-400E-8883-13442DBF8143}" type="datetimeFigureOut">
               <a:rPr lang="en-US" smtClean="0"/>
-              <a:t>4/9/2020</a:t>
+              <a:t>4/10/2020</a:t>
             </a:fld>
             <a:endParaRPr lang="en-US"/>
           </a:p>
@@ -2012,7 +1844,7 @@
           <a:p>
             <a:fld id="{7CA5828A-255D-400E-8883-13442DBF8143}" type="datetimeFigureOut">
               <a:rPr lang="en-US" smtClean="0"/>
-              <a:t>4/9/2020</a:t>
+              <a:t>4/10/2020</a:t>
             </a:fld>
             <a:endParaRPr lang="en-US"/>
           </a:p>
@@ -2153,7 +1985,7 @@
           <a:p>
             <a:fld id="{7CA5828A-255D-400E-8883-13442DBF8143}" type="datetimeFigureOut">
               <a:rPr lang="en-US" smtClean="0"/>
-              <a:t>4/9/2020</a:t>
+              <a:t>4/10/2020</a:t>
             </a:fld>
             <a:endParaRPr lang="en-US"/>
           </a:p>
@@ -2266,7 +2098,7 @@
           <a:p>
             <a:fld id="{7CA5828A-255D-400E-8883-13442DBF8143}" type="datetimeFigureOut">
               <a:rPr lang="en-US" smtClean="0"/>
-              <a:t>4/9/2020</a:t>
+              <a:t>4/10/2020</a:t>
             </a:fld>
             <a:endParaRPr lang="en-US"/>
           </a:p>
@@ -2577,7 +2409,7 @@
           <a:p>
             <a:fld id="{7CA5828A-255D-400E-8883-13442DBF8143}" type="datetimeFigureOut">
               <a:rPr lang="en-US" smtClean="0"/>
-              <a:t>4/9/2020</a:t>
+              <a:t>4/10/2020</a:t>
             </a:fld>
             <a:endParaRPr lang="en-US"/>
           </a:p>
@@ -2865,7 +2697,7 @@
           <a:p>
             <a:fld id="{7CA5828A-255D-400E-8883-13442DBF8143}" type="datetimeFigureOut">
               <a:rPr lang="en-US" smtClean="0"/>
-              <a:t>4/9/2020</a:t>
+              <a:t>4/10/2020</a:t>
             </a:fld>
             <a:endParaRPr lang="en-US"/>
           </a:p>
@@ -3106,7 +2938,7 @@
           <a:p>
             <a:fld id="{7CA5828A-255D-400E-8883-13442DBF8143}" type="datetimeFigureOut">
               <a:rPr lang="en-US" smtClean="0"/>
-              <a:t>4/9/2020</a:t>
+              <a:t>4/10/2020</a:t>
             </a:fld>
             <a:endParaRPr lang="en-US"/>
           </a:p>
@@ -3509,6 +3341,14 @@
 <file path=ppt/slides/slide1.xml><?xml version="1.0" encoding="utf-8"?>
 <p:sld xmlns:a="http://schemas.openxmlformats.org/drawingml/2006/main" xmlns:r="http://schemas.openxmlformats.org/officeDocument/2006/relationships" xmlns:p="http://schemas.openxmlformats.org/presentationml/2006/main">
   <p:cSld>
+    <p:bg>
+      <p:bgPr>
+        <a:solidFill>
+          <a:srgbClr val="000000"/>
+        </a:solidFill>
+        <a:effectLst/>
+      </p:bgPr>
+    </p:bg>
     <p:spTree>
       <p:nvGrpSpPr>
         <p:cNvPr id="1" name=""/>
@@ -3525,6 +3365,115 @@
       </p:grpSpPr>
       <p:sp>
         <p:nvSpPr>
+          <p:cNvPr id="2052" name="Rectangle 70">
+            <a:extLst>
+              <a:ext uri="{FF2B5EF4-FFF2-40B4-BE49-F238E27FC236}">
+                <a16:creationId xmlns:a16="http://schemas.microsoft.com/office/drawing/2014/main" id="{71B2258F-86CA-4D4D-8270-BC05FCDEBFB3}"/>
+              </a:ext>
+              <a:ext uri="{C183D7F6-B498-43B3-948B-1728B52AA6E4}">
+                <adec:decorative xmlns:adec="http://schemas.microsoft.com/office/drawing/2017/decorative" val="1"/>
+              </a:ext>
+            </a:extLst>
+          </p:cNvPr>
+          <p:cNvSpPr>
+            <a:spLocks noGrp="1" noRot="1" noChangeAspect="1" noMove="1" noResize="1" noEditPoints="1" noAdjustHandles="1" noChangeArrowheads="1" noChangeShapeType="1" noTextEdit="1"/>
+          </p:cNvSpPr>
+          <p:nvPr>
+            <p:extLst>
+              <p:ext uri="{386F3935-93C4-4BCD-93E2-E3B085C9AB24}">
+                <p16:designElem xmlns:p16="http://schemas.microsoft.com/office/powerpoint/2015/main" val="1"/>
+              </p:ext>
+            </p:extLst>
+          </p:nvPr>
+        </p:nvSpPr>
+        <p:spPr>
+          <a:xfrm>
+            <a:off x="0" y="0"/>
+            <a:ext cx="12192000" cy="6857999"/>
+          </a:xfrm>
+          <a:prstGeom prst="rect">
+            <a:avLst/>
+          </a:prstGeom>
+          <a:solidFill>
+            <a:srgbClr val="000000"/>
+          </a:solidFill>
+          <a:ln>
+            <a:noFill/>
+          </a:ln>
+        </p:spPr>
+        <p:style>
+          <a:lnRef idx="2">
+            <a:schemeClr val="accent1">
+              <a:shade val="50000"/>
+            </a:schemeClr>
+          </a:lnRef>
+          <a:fillRef idx="1">
+            <a:schemeClr val="accent1"/>
+          </a:fillRef>
+          <a:effectRef idx="0">
+            <a:schemeClr val="accent1"/>
+          </a:effectRef>
+          <a:fontRef idx="minor">
+            <a:schemeClr val="lt1"/>
+          </a:fontRef>
+        </p:style>
+        <p:txBody>
+          <a:bodyPr rtlCol="0" anchor="ctr"/>
+          <a:lstStyle/>
+          <a:p>
+            <a:pPr algn="ctr"/>
+            <a:endParaRPr lang="en-US"/>
+          </a:p>
+        </p:txBody>
+      </p:sp>
+      <p:pic>
+        <p:nvPicPr>
+          <p:cNvPr id="2050" name="Picture 2" descr="Mind the (trust) gap: winning back confidence with data management ...">
+            <a:extLst>
+              <a:ext uri="{FF2B5EF4-FFF2-40B4-BE49-F238E27FC236}">
+                <a16:creationId xmlns:a16="http://schemas.microsoft.com/office/drawing/2014/main" id="{D332886E-3259-4DC7-9D04-1475029567BC}"/>
+              </a:ext>
+            </a:extLst>
+          </p:cNvPr>
+          <p:cNvPicPr>
+            <a:picLocks noChangeAspect="1" noChangeArrowheads="1"/>
+          </p:cNvPicPr>
+          <p:nvPr/>
+        </p:nvPicPr>
+        <p:blipFill rotWithShape="1">
+          <a:blip r:embed="rId2">
+            <a:alphaModFix amt="50000"/>
+            <a:extLst>
+              <a:ext uri="{28A0092B-C50C-407E-A947-70E740481C1C}">
+                <a14:useLocalDpi xmlns:a14="http://schemas.microsoft.com/office/drawing/2010/main" val="0"/>
+              </a:ext>
+            </a:extLst>
+          </a:blip>
+          <a:srcRect t="3461" b="11953"/>
+          <a:stretch/>
+        </p:blipFill>
+        <p:spPr bwMode="auto">
+          <a:xfrm>
+            <a:off x="20" y="1"/>
+            <a:ext cx="12191980" cy="6857999"/>
+          </a:xfrm>
+          <a:prstGeom prst="rect">
+            <a:avLst/>
+          </a:prstGeom>
+          <a:noFill/>
+          <a:extLst>
+            <a:ext uri="{909E8E84-426E-40DD-AFC4-6F175D3DCCD1}">
+              <a14:hiddenFill xmlns:a14="http://schemas.microsoft.com/office/drawing/2010/main">
+                <a:solidFill>
+                  <a:srgbClr val="FFFFFF"/>
+                </a:solidFill>
+              </a14:hiddenFill>
+            </a:ext>
+          </a:extLst>
+        </p:spPr>
+      </p:pic>
+      <p:sp>
+        <p:nvSpPr>
           <p:cNvPr id="2" name="Title 1">
             <a:extLst>
               <a:ext uri="{FF2B5EF4-FFF2-40B4-BE49-F238E27FC236}">
@@ -3539,16 +3488,25 @@
             <p:ph type="ctrTitle"/>
           </p:nvPr>
         </p:nvSpPr>
-        <p:spPr/>
+        <p:spPr>
+          <a:xfrm>
+            <a:off x="1524000" y="1122362"/>
+            <a:ext cx="9144000" cy="2900518"/>
+          </a:xfrm>
+        </p:spPr>
         <p:txBody>
           <a:bodyPr>
-            <a:normAutofit fontScale="90000"/>
+            <a:normAutofit/>
           </a:bodyPr>
           <a:lstStyle/>
           <a:p>
             <a:r>
-              <a:rPr lang="en-US" dirty="0"/>
-              <a:t>The Cost Benefit Analysis of Obtaining Postsecondary Education</a:t>
+              <a:rPr lang="en-US" dirty="0">
+                <a:solidFill>
+                  <a:srgbClr val="FFFFFF"/>
+                </a:solidFill>
+              </a:rPr>
+              <a:t>The Cost Benefit Analysis of Obtaining Secondary Education</a:t>
             </a:r>
           </a:p>
         </p:txBody>
@@ -3569,53 +3527,73 @@
             <p:ph type="subTitle" idx="1"/>
           </p:nvPr>
         </p:nvSpPr>
-        <p:spPr/>
+        <p:spPr>
+          <a:xfrm>
+            <a:off x="1524000" y="4159404"/>
+            <a:ext cx="9144000" cy="1098395"/>
+          </a:xfrm>
+        </p:spPr>
         <p:txBody>
           <a:bodyPr>
-            <a:normAutofit fontScale="77500" lnSpcReduction="20000"/>
+            <a:normAutofit/>
           </a:bodyPr>
           <a:lstStyle/>
           <a:p>
             <a:r>
-              <a:rPr lang="en-US" dirty="0"/>
+              <a:rPr lang="en-US" sz="600">
+                <a:solidFill>
+                  <a:srgbClr val="FFFFFF"/>
+                </a:solidFill>
+              </a:rPr>
               <a:t>Group 5</a:t>
             </a:r>
           </a:p>
           <a:p>
             <a:r>
-              <a:rPr lang="en-US" dirty="0"/>
+              <a:rPr lang="en-US" sz="600">
+                <a:solidFill>
+                  <a:srgbClr val="FFFFFF"/>
+                </a:solidFill>
+              </a:rPr>
               <a:t>Maclean Asante</a:t>
             </a:r>
           </a:p>
           <a:p>
             <a:r>
-              <a:rPr lang="en-US" dirty="0" err="1"/>
-              <a:t>Jerin</a:t>
-            </a:r>
-            <a:r>
-              <a:rPr lang="en-US" dirty="0"/>
-              <a:t> Black</a:t>
-            </a:r>
-          </a:p>
-          <a:p>
-            <a:r>
-              <a:rPr lang="en-US" dirty="0"/>
+              <a:rPr lang="en-US" sz="600">
+                <a:solidFill>
+                  <a:srgbClr val="FFFFFF"/>
+                </a:solidFill>
+              </a:rPr>
+              <a:t>Jerin Black</a:t>
+            </a:r>
+          </a:p>
+          <a:p>
+            <a:r>
+              <a:rPr lang="en-US" sz="600">
+                <a:solidFill>
+                  <a:srgbClr val="FFFFFF"/>
+                </a:solidFill>
+              </a:rPr>
               <a:t>Christine Kessler</a:t>
             </a:r>
           </a:p>
           <a:p>
             <a:r>
-              <a:rPr lang="en-US" dirty="0"/>
-              <a:t>Sarah </a:t>
-            </a:r>
-            <a:r>
-              <a:rPr lang="en-US" dirty="0" err="1"/>
-              <a:t>Mwanzi</a:t>
-            </a:r>
-            <a:endParaRPr lang="en-US" dirty="0"/>
-          </a:p>
-          <a:p>
-            <a:endParaRPr lang="en-US" dirty="0"/>
+              <a:rPr lang="en-US" sz="600">
+                <a:solidFill>
+                  <a:srgbClr val="FFFFFF"/>
+                </a:solidFill>
+              </a:rPr>
+              <a:t>Sarah Mwanzi</a:t>
+            </a:r>
+          </a:p>
+          <a:p>
+            <a:endParaRPr lang="en-US" sz="600">
+              <a:solidFill>
+                <a:srgbClr val="FFFFFF"/>
+              </a:solidFill>
+            </a:endParaRPr>
           </a:p>
         </p:txBody>
       </p:sp>
@@ -3627,14 +3605,22 @@
     </p:extLst>
   </p:cSld>
   <p:clrMapOvr>
-    <a:masterClrMapping/>
+    <a:overrideClrMapping bg1="dk1" tx1="lt1" bg2="dk2" tx2="lt2" accent1="accent1" accent2="accent2" accent3="accent3" accent4="accent4" accent5="accent5" accent6="accent6" hlink="hlink" folHlink="folHlink"/>
   </p:clrMapOvr>
 </p:sld>
 </file>
 
-<file path=ppt/slides/slide2.xml><?xml version="1.0" encoding="utf-8"?>
+<file path=ppt/slides/slide10.xml><?xml version="1.0" encoding="utf-8"?>
 <p:sld xmlns:a="http://schemas.openxmlformats.org/drawingml/2006/main" xmlns:r="http://schemas.openxmlformats.org/officeDocument/2006/relationships" xmlns:p="http://schemas.openxmlformats.org/presentationml/2006/main">
   <p:cSld>
+    <p:bg>
+      <p:bgPr>
+        <a:solidFill>
+          <a:schemeClr val="bg1"/>
+        </a:solidFill>
+        <a:effectLst/>
+      </p:bgPr>
+    </p:bg>
     <p:spTree>
       <p:nvGrpSpPr>
         <p:cNvPr id="1" name=""/>
@@ -3649,12 +3635,203 @@
           <a:chExt cx="0" cy="0"/>
         </a:xfrm>
       </p:grpSpPr>
+      <p:sp useBgFill="1">
+        <p:nvSpPr>
+          <p:cNvPr id="28" name="Rectangle 27">
+            <a:extLst>
+              <a:ext uri="{FF2B5EF4-FFF2-40B4-BE49-F238E27FC236}">
+                <a16:creationId xmlns:a16="http://schemas.microsoft.com/office/drawing/2014/main" id="{9AA72BD9-2C5A-4EDC-931F-5AA08EACA0F3}"/>
+              </a:ext>
+              <a:ext uri="{C183D7F6-B498-43B3-948B-1728B52AA6E4}">
+                <adec:decorative xmlns:adec="http://schemas.microsoft.com/office/drawing/2017/decorative" val="1"/>
+              </a:ext>
+            </a:extLst>
+          </p:cNvPr>
+          <p:cNvSpPr>
+            <a:spLocks noGrp="1" noRot="1" noChangeAspect="1" noMove="1" noResize="1" noEditPoints="1" noAdjustHandles="1" noChangeArrowheads="1" noChangeShapeType="1" noTextEdit="1"/>
+          </p:cNvSpPr>
+          <p:nvPr>
+            <p:extLst>
+              <p:ext uri="{386F3935-93C4-4BCD-93E2-E3B085C9AB24}">
+                <p16:designElem xmlns:p16="http://schemas.microsoft.com/office/powerpoint/2015/main" val="1"/>
+              </p:ext>
+            </p:extLst>
+          </p:nvPr>
+        </p:nvSpPr>
+        <p:spPr>
+          <a:xfrm>
+            <a:off x="0" y="0"/>
+            <a:ext cx="12192000" cy="6858000"/>
+          </a:xfrm>
+          <a:prstGeom prst="rect">
+            <a:avLst/>
+          </a:prstGeom>
+          <a:ln>
+            <a:noFill/>
+          </a:ln>
+        </p:spPr>
+        <p:style>
+          <a:lnRef idx="2">
+            <a:schemeClr val="accent1">
+              <a:shade val="50000"/>
+            </a:schemeClr>
+          </a:lnRef>
+          <a:fillRef idx="1">
+            <a:schemeClr val="accent1"/>
+          </a:fillRef>
+          <a:effectRef idx="0">
+            <a:schemeClr val="accent1"/>
+          </a:effectRef>
+          <a:fontRef idx="minor">
+            <a:schemeClr val="lt1"/>
+          </a:fontRef>
+        </p:style>
+        <p:txBody>
+          <a:bodyPr rtlCol="0" anchor="ctr"/>
+          <a:lstStyle/>
+          <a:p>
+            <a:pPr algn="ctr"/>
+            <a:endParaRPr lang="en-US"/>
+          </a:p>
+        </p:txBody>
+      </p:sp>
+      <p:pic>
+        <p:nvPicPr>
+          <p:cNvPr id="5" name="Picture 4" descr="Mind the (trust) gap: winning back confidence with data management ...">
+            <a:extLst>
+              <a:ext uri="{FF2B5EF4-FFF2-40B4-BE49-F238E27FC236}">
+                <a16:creationId xmlns:a16="http://schemas.microsoft.com/office/drawing/2014/main" id="{A7D6C3AE-AEBF-4963-A091-4134242A025A}"/>
+              </a:ext>
+            </a:extLst>
+          </p:cNvPr>
+          <p:cNvPicPr>
+            <a:picLocks noChangeAspect="1" noChangeArrowheads="1"/>
+          </p:cNvPicPr>
+          <p:nvPr/>
+        </p:nvPicPr>
+        <p:blipFill rotWithShape="1">
+          <a:blip r:embed="rId2">
+            <a:extLst>
+              <a:ext uri="{28A0092B-C50C-407E-A947-70E740481C1C}">
+                <a14:useLocalDpi xmlns:a14="http://schemas.microsoft.com/office/drawing/2010/main" val="0"/>
+              </a:ext>
+            </a:extLst>
+          </a:blip>
+          <a:srcRect t="3508" r="23576" b="5583"/>
+          <a:stretch/>
+        </p:blipFill>
+        <p:spPr bwMode="auto">
+          <a:xfrm>
+            <a:off x="3522468" y="10"/>
+            <a:ext cx="8669532" cy="6857990"/>
+          </a:xfrm>
+          <a:prstGeom prst="rect">
+            <a:avLst/>
+          </a:prstGeom>
+          <a:noFill/>
+          <a:extLst>
+            <a:ext uri="{909E8E84-426E-40DD-AFC4-6F175D3DCCD1}">
+              <a14:hiddenFill xmlns:a14="http://schemas.microsoft.com/office/drawing/2010/main">
+                <a:solidFill>
+                  <a:srgbClr val="FFFFFF"/>
+                </a:solidFill>
+              </a14:hiddenFill>
+            </a:ext>
+          </a:extLst>
+        </p:spPr>
+      </p:pic>
+      <p:sp>
+        <p:nvSpPr>
+          <p:cNvPr id="30" name="Rectangle 29">
+            <a:extLst>
+              <a:ext uri="{FF2B5EF4-FFF2-40B4-BE49-F238E27FC236}">
+                <a16:creationId xmlns:a16="http://schemas.microsoft.com/office/drawing/2014/main" id="{DD3981AC-7B61-4947-BCF3-F7AA7FA385B9}"/>
+              </a:ext>
+              <a:ext uri="{C183D7F6-B498-43B3-948B-1728B52AA6E4}">
+                <adec:decorative xmlns:adec="http://schemas.microsoft.com/office/drawing/2017/decorative" val="1"/>
+              </a:ext>
+            </a:extLst>
+          </p:cNvPr>
+          <p:cNvSpPr>
+            <a:spLocks noGrp="1" noRot="1" noChangeAspect="1" noMove="1" noResize="1" noEditPoints="1" noAdjustHandles="1" noChangeArrowheads="1" noChangeShapeType="1" noTextEdit="1"/>
+          </p:cNvSpPr>
+          <p:nvPr>
+            <p:extLst>
+              <p:ext uri="{386F3935-93C4-4BCD-93E2-E3B085C9AB24}">
+                <p16:designElem xmlns:p16="http://schemas.microsoft.com/office/powerpoint/2015/main" val="1"/>
+              </p:ext>
+            </p:extLst>
+          </p:nvPr>
+        </p:nvSpPr>
+        <p:spPr>
+          <a:xfrm>
+            <a:off x="2" y="0"/>
+            <a:ext cx="9756601" cy="6858000"/>
+          </a:xfrm>
+          <a:prstGeom prst="rect">
+            <a:avLst/>
+          </a:prstGeom>
+          <a:gradFill>
+            <a:gsLst>
+              <a:gs pos="58000">
+                <a:schemeClr val="bg1"/>
+              </a:gs>
+              <a:gs pos="35000">
+                <a:schemeClr val="bg1">
+                  <a:alpha val="78000"/>
+                </a:schemeClr>
+              </a:gs>
+              <a:gs pos="19000">
+                <a:schemeClr val="bg1">
+                  <a:alpha val="38000"/>
+                </a:schemeClr>
+              </a:gs>
+              <a:gs pos="0">
+                <a:schemeClr val="bg1">
+                  <a:alpha val="0"/>
+                </a:schemeClr>
+              </a:gs>
+              <a:gs pos="100000">
+                <a:schemeClr val="bg1"/>
+              </a:gs>
+            </a:gsLst>
+            <a:lin ang="10800000" scaled="0"/>
+          </a:gradFill>
+          <a:ln>
+            <a:noFill/>
+          </a:ln>
+        </p:spPr>
+        <p:style>
+          <a:lnRef idx="2">
+            <a:schemeClr val="accent1">
+              <a:shade val="50000"/>
+            </a:schemeClr>
+          </a:lnRef>
+          <a:fillRef idx="1">
+            <a:schemeClr val="accent1"/>
+          </a:fillRef>
+          <a:effectRef idx="0">
+            <a:schemeClr val="accent1"/>
+          </a:effectRef>
+          <a:fontRef idx="minor">
+            <a:schemeClr val="lt1"/>
+          </a:fontRef>
+        </p:style>
+        <p:txBody>
+          <a:bodyPr rtlCol="0" anchor="ctr"/>
+          <a:lstStyle/>
+          <a:p>
+            <a:pPr algn="ctr"/>
+            <a:endParaRPr lang="en-US" dirty="0"/>
+          </a:p>
+        </p:txBody>
+      </p:sp>
       <p:sp>
         <p:nvSpPr>
           <p:cNvPr id="2" name="Title 1">
             <a:extLst>
               <a:ext uri="{FF2B5EF4-FFF2-40B4-BE49-F238E27FC236}">
-                <a16:creationId xmlns:a16="http://schemas.microsoft.com/office/drawing/2014/main" id="{7F69E59C-1FB1-4D6F-B5E8-94563E0DB5AD}"/>
+                <a16:creationId xmlns:a16="http://schemas.microsoft.com/office/drawing/2014/main" id="{29435016-57F1-4285-BB0B-B7C58E03138C}"/>
               </a:ext>
             </a:extLst>
           </p:cNvPr>
@@ -3667,20 +3844,182 @@
         </p:nvSpPr>
         <p:spPr>
           <a:xfrm>
-            <a:off x="1524000" y="1122363"/>
-            <a:ext cx="9144000" cy="767397"/>
-          </a:xfrm>
-        </p:spPr>
-        <p:txBody>
-          <a:bodyPr>
-            <a:normAutofit fontScale="90000"/>
+            <a:off x="371093" y="843534"/>
+            <a:ext cx="4876155" cy="1124712"/>
+          </a:xfrm>
+        </p:spPr>
+        <p:txBody>
+          <a:bodyPr vert="horz" lIns="91440" tIns="45720" rIns="91440" bIns="45720" rtlCol="0" anchor="b">
+            <a:normAutofit/>
           </a:bodyPr>
           <a:lstStyle/>
           <a:p>
-            <a:r>
-              <a:rPr lang="en-US" dirty="0"/>
-              <a:t>Motivation &amp; Summary</a:t>
-            </a:r>
+            <a:pPr algn="l"/>
+            <a:r>
+              <a:rPr lang="en-US" sz="4400" dirty="0"/>
+              <a:t>Sources of Data</a:t>
+            </a:r>
+          </a:p>
+        </p:txBody>
+      </p:sp>
+      <p:sp>
+        <p:nvSpPr>
+          <p:cNvPr id="32" name="Rectangle 31">
+            <a:extLst>
+              <a:ext uri="{FF2B5EF4-FFF2-40B4-BE49-F238E27FC236}">
+                <a16:creationId xmlns:a16="http://schemas.microsoft.com/office/drawing/2014/main" id="{55D4142C-5077-457F-A6AD-3FECFDB39685}"/>
+              </a:ext>
+              <a:ext uri="{C183D7F6-B498-43B3-948B-1728B52AA6E4}">
+                <adec:decorative xmlns:adec="http://schemas.microsoft.com/office/drawing/2017/decorative" val="1"/>
+              </a:ext>
+            </a:extLst>
+          </p:cNvPr>
+          <p:cNvSpPr>
+            <a:spLocks noGrp="1" noRot="1" noChangeAspect="1" noMove="1" noResize="1" noEditPoints="1" noAdjustHandles="1" noChangeArrowheads="1" noChangeShapeType="1" noTextEdit="1"/>
+          </p:cNvSpPr>
+          <p:nvPr>
+            <p:extLst>
+              <p:ext uri="{386F3935-93C4-4BCD-93E2-E3B085C9AB24}">
+                <p16:designElem xmlns:p16="http://schemas.microsoft.com/office/powerpoint/2015/main" val="1"/>
+              </p:ext>
+            </p:extLst>
+          </p:nvPr>
+        </p:nvSpPr>
+        <p:spPr>
+          <a:xfrm rot="5400000">
+            <a:off x="662559" y="605790"/>
+            <a:ext cx="73152" cy="548640"/>
+          </a:xfrm>
+          <a:prstGeom prst="rect">
+            <a:avLst/>
+          </a:prstGeom>
+          <a:solidFill>
+            <a:schemeClr val="accent2"/>
+          </a:solidFill>
+          <a:ln>
+            <a:noFill/>
+          </a:ln>
+        </p:spPr>
+        <p:style>
+          <a:lnRef idx="2">
+            <a:schemeClr val="accent1">
+              <a:shade val="50000"/>
+            </a:schemeClr>
+          </a:lnRef>
+          <a:fillRef idx="1">
+            <a:schemeClr val="accent1"/>
+          </a:fillRef>
+          <a:effectRef idx="0">
+            <a:schemeClr val="accent1"/>
+          </a:effectRef>
+          <a:fontRef idx="minor">
+            <a:schemeClr val="lt1"/>
+          </a:fontRef>
+        </p:style>
+        <p:txBody>
+          <a:bodyPr rtlCol="0" anchor="ctr"/>
+          <a:lstStyle/>
+          <a:p>
+            <a:pPr algn="ctr"/>
+            <a:endParaRPr lang="en-US">
+              <a:solidFill>
+                <a:prstClr val="white"/>
+              </a:solidFill>
+              <a:latin typeface="Calibri" panose="020F0502020204030204"/>
+            </a:endParaRPr>
+          </a:p>
+        </p:txBody>
+      </p:sp>
+      <p:sp>
+        <p:nvSpPr>
+          <p:cNvPr id="34" name="Rectangle 33">
+            <a:extLst>
+              <a:ext uri="{FF2B5EF4-FFF2-40B4-BE49-F238E27FC236}">
+                <a16:creationId xmlns:a16="http://schemas.microsoft.com/office/drawing/2014/main" id="{7A5F0580-5EE9-419F-96EE-B6529EF6E7D0}"/>
+              </a:ext>
+              <a:ext uri="{C183D7F6-B498-43B3-948B-1728B52AA6E4}">
+                <adec:decorative xmlns:adec="http://schemas.microsoft.com/office/drawing/2017/decorative" val="1"/>
+              </a:ext>
+            </a:extLst>
+          </p:cNvPr>
+          <p:cNvSpPr>
+            <a:spLocks noGrp="1" noRot="1" noChangeAspect="1" noMove="1" noResize="1" noEditPoints="1" noAdjustHandles="1" noChangeArrowheads="1" noChangeShapeType="1" noTextEdit="1"/>
+          </p:cNvSpPr>
+          <p:nvPr>
+            <p:extLst>
+              <p:ext uri="{386F3935-93C4-4BCD-93E2-E3B085C9AB24}">
+                <p16:designElem xmlns:p16="http://schemas.microsoft.com/office/powerpoint/2015/main" val="1"/>
+              </p:ext>
+            </p:extLst>
+          </p:nvPr>
+        </p:nvSpPr>
+        <p:spPr>
+          <a:xfrm>
+            <a:off x="428244" y="2443480"/>
+            <a:ext cx="3300984" cy="18288"/>
+          </a:xfrm>
+          <a:prstGeom prst="rect">
+            <a:avLst/>
+          </a:prstGeom>
+          <a:solidFill>
+            <a:schemeClr val="tx1"/>
+          </a:solidFill>
+          <a:ln w="3175">
+            <a:noFill/>
+          </a:ln>
+          <a:effectLst/>
+        </p:spPr>
+        <p:style>
+          <a:lnRef idx="2">
+            <a:schemeClr val="accent1">
+              <a:shade val="50000"/>
+            </a:schemeClr>
+          </a:lnRef>
+          <a:fillRef idx="1">
+            <a:schemeClr val="accent1"/>
+          </a:fillRef>
+          <a:effectRef idx="0">
+            <a:schemeClr val="accent1"/>
+          </a:effectRef>
+          <a:fontRef idx="minor">
+            <a:schemeClr val="lt1"/>
+          </a:fontRef>
+        </p:style>
+        <p:txBody>
+          <a:bodyPr rtlCol="0" anchor="ctr"/>
+          <a:lstStyle/>
+          <a:p>
+            <a:pPr marL="0" marR="0" lvl="0" indent="0" algn="ctr" defTabSz="914400" rtl="0" eaLnBrk="1" fontAlgn="auto" latinLnBrk="0" hangingPunct="1">
+              <a:lnSpc>
+                <a:spcPct val="100000"/>
+              </a:lnSpc>
+              <a:spcBef>
+                <a:spcPts val="0"/>
+              </a:spcBef>
+              <a:spcAft>
+                <a:spcPts val="0"/>
+              </a:spcAft>
+              <a:buClrTx/>
+              <a:buSzTx/>
+              <a:buFontTx/>
+              <a:buNone/>
+              <a:tabLst/>
+              <a:defRPr/>
+            </a:pPr>
+            <a:endParaRPr kumimoji="0" lang="en-US" sz="1800" b="0" i="0" u="none" strike="noStrike" kern="1200" cap="none" spc="0" normalizeH="0" baseline="0" noProof="0">
+              <a:ln>
+                <a:noFill/>
+              </a:ln>
+              <a:solidFill>
+                <a:prstClr val="white"/>
+              </a:solidFill>
+              <a:effectLst/>
+              <a:uLnTx/>
+              <a:uFillTx/>
+              <a:latin typeface="Calibri" panose="020F0502020204030204"/>
+              <a:ea typeface="+mn-ea"/>
+              <a:cs typeface="+mn-cs"/>
+            </a:endParaRPr>
           </a:p>
         </p:txBody>
       </p:sp>
@@ -3689,7 +4028,7 @@
           <p:cNvPr id="3" name="Subtitle 2">
             <a:extLst>
               <a:ext uri="{FF2B5EF4-FFF2-40B4-BE49-F238E27FC236}">
-                <a16:creationId xmlns:a16="http://schemas.microsoft.com/office/drawing/2014/main" id="{2A6319EF-6730-4ED6-B49D-AC3C7B7ECBCA}"/>
+                <a16:creationId xmlns:a16="http://schemas.microsoft.com/office/drawing/2014/main" id="{6135DCA6-026A-4543-88BE-0722DE6917F9}"/>
               </a:ext>
             </a:extLst>
           </p:cNvPr>
@@ -3702,91 +4041,206 @@
         </p:nvSpPr>
         <p:spPr>
           <a:xfrm>
-            <a:off x="1158240" y="2026221"/>
-            <a:ext cx="9144000" cy="3709416"/>
-          </a:xfrm>
-        </p:spPr>
-        <p:txBody>
-          <a:bodyPr>
-            <a:normAutofit lnSpcReduction="10000"/>
+            <a:off x="371093" y="2718054"/>
+            <a:ext cx="5087171" cy="3833270"/>
+          </a:xfrm>
+        </p:spPr>
+        <p:txBody>
+          <a:bodyPr vert="horz" lIns="91440" tIns="45720" rIns="91440" bIns="45720" rtlCol="0" anchor="t">
+            <a:normAutofit/>
           </a:bodyPr>
           <a:lstStyle/>
           <a:p>
-            <a:r>
-              <a:rPr lang="en-US" dirty="0"/>
-              <a:t>Our project examines the benefits of university education based on region, cost of attendance and the Return on Investment (ROI) in terms based on starting salary.  Specifically, we wanted to know the financial impact of obtaining a degree (</a:t>
-            </a:r>
-            <a:r>
-              <a:rPr lang="en-US" dirty="0">
+            <a:pPr algn="l">
+              <a:lnSpc>
+                <a:spcPct val="100000"/>
+              </a:lnSpc>
+            </a:pPr>
+            <a:r>
+              <a:rPr lang="en-US" sz="1200" dirty="0">
+                <a:hlinkClick r:id="rId3">
+                  <a:extLst>
+                    <a:ext uri="{A12FA001-AC4F-418D-AE19-62706E023703}">
+                      <ahyp:hlinkClr xmlns:ahyp="http://schemas.microsoft.com/office/drawing/2018/hyperlinkcolor" val="tx"/>
+                    </a:ext>
+                  </a:extLst>
+                </a:hlinkClick>
+              </a:rPr>
+              <a:t>Kaggle</a:t>
+            </a:r>
+          </a:p>
+          <a:p>
+            <a:pPr marL="171450" indent="-171450" algn="l">
+              <a:buFont typeface="Arial" panose="020B0604020202020204" pitchFamily="34" charset="0"/>
+              <a:buChar char="•"/>
+            </a:pPr>
+            <a:r>
+              <a:rPr lang="en-US" sz="1200" dirty="0">
+                <a:hlinkClick r:id="rId3"/>
+              </a:rPr>
+              <a:t>https://Kaggle.com/WSJ/college-salaries#salaries-by-region.csv</a:t>
+            </a:r>
+            <a:endParaRPr lang="en-US" sz="1200" dirty="0"/>
+          </a:p>
+          <a:p>
+            <a:pPr marL="628650" lvl="1" indent="-171450" algn="l">
+              <a:buFont typeface="Arial" panose="020B0604020202020204" pitchFamily="34" charset="0"/>
+              <a:buChar char="•"/>
+            </a:pPr>
+            <a:r>
+              <a:rPr lang="en-US" sz="800" dirty="0"/>
+              <a:t>Salaries by College</a:t>
+            </a:r>
+            <a:endParaRPr lang="en-US" sz="800" dirty="0">
+              <a:highlight>
+                <a:srgbClr val="FFFF00"/>
+              </a:highlight>
+            </a:endParaRPr>
+          </a:p>
+          <a:p>
+            <a:pPr marL="628650" lvl="1" indent="-171450" algn="l">
+              <a:buFont typeface="Arial" panose="020B0604020202020204" pitchFamily="34" charset="0"/>
+              <a:buChar char="•"/>
+            </a:pPr>
+            <a:r>
+              <a:rPr lang="en-US" sz="800" dirty="0"/>
+              <a:t>Degrees That Pay Back</a:t>
+            </a:r>
+          </a:p>
+          <a:p>
+            <a:pPr algn="l"/>
+            <a:endParaRPr lang="en-US" sz="1200" dirty="0"/>
+          </a:p>
+          <a:p>
+            <a:pPr algn="l"/>
+            <a:r>
+              <a:rPr lang="en-US" sz="1200" dirty="0"/>
+              <a:t>PayScale</a:t>
+            </a:r>
+          </a:p>
+          <a:p>
+            <a:pPr marL="171450" indent="-171450" algn="l">
+              <a:buFont typeface="Arial" panose="020B0604020202020204" pitchFamily="34" charset="0"/>
+              <a:buChar char="•"/>
+            </a:pPr>
+            <a:r>
+              <a:rPr lang="en-US" sz="1200" dirty="0">
+                <a:hlinkClick r:id="rId4"/>
+              </a:rPr>
+              <a:t>https://www.payscale.com/college-salary-report</a:t>
+            </a:r>
+            <a:endParaRPr lang="en-US" sz="1200" dirty="0"/>
+          </a:p>
+          <a:p>
+            <a:pPr marL="628650" lvl="1" indent="-171450" algn="l">
+              <a:buFont typeface="Arial" panose="020B0604020202020204" pitchFamily="34" charset="0"/>
+              <a:buChar char="•"/>
+            </a:pPr>
+            <a:r>
+              <a:rPr lang="en-US" sz="800" dirty="0"/>
+              <a:t>Cost Pay Analysis</a:t>
+            </a:r>
+          </a:p>
+          <a:p>
+            <a:pPr algn="l"/>
+            <a:endParaRPr lang="en-US" sz="1200" dirty="0"/>
+          </a:p>
+          <a:p>
+            <a:pPr algn="l"/>
+            <a:r>
+              <a:rPr lang="en-US" sz="1200" dirty="0"/>
+              <a:t>API</a:t>
+            </a:r>
+          </a:p>
+          <a:p>
+            <a:pPr marL="171450" indent="-171450" algn="l">
+              <a:buFont typeface="Arial" panose="020B0604020202020204" pitchFamily="34" charset="0"/>
+              <a:buChar char="•"/>
+            </a:pPr>
+            <a:r>
+              <a:rPr lang="en-US" sz="1200" dirty="0">
+                <a:hlinkClick r:id="rId5"/>
+              </a:rPr>
+              <a:t>https://data.bls.gov/PDQWeb/LE</a:t>
+            </a:r>
+            <a:endParaRPr lang="en-US" sz="1200" dirty="0"/>
+          </a:p>
+          <a:p>
+            <a:pPr algn="l"/>
+            <a:endParaRPr lang="en-US" sz="1200" dirty="0"/>
+          </a:p>
+          <a:p>
+            <a:pPr algn="l"/>
+            <a:r>
+              <a:rPr lang="en-US" sz="1200" dirty="0">
+                <a:solidFill>
+                  <a:schemeClr val="bg1"/>
+                </a:solidFill>
                 <a:highlight>
                   <a:srgbClr val="FFFF00"/>
                 </a:highlight>
               </a:rPr>
-              <a:t>bachelors/masters/</a:t>
-            </a:r>
-            <a:r>
-              <a:rPr lang="en-US" dirty="0" err="1">
+              <a:t>Google</a:t>
+            </a:r>
+          </a:p>
+          <a:p>
+            <a:pPr algn="l"/>
+            <a:r>
+              <a:rPr lang="en-US" sz="1200" dirty="0">
+                <a:solidFill>
+                  <a:schemeClr val="bg1"/>
+                </a:solidFill>
                 <a:highlight>
                   <a:srgbClr val="FFFF00"/>
                 </a:highlight>
               </a:rPr>
-              <a:t>etc</a:t>
-            </a:r>
-            <a:r>
-              <a:rPr lang="en-US" dirty="0">
-                <a:highlight>
-                  <a:srgbClr val="FFFF00"/>
-                </a:highlight>
-              </a:rPr>
-              <a:t>?? Need clarification </a:t>
-            </a:r>
-            <a:r>
-              <a:rPr lang="en-US" dirty="0"/>
-              <a:t>):</a:t>
-            </a:r>
-          </a:p>
-          <a:p>
-            <a:r>
-              <a:rPr lang="en-US" dirty="0"/>
-              <a:t>The degree earning and cost potential (ROI)</a:t>
-            </a:r>
-          </a:p>
-          <a:p>
-            <a:r>
-              <a:rPr lang="en-US" dirty="0"/>
-              <a:t>Private vs Public cost effectiveness</a:t>
-            </a:r>
-          </a:p>
-          <a:p>
-            <a:r>
-              <a:rPr lang="en-US" dirty="0"/>
-              <a:t>University’s geographic location impact</a:t>
-            </a:r>
-          </a:p>
-          <a:p>
-            <a:r>
-              <a:rPr lang="en-US" dirty="0"/>
-              <a:t>This topic intrigues us because we were all interested in how our decisions impacted our earnings potential</a:t>
-            </a:r>
+              <a:t>Maps</a:t>
+            </a:r>
+          </a:p>
+          <a:p>
+            <a:pPr indent="-228600" algn="l">
+              <a:buFont typeface="Arial" panose="020B0604020202020204" pitchFamily="34" charset="0"/>
+              <a:buChar char="•"/>
+            </a:pPr>
+            <a:endParaRPr lang="en-US" sz="800" dirty="0"/>
+          </a:p>
+          <a:p>
+            <a:pPr indent="-228600" algn="l">
+              <a:buFont typeface="Arial" panose="020B0604020202020204" pitchFamily="34" charset="0"/>
+              <a:buChar char="•"/>
+            </a:pPr>
+            <a:endParaRPr lang="en-US" sz="800" dirty="0">
+              <a:highlight>
+                <a:srgbClr val="FFFF00"/>
+              </a:highlight>
+            </a:endParaRPr>
           </a:p>
         </p:txBody>
       </p:sp>
     </p:spTree>
     <p:extLst>
       <p:ext uri="{BB962C8B-B14F-4D97-AF65-F5344CB8AC3E}">
-        <p14:creationId xmlns:p14="http://schemas.microsoft.com/office/powerpoint/2010/main" val="3976791779"/>
+        <p14:creationId xmlns:p14="http://schemas.microsoft.com/office/powerpoint/2010/main" val="1092047461"/>
       </p:ext>
     </p:extLst>
   </p:cSld>
   <p:clrMapOvr>
-    <a:masterClrMapping/>
+    <a:overrideClrMapping bg1="dk1" tx1="lt1" bg2="dk2" tx2="lt2" accent1="accent1" accent2="accent2" accent3="accent3" accent4="accent4" accent5="accent5" accent6="accent6" hlink="hlink" folHlink="folHlink"/>
   </p:clrMapOvr>
 </p:sld>
 </file>
 
-<file path=ppt/slides/slide3.xml><?xml version="1.0" encoding="utf-8"?>
+<file path=ppt/slides/slide2.xml><?xml version="1.0" encoding="utf-8"?>
 <p:sld xmlns:a="http://schemas.openxmlformats.org/drawingml/2006/main" xmlns:r="http://schemas.openxmlformats.org/officeDocument/2006/relationships" xmlns:p="http://schemas.openxmlformats.org/presentationml/2006/main">
   <p:cSld>
+    <p:bg>
+      <p:bgPr>
+        <a:solidFill>
+          <a:schemeClr val="bg1"/>
+        </a:solidFill>
+        <a:effectLst/>
+      </p:bgPr>
+    </p:bg>
     <p:spTree>
       <p:nvGrpSpPr>
         <p:cNvPr id="1" name=""/>
@@ -3803,10 +4257,119 @@
       </p:grpSpPr>
       <p:sp>
         <p:nvSpPr>
+          <p:cNvPr id="9" name="Rectangle 8">
+            <a:extLst>
+              <a:ext uri="{FF2B5EF4-FFF2-40B4-BE49-F238E27FC236}">
+                <a16:creationId xmlns:a16="http://schemas.microsoft.com/office/drawing/2014/main" id="{C5E6CFF1-2F42-4E10-9A97-F116F46F53FE}"/>
+              </a:ext>
+              <a:ext uri="{C183D7F6-B498-43B3-948B-1728B52AA6E4}">
+                <adec:decorative xmlns:adec="http://schemas.microsoft.com/office/drawing/2017/decorative" val="1"/>
+              </a:ext>
+            </a:extLst>
+          </p:cNvPr>
+          <p:cNvSpPr>
+            <a:spLocks noGrp="1" noRot="1" noChangeAspect="1" noMove="1" noResize="1" noEditPoints="1" noAdjustHandles="1" noChangeArrowheads="1" noChangeShapeType="1" noTextEdit="1"/>
+          </p:cNvSpPr>
+          <p:nvPr>
+            <p:extLst>
+              <p:ext uri="{386F3935-93C4-4BCD-93E2-E3B085C9AB24}">
+                <p16:designElem xmlns:p16="http://schemas.microsoft.com/office/powerpoint/2015/main" val="1"/>
+              </p:ext>
+            </p:extLst>
+          </p:nvPr>
+        </p:nvSpPr>
+        <p:spPr>
+          <a:xfrm>
+            <a:off x="0" y="0"/>
+            <a:ext cx="12192000" cy="6858000"/>
+          </a:xfrm>
+          <a:prstGeom prst="rect">
+            <a:avLst/>
+          </a:prstGeom>
+          <a:solidFill>
+            <a:srgbClr val="000000"/>
+          </a:solidFill>
+          <a:ln>
+            <a:noFill/>
+          </a:ln>
+        </p:spPr>
+        <p:style>
+          <a:lnRef idx="2">
+            <a:schemeClr val="accent1">
+              <a:shade val="50000"/>
+            </a:schemeClr>
+          </a:lnRef>
+          <a:fillRef idx="1">
+            <a:schemeClr val="accent1"/>
+          </a:fillRef>
+          <a:effectRef idx="0">
+            <a:schemeClr val="accent1"/>
+          </a:effectRef>
+          <a:fontRef idx="minor">
+            <a:schemeClr val="lt1"/>
+          </a:fontRef>
+        </p:style>
+        <p:txBody>
+          <a:bodyPr rtlCol="0" anchor="ctr"/>
+          <a:lstStyle/>
+          <a:p>
+            <a:pPr algn="ctr"/>
+            <a:endParaRPr lang="en-US"/>
+          </a:p>
+        </p:txBody>
+      </p:sp>
+      <p:pic>
+        <p:nvPicPr>
+          <p:cNvPr id="4" name="Picture 2" descr="Mind the (trust) gap: winning back confidence with data management ...">
+            <a:extLst>
+              <a:ext uri="{FF2B5EF4-FFF2-40B4-BE49-F238E27FC236}">
+                <a16:creationId xmlns:a16="http://schemas.microsoft.com/office/drawing/2014/main" id="{D121B231-76A4-475A-934D-6A68216F5356}"/>
+              </a:ext>
+            </a:extLst>
+          </p:cNvPr>
+          <p:cNvPicPr>
+            <a:picLocks noChangeAspect="1" noChangeArrowheads="1"/>
+          </p:cNvPicPr>
+          <p:nvPr/>
+        </p:nvPicPr>
+        <p:blipFill rotWithShape="1">
+          <a:blip r:embed="rId2">
+            <a:alphaModFix amt="35000"/>
+            <a:extLst>
+              <a:ext uri="{28A0092B-C50C-407E-A947-70E740481C1C}">
+                <a14:useLocalDpi xmlns:a14="http://schemas.microsoft.com/office/drawing/2010/main" val="0"/>
+              </a:ext>
+            </a:extLst>
+          </a:blip>
+          <a:srcRect t="3461" b="11953"/>
+          <a:stretch/>
+        </p:blipFill>
+        <p:spPr bwMode="auto">
+          <a:xfrm>
+            <a:off x="20" y="1"/>
+            <a:ext cx="12191980" cy="6857999"/>
+          </a:xfrm>
+          <a:prstGeom prst="rect">
+            <a:avLst/>
+          </a:prstGeom>
+          <a:noFill/>
+          <a:extLst>
+            <a:ext uri="{909E8E84-426E-40DD-AFC4-6F175D3DCCD1}">
+              <a14:hiddenFill xmlns:a14="http://schemas.microsoft.com/office/drawing/2010/main">
+                <a:solidFill>
+                  <a:srgbClr val="FFFFFF"/>
+                </a:solidFill>
+              </a14:hiddenFill>
+            </a:ext>
+          </a:extLst>
+        </p:spPr>
+      </p:pic>
+      <p:sp>
+        <p:nvSpPr>
           <p:cNvPr id="2" name="Title 1">
             <a:extLst>
               <a:ext uri="{FF2B5EF4-FFF2-40B4-BE49-F238E27FC236}">
-                <a16:creationId xmlns:a16="http://schemas.microsoft.com/office/drawing/2014/main" id="{5C01BE12-11D0-4E11-A8AE-1E1F2E1625B8}"/>
+                <a16:creationId xmlns:a16="http://schemas.microsoft.com/office/drawing/2014/main" id="{D9181C35-9C12-4E71-9FD4-340A8FAABED0}"/>
               </a:ext>
             </a:extLst>
           </p:cNvPr>
@@ -3817,24 +4380,88 @@
             <p:ph type="title"/>
           </p:nvPr>
         </p:nvSpPr>
-        <p:spPr/>
-        <p:txBody>
-          <a:bodyPr/>
-          <a:lstStyle/>
-          <a:p>
-            <a:r>
-              <a:rPr lang="en-US" dirty="0"/>
-              <a:t>Results of Data Investigation </a:t>
-            </a:r>
-          </a:p>
-        </p:txBody>
-      </p:sp>
+        <p:spPr>
+          <a:xfrm>
+            <a:off x="838201" y="1065862"/>
+            <a:ext cx="3313164" cy="4726276"/>
+          </a:xfrm>
+        </p:spPr>
+        <p:txBody>
+          <a:bodyPr>
+            <a:normAutofit/>
+          </a:bodyPr>
+          <a:lstStyle/>
+          <a:p>
+            <a:pPr algn="r"/>
+            <a:r>
+              <a:rPr lang="en-US" sz="4000">
+                <a:solidFill>
+                  <a:srgbClr val="FFFFFF"/>
+                </a:solidFill>
+              </a:rPr>
+              <a:t>Hypothesis</a:t>
+            </a:r>
+          </a:p>
+        </p:txBody>
+      </p:sp>
+      <p:cxnSp>
+        <p:nvCxnSpPr>
+          <p:cNvPr id="11" name="Straight Connector 10">
+            <a:extLst>
+              <a:ext uri="{FF2B5EF4-FFF2-40B4-BE49-F238E27FC236}">
+                <a16:creationId xmlns:a16="http://schemas.microsoft.com/office/drawing/2014/main" id="{67182200-4859-4C8D-BCBB-55B245C28BA3}"/>
+              </a:ext>
+              <a:ext uri="{C183D7F6-B498-43B3-948B-1728B52AA6E4}">
+                <adec:decorative xmlns:adec="http://schemas.microsoft.com/office/drawing/2017/decorative" val="1"/>
+              </a:ext>
+            </a:extLst>
+          </p:cNvPr>
+          <p:cNvCxnSpPr>
+            <a:cxnSpLocks noGrp="1" noRot="1" noChangeAspect="1" noMove="1" noResize="1" noEditPoints="1" noAdjustHandles="1" noChangeArrowheads="1" noChangeShapeType="1"/>
+          </p:cNvCxnSpPr>
+          <p:nvPr>
+            <p:extLst>
+              <p:ext uri="{386F3935-93C4-4BCD-93E2-E3B085C9AB24}">
+                <p16:designElem xmlns:p16="http://schemas.microsoft.com/office/powerpoint/2015/main" val="1"/>
+              </p:ext>
+            </p:extLst>
+          </p:nvPr>
+        </p:nvCxnSpPr>
+        <p:spPr>
+          <a:xfrm>
+            <a:off x="4653372" y="2286000"/>
+            <a:ext cx="0" cy="2286000"/>
+          </a:xfrm>
+          <a:prstGeom prst="line">
+            <a:avLst/>
+          </a:prstGeom>
+          <a:ln w="15875">
+            <a:solidFill>
+              <a:srgbClr val="FFFFFF"/>
+            </a:solidFill>
+          </a:ln>
+        </p:spPr>
+        <p:style>
+          <a:lnRef idx="1">
+            <a:schemeClr val="accent1"/>
+          </a:lnRef>
+          <a:fillRef idx="0">
+            <a:schemeClr val="accent1"/>
+          </a:fillRef>
+          <a:effectRef idx="0">
+            <a:schemeClr val="accent1"/>
+          </a:effectRef>
+          <a:fontRef idx="minor">
+            <a:schemeClr val="tx1"/>
+          </a:fontRef>
+        </p:style>
+      </p:cxnSp>
       <p:sp>
         <p:nvSpPr>
           <p:cNvPr id="3" name="Content Placeholder 2">
             <a:extLst>
               <a:ext uri="{FF2B5EF4-FFF2-40B4-BE49-F238E27FC236}">
-                <a16:creationId xmlns:a16="http://schemas.microsoft.com/office/drawing/2014/main" id="{A9103996-2A62-44B9-B61A-DD743CF51587}"/>
+                <a16:creationId xmlns:a16="http://schemas.microsoft.com/office/drawing/2014/main" id="{ABECA77D-36C1-4B84-8920-4E36F86E24BB}"/>
               </a:ext>
             </a:extLst>
           </p:cNvPr>
@@ -3845,55 +4472,56 @@
             <p:ph idx="1"/>
           </p:nvPr>
         </p:nvSpPr>
-        <p:spPr/>
-        <p:txBody>
-          <a:bodyPr/>
-          <a:lstStyle/>
-          <a:p>
-            <a:r>
-              <a:rPr lang="en-US" dirty="0"/>
-              <a:t>An overabundance of information, needed to narrow the scope down.</a:t>
-            </a:r>
-          </a:p>
-          <a:p>
-            <a:r>
-              <a:rPr lang="en-US" dirty="0"/>
-              <a:t>University names and descriptions were not consistent across platforms</a:t>
-            </a:r>
-          </a:p>
-          <a:p>
-            <a:r>
-              <a:rPr lang="en-US" dirty="0"/>
-              <a:t>ROI can include many things.  Narrowed it down to include only the cost of tuition</a:t>
-            </a:r>
-          </a:p>
-          <a:p>
-            <a:r>
-              <a:rPr lang="en-US" dirty="0"/>
-              <a:t>Surprisingly, data regarding cost and earnings was consistent across data sources</a:t>
-            </a:r>
-          </a:p>
-          <a:p>
-            <a:endParaRPr lang="en-US" dirty="0"/>
+        <p:spPr>
+          <a:xfrm>
+            <a:off x="5155379" y="1065862"/>
+            <a:ext cx="5744685" cy="4726276"/>
+          </a:xfrm>
+        </p:spPr>
+        <p:txBody>
+          <a:bodyPr anchor="ctr">
+            <a:normAutofit/>
+          </a:bodyPr>
+          <a:lstStyle/>
+          <a:p>
+            <a:pPr marL="0" indent="0">
+              <a:buNone/>
+            </a:pPr>
+            <a:r>
+              <a:rPr lang="en-US" sz="2000" dirty="0">
+                <a:solidFill>
+                  <a:srgbClr val="FFFFFF"/>
+                </a:solidFill>
+              </a:rPr>
+              <a:t>Going to a university in a western region improves chances of earning a higher starting salary, thus increasing long term earning potential.</a:t>
+            </a:r>
           </a:p>
         </p:txBody>
       </p:sp>
     </p:spTree>
     <p:extLst>
       <p:ext uri="{BB962C8B-B14F-4D97-AF65-F5344CB8AC3E}">
-        <p14:creationId xmlns:p14="http://schemas.microsoft.com/office/powerpoint/2010/main" val="3481018803"/>
+        <p14:creationId xmlns:p14="http://schemas.microsoft.com/office/powerpoint/2010/main" val="3054276100"/>
       </p:ext>
     </p:extLst>
   </p:cSld>
   <p:clrMapOvr>
-    <a:masterClrMapping/>
+    <a:overrideClrMapping bg1="dk1" tx1="lt1" bg2="dk2" tx2="lt2" accent1="accent1" accent2="accent2" accent3="accent3" accent4="accent4" accent5="accent5" accent6="accent6" hlink="hlink" folHlink="folHlink"/>
   </p:clrMapOvr>
 </p:sld>
 </file>
 
-<file path=ppt/slides/slide4.xml><?xml version="1.0" encoding="utf-8"?>
+<file path=ppt/slides/slide3.xml><?xml version="1.0" encoding="utf-8"?>
 <p:sld xmlns:a="http://schemas.openxmlformats.org/drawingml/2006/main" xmlns:r="http://schemas.openxmlformats.org/officeDocument/2006/relationships" xmlns:p="http://schemas.openxmlformats.org/presentationml/2006/main">
   <p:cSld>
+    <p:bg>
+      <p:bgPr>
+        <a:solidFill>
+          <a:schemeClr val="bg1"/>
+        </a:solidFill>
+        <a:effectLst/>
+      </p:bgPr>
+    </p:bg>
     <p:spTree>
       <p:nvGrpSpPr>
         <p:cNvPr id="1" name=""/>
@@ -3910,10 +4538,119 @@
       </p:grpSpPr>
       <p:sp>
         <p:nvSpPr>
+          <p:cNvPr id="71" name="Rectangle 70">
+            <a:extLst>
+              <a:ext uri="{FF2B5EF4-FFF2-40B4-BE49-F238E27FC236}">
+                <a16:creationId xmlns:a16="http://schemas.microsoft.com/office/drawing/2014/main" id="{C5E6CFF1-2F42-4E10-9A97-F116F46F53FE}"/>
+              </a:ext>
+              <a:ext uri="{C183D7F6-B498-43B3-948B-1728B52AA6E4}">
+                <adec:decorative xmlns:adec="http://schemas.microsoft.com/office/drawing/2017/decorative" val="1"/>
+              </a:ext>
+            </a:extLst>
+          </p:cNvPr>
+          <p:cNvSpPr>
+            <a:spLocks noGrp="1" noRot="1" noChangeAspect="1" noMove="1" noResize="1" noEditPoints="1" noAdjustHandles="1" noChangeArrowheads="1" noChangeShapeType="1" noTextEdit="1"/>
+          </p:cNvSpPr>
+          <p:nvPr>
+            <p:extLst>
+              <p:ext uri="{386F3935-93C4-4BCD-93E2-E3B085C9AB24}">
+                <p16:designElem xmlns:p16="http://schemas.microsoft.com/office/powerpoint/2015/main" val="1"/>
+              </p:ext>
+            </p:extLst>
+          </p:nvPr>
+        </p:nvSpPr>
+        <p:spPr>
+          <a:xfrm>
+            <a:off x="0" y="0"/>
+            <a:ext cx="12192000" cy="6858000"/>
+          </a:xfrm>
+          <a:prstGeom prst="rect">
+            <a:avLst/>
+          </a:prstGeom>
+          <a:solidFill>
+            <a:srgbClr val="000000"/>
+          </a:solidFill>
+          <a:ln>
+            <a:noFill/>
+          </a:ln>
+        </p:spPr>
+        <p:style>
+          <a:lnRef idx="2">
+            <a:schemeClr val="accent1">
+              <a:shade val="50000"/>
+            </a:schemeClr>
+          </a:lnRef>
+          <a:fillRef idx="1">
+            <a:schemeClr val="accent1"/>
+          </a:fillRef>
+          <a:effectRef idx="0">
+            <a:schemeClr val="accent1"/>
+          </a:effectRef>
+          <a:fontRef idx="minor">
+            <a:schemeClr val="lt1"/>
+          </a:fontRef>
+        </p:style>
+        <p:txBody>
+          <a:bodyPr rtlCol="0" anchor="ctr"/>
+          <a:lstStyle/>
+          <a:p>
+            <a:pPr algn="ctr"/>
+            <a:endParaRPr lang="en-US"/>
+          </a:p>
+        </p:txBody>
+      </p:sp>
+      <p:pic>
+        <p:nvPicPr>
+          <p:cNvPr id="3074" name="Picture 2" descr="Mind the (trust) gap: winning back confidence with data management ...">
+            <a:extLst>
+              <a:ext uri="{FF2B5EF4-FFF2-40B4-BE49-F238E27FC236}">
+                <a16:creationId xmlns:a16="http://schemas.microsoft.com/office/drawing/2014/main" id="{A19BA8D5-493C-4D12-BDA9-D196F95737D2}"/>
+              </a:ext>
+            </a:extLst>
+          </p:cNvPr>
+          <p:cNvPicPr>
+            <a:picLocks noChangeAspect="1" noChangeArrowheads="1"/>
+          </p:cNvPicPr>
+          <p:nvPr/>
+        </p:nvPicPr>
+        <p:blipFill rotWithShape="1">
+          <a:blip r:embed="rId2">
+            <a:alphaModFix amt="35000"/>
+            <a:extLst>
+              <a:ext uri="{28A0092B-C50C-407E-A947-70E740481C1C}">
+                <a14:useLocalDpi xmlns:a14="http://schemas.microsoft.com/office/drawing/2010/main" val="0"/>
+              </a:ext>
+            </a:extLst>
+          </a:blip>
+          <a:srcRect t="3461" b="11953"/>
+          <a:stretch/>
+        </p:blipFill>
+        <p:spPr bwMode="auto">
+          <a:xfrm>
+            <a:off x="20" y="1"/>
+            <a:ext cx="12191980" cy="6857999"/>
+          </a:xfrm>
+          <a:prstGeom prst="rect">
+            <a:avLst/>
+          </a:prstGeom>
+          <a:noFill/>
+          <a:extLst>
+            <a:ext uri="{909E8E84-426E-40DD-AFC4-6F175D3DCCD1}">
+              <a14:hiddenFill xmlns:a14="http://schemas.microsoft.com/office/drawing/2010/main">
+                <a:solidFill>
+                  <a:srgbClr val="FFFFFF"/>
+                </a:solidFill>
+              </a14:hiddenFill>
+            </a:ext>
+          </a:extLst>
+        </p:spPr>
+      </p:pic>
+      <p:sp>
+        <p:nvSpPr>
           <p:cNvPr id="2" name="Title 1">
             <a:extLst>
               <a:ext uri="{FF2B5EF4-FFF2-40B4-BE49-F238E27FC236}">
-                <a16:creationId xmlns:a16="http://schemas.microsoft.com/office/drawing/2014/main" id="{29435016-57F1-4285-BB0B-B7C58E03138C}"/>
+                <a16:creationId xmlns:a16="http://schemas.microsoft.com/office/drawing/2014/main" id="{7F69E59C-1FB1-4D6F-B5E8-94563E0DB5AD}"/>
               </a:ext>
             </a:extLst>
           </p:cNvPr>
@@ -3926,27 +4663,99 @@
         </p:nvSpPr>
         <p:spPr>
           <a:xfrm>
-            <a:off x="1656347" y="689226"/>
-            <a:ext cx="9144000" cy="1127542"/>
-          </a:xfrm>
-        </p:spPr>
-        <p:txBody>
-          <a:bodyPr/>
-          <a:lstStyle/>
-          <a:p>
-            <a:r>
-              <a:rPr lang="en-US" dirty="0"/>
-              <a:t>Sources of Data</a:t>
-            </a:r>
-          </a:p>
-        </p:txBody>
-      </p:sp>
+            <a:off x="838201" y="1065862"/>
+            <a:ext cx="3313164" cy="4726276"/>
+          </a:xfrm>
+        </p:spPr>
+        <p:txBody>
+          <a:bodyPr vert="horz" lIns="91440" tIns="45720" rIns="91440" bIns="45720" rtlCol="0" anchor="ctr">
+            <a:normAutofit/>
+          </a:bodyPr>
+          <a:lstStyle/>
+          <a:p>
+            <a:pPr algn="r"/>
+            <a:r>
+              <a:rPr lang="en-US" sz="4400" dirty="0">
+                <a:solidFill>
+                  <a:srgbClr val="FFFFFF"/>
+                </a:solidFill>
+              </a:rPr>
+              <a:t>Project </a:t>
+            </a:r>
+            <a:r>
+              <a:rPr lang="en-US" sz="4800" dirty="0">
+                <a:solidFill>
+                  <a:srgbClr val="FFFFFF"/>
+                </a:solidFill>
+              </a:rPr>
+              <a:t>Proposal</a:t>
+            </a:r>
+            <a:endParaRPr lang="en-US" sz="4400" dirty="0">
+              <a:solidFill>
+                <a:srgbClr val="FFFFFF"/>
+              </a:solidFill>
+            </a:endParaRPr>
+          </a:p>
+        </p:txBody>
+      </p:sp>
+      <p:cxnSp>
+        <p:nvCxnSpPr>
+          <p:cNvPr id="73" name="Straight Connector 72">
+            <a:extLst>
+              <a:ext uri="{FF2B5EF4-FFF2-40B4-BE49-F238E27FC236}">
+                <a16:creationId xmlns:a16="http://schemas.microsoft.com/office/drawing/2014/main" id="{67182200-4859-4C8D-BCBB-55B245C28BA3}"/>
+              </a:ext>
+              <a:ext uri="{C183D7F6-B498-43B3-948B-1728B52AA6E4}">
+                <adec:decorative xmlns:adec="http://schemas.microsoft.com/office/drawing/2017/decorative" val="1"/>
+              </a:ext>
+            </a:extLst>
+          </p:cNvPr>
+          <p:cNvCxnSpPr>
+            <a:cxnSpLocks noGrp="1" noRot="1" noChangeAspect="1" noMove="1" noResize="1" noEditPoints="1" noAdjustHandles="1" noChangeArrowheads="1" noChangeShapeType="1"/>
+          </p:cNvCxnSpPr>
+          <p:nvPr>
+            <p:extLst>
+              <p:ext uri="{386F3935-93C4-4BCD-93E2-E3B085C9AB24}">
+                <p16:designElem xmlns:p16="http://schemas.microsoft.com/office/powerpoint/2015/main" val="1"/>
+              </p:ext>
+            </p:extLst>
+          </p:nvPr>
+        </p:nvCxnSpPr>
+        <p:spPr>
+          <a:xfrm>
+            <a:off x="4653372" y="2286000"/>
+            <a:ext cx="0" cy="2286000"/>
+          </a:xfrm>
+          <a:prstGeom prst="line">
+            <a:avLst/>
+          </a:prstGeom>
+          <a:ln w="15875">
+            <a:solidFill>
+              <a:srgbClr val="FFFFFF"/>
+            </a:solidFill>
+          </a:ln>
+        </p:spPr>
+        <p:style>
+          <a:lnRef idx="1">
+            <a:schemeClr val="accent1"/>
+          </a:lnRef>
+          <a:fillRef idx="0">
+            <a:schemeClr val="accent1"/>
+          </a:fillRef>
+          <a:effectRef idx="0">
+            <a:schemeClr val="accent1"/>
+          </a:effectRef>
+          <a:fontRef idx="minor">
+            <a:schemeClr val="tx1"/>
+          </a:fontRef>
+        </p:style>
+      </p:cxnSp>
       <p:sp>
         <p:nvSpPr>
           <p:cNvPr id="3" name="Subtitle 2">
             <a:extLst>
               <a:ext uri="{FF2B5EF4-FFF2-40B4-BE49-F238E27FC236}">
-                <a16:creationId xmlns:a16="http://schemas.microsoft.com/office/drawing/2014/main" id="{6135DCA6-026A-4543-88BE-0722DE6917F9}"/>
+                <a16:creationId xmlns:a16="http://schemas.microsoft.com/office/drawing/2014/main" id="{2A6319EF-6730-4ED6-B49D-AC3C7B7ECBCA}"/>
               </a:ext>
             </a:extLst>
           </p:cNvPr>
@@ -3959,195 +4768,147 @@
         </p:nvSpPr>
         <p:spPr>
           <a:xfrm>
-            <a:off x="1524000" y="1816768"/>
-            <a:ext cx="9144000" cy="3441032"/>
-          </a:xfrm>
-        </p:spPr>
-        <p:txBody>
-          <a:bodyPr>
-            <a:normAutofit fontScale="47500" lnSpcReduction="20000"/>
+            <a:off x="5155379" y="1065862"/>
+            <a:ext cx="5744685" cy="4726276"/>
+          </a:xfrm>
+        </p:spPr>
+        <p:txBody>
+          <a:bodyPr vert="horz" lIns="91440" tIns="45720" rIns="91440" bIns="45720" rtlCol="0" anchor="ctr">
+            <a:normAutofit lnSpcReduction="10000"/>
           </a:bodyPr>
           <a:lstStyle/>
           <a:p>
-            <a:r>
-              <a:rPr lang="en-US" dirty="0">
-                <a:hlinkClick r:id="rId2"/>
+            <a:pPr algn="l"/>
+            <a:r>
+              <a:rPr lang="en-US" sz="1900" dirty="0">
+                <a:solidFill>
+                  <a:srgbClr val="FFFFFF"/>
+                </a:solidFill>
               </a:rPr>
-              <a:t>https://</a:t>
-            </a:r>
-            <a:r>
-              <a:rPr lang="en-US" dirty="0" err="1">
-                <a:hlinkClick r:id="rId2"/>
+              <a:t>Our project examines the benefits of a university education based on region, cost of attendance, and the return on investment (ROI) in terms of earnings based on starting &amp; mid-career salaries.</a:t>
+            </a:r>
+          </a:p>
+          <a:p>
+            <a:pPr indent="-228600" algn="l">
+              <a:buFont typeface="Arial" panose="020B0604020202020204" pitchFamily="34" charset="0"/>
+              <a:buChar char="•"/>
+            </a:pPr>
+            <a:r>
+              <a:rPr lang="en-US" sz="1900" dirty="0">
+                <a:solidFill>
+                  <a:srgbClr val="FFFFFF"/>
+                </a:solidFill>
               </a:rPr>
-              <a:t>Kaggle.com</a:t>
-            </a:r>
-            <a:r>
-              <a:rPr lang="en-US" dirty="0">
-                <a:hlinkClick r:id="rId2"/>
+              <a:t>Focuses:</a:t>
+            </a:r>
+          </a:p>
+          <a:p>
+            <a:pPr marL="342900" indent="-228600" algn="l">
+              <a:buFont typeface="Arial" panose="020B0604020202020204" pitchFamily="34" charset="0"/>
+              <a:buChar char="•"/>
+            </a:pPr>
+            <a:r>
+              <a:rPr lang="en-US" sz="1900" dirty="0">
+                <a:solidFill>
+                  <a:srgbClr val="FFFFFF"/>
+                </a:solidFill>
               </a:rPr>
-              <a:t>/WSJ/</a:t>
-            </a:r>
-            <a:r>
-              <a:rPr lang="en-US" dirty="0" err="1">
-                <a:hlinkClick r:id="rId2"/>
+              <a:t>Highest starting median salaries &amp; mid-career salaries</a:t>
+            </a:r>
+          </a:p>
+          <a:p>
+            <a:pPr marL="800100" lvl="1" indent="-228600" algn="l">
+              <a:buFont typeface="Arial" panose="020B0604020202020204" pitchFamily="34" charset="0"/>
+              <a:buChar char="•"/>
+            </a:pPr>
+            <a:r>
+              <a:rPr lang="en-US" sz="1900" dirty="0">
+                <a:solidFill>
+                  <a:srgbClr val="FFFFFF"/>
+                </a:solidFill>
               </a:rPr>
-              <a:t>college-salaries#salaries-by-region.csv</a:t>
-            </a:r>
-            <a:endParaRPr lang="en-US" dirty="0"/>
-          </a:p>
-          <a:p>
-            <a:r>
-              <a:rPr lang="en-US" dirty="0"/>
-              <a:t>Salaries by College</a:t>
-            </a:r>
-            <a:endParaRPr lang="en-US" dirty="0">
-              <a:highlight>
-                <a:srgbClr val="FFFF00"/>
-              </a:highlight>
-            </a:endParaRPr>
-          </a:p>
-          <a:p>
-            <a:r>
-              <a:rPr lang="en-US" dirty="0"/>
-              <a:t>Degrees That Pay Back</a:t>
-            </a:r>
-          </a:p>
-          <a:p>
-            <a:endParaRPr lang="en-US" dirty="0"/>
-          </a:p>
-          <a:p>
-            <a:r>
-              <a:rPr lang="en-US" dirty="0"/>
-              <a:t>PayScale</a:t>
-            </a:r>
-          </a:p>
-          <a:p>
-            <a:r>
-              <a:rPr lang="en-US" dirty="0">
-                <a:hlinkClick r:id="rId3"/>
+              <a:t>Top 30 Colleges</a:t>
+            </a:r>
+          </a:p>
+          <a:p>
+            <a:pPr marL="342900" indent="-228600" algn="l">
+              <a:buFont typeface="Arial" panose="020B0604020202020204" pitchFamily="34" charset="0"/>
+              <a:buChar char="•"/>
+            </a:pPr>
+            <a:r>
+              <a:rPr lang="en-US" sz="1900" dirty="0">
+                <a:solidFill>
+                  <a:srgbClr val="FFFFFF"/>
+                </a:solidFill>
               </a:rPr>
-              <a:t>https://</a:t>
-            </a:r>
-            <a:r>
-              <a:rPr lang="en-US" dirty="0" err="1">
-                <a:hlinkClick r:id="rId3"/>
+              <a:t>Highest region salary</a:t>
+            </a:r>
+          </a:p>
+          <a:p>
+            <a:pPr marL="800100" lvl="1" indent="-228600" algn="l">
+              <a:buFont typeface="Arial" panose="020B0604020202020204" pitchFamily="34" charset="0"/>
+              <a:buChar char="•"/>
+            </a:pPr>
+            <a:r>
+              <a:rPr lang="en-US" sz="1900" dirty="0">
+                <a:solidFill>
+                  <a:srgbClr val="FFFFFF"/>
+                </a:solidFill>
               </a:rPr>
-              <a:t>www.payscale.com</a:t>
-            </a:r>
-            <a:r>
-              <a:rPr lang="en-US" dirty="0">
-                <a:hlinkClick r:id="rId3"/>
+              <a:t>Overall best region(s) for highest salary/University’s geographic location impact</a:t>
+            </a:r>
+          </a:p>
+          <a:p>
+            <a:pPr marL="342900" indent="-228600" algn="l">
+              <a:buFont typeface="Arial" panose="020B0604020202020204" pitchFamily="34" charset="0"/>
+              <a:buChar char="•"/>
+            </a:pPr>
+            <a:r>
+              <a:rPr lang="en-US" sz="1900" dirty="0">
+                <a:solidFill>
+                  <a:srgbClr val="FFFFFF"/>
+                </a:solidFill>
               </a:rPr>
-              <a:t>/college-salary-report</a:t>
-            </a:r>
-            <a:endParaRPr lang="en-US" dirty="0"/>
-          </a:p>
-          <a:p>
-            <a:r>
-              <a:rPr lang="en-US" dirty="0"/>
-              <a:t>Cost </a:t>
-            </a:r>
-            <a:r>
-              <a:rPr lang="en-US"/>
-              <a:t>Pay Analysis</a:t>
-            </a:r>
-          </a:p>
-          <a:p>
-            <a:endParaRPr lang="en-US" dirty="0"/>
-          </a:p>
-          <a:p>
-            <a:endParaRPr lang="en-US" dirty="0"/>
-          </a:p>
-          <a:p>
-            <a:r>
-              <a:rPr lang="en-US" dirty="0"/>
-              <a:t>API</a:t>
-            </a:r>
-          </a:p>
-          <a:p>
-            <a:r>
-              <a:rPr lang="en-US" dirty="0">
-                <a:hlinkClick r:id="rId4"/>
+              <a:t>Best ROI</a:t>
+            </a:r>
+          </a:p>
+          <a:p>
+            <a:pPr algn="l"/>
+            <a:r>
+              <a:rPr lang="en-US" sz="1900" dirty="0">
+                <a:solidFill>
+                  <a:srgbClr val="FFFFFF"/>
+                </a:solidFill>
               </a:rPr>
-              <a:t>https://</a:t>
-            </a:r>
-            <a:r>
-              <a:rPr lang="en-US" dirty="0" err="1">
-                <a:hlinkClick r:id="rId4"/>
-              </a:rPr>
-              <a:t>data.bls.gov</a:t>
-            </a:r>
-            <a:r>
-              <a:rPr lang="en-US" dirty="0">
-                <a:hlinkClick r:id="rId4"/>
-              </a:rPr>
-              <a:t>/</a:t>
-            </a:r>
-            <a:r>
-              <a:rPr lang="en-US" dirty="0" err="1">
-                <a:hlinkClick r:id="rId4"/>
-              </a:rPr>
-              <a:t>PDQWeb</a:t>
-            </a:r>
-            <a:r>
-              <a:rPr lang="en-US" dirty="0">
-                <a:hlinkClick r:id="rId4"/>
-              </a:rPr>
-              <a:t>/LE</a:t>
-            </a:r>
-            <a:endParaRPr lang="en-US" dirty="0"/>
-          </a:p>
-          <a:p>
-            <a:endParaRPr lang="en-US" dirty="0"/>
-          </a:p>
-          <a:p>
-            <a:r>
-              <a:rPr lang="en-US" dirty="0">
-                <a:highlight>
-                  <a:srgbClr val="FFFF00"/>
-                </a:highlight>
-              </a:rPr>
-              <a:t>Google</a:t>
-            </a:r>
-          </a:p>
-          <a:p>
-            <a:r>
-              <a:rPr lang="en-US" dirty="0">
-                <a:highlight>
-                  <a:srgbClr val="FFFF00"/>
-                </a:highlight>
-              </a:rPr>
-              <a:t>Maps</a:t>
-            </a:r>
-          </a:p>
-          <a:p>
-            <a:endParaRPr lang="en-US" dirty="0"/>
-          </a:p>
-          <a:p>
-            <a:endParaRPr lang="en-US" dirty="0">
-              <a:highlight>
-                <a:srgbClr val="FFFF00"/>
-              </a:highlight>
-            </a:endParaRPr>
+              <a:t>This topic intrigues us because we’re interested in understanding how higher education impacts our long term earnings potential.</a:t>
+            </a:r>
           </a:p>
         </p:txBody>
       </p:sp>
     </p:spTree>
     <p:extLst>
       <p:ext uri="{BB962C8B-B14F-4D97-AF65-F5344CB8AC3E}">
-        <p14:creationId xmlns:p14="http://schemas.microsoft.com/office/powerpoint/2010/main" val="1092047461"/>
+        <p14:creationId xmlns:p14="http://schemas.microsoft.com/office/powerpoint/2010/main" val="3976791779"/>
       </p:ext>
     </p:extLst>
   </p:cSld>
   <p:clrMapOvr>
-    <a:masterClrMapping/>
+    <a:overrideClrMapping bg1="dk1" tx1="lt1" bg2="dk2" tx2="lt2" accent1="accent1" accent2="accent2" accent3="accent3" accent4="accent4" accent5="accent5" accent6="accent6" hlink="hlink" folHlink="folHlink"/>
   </p:clrMapOvr>
 </p:sld>
 </file>
 
-<file path=ppt/slides/slide5.xml><?xml version="1.0" encoding="utf-8"?>
+<file path=ppt/slides/slide4.xml><?xml version="1.0" encoding="utf-8"?>
 <p:sld xmlns:a="http://schemas.openxmlformats.org/drawingml/2006/main" xmlns:r="http://schemas.openxmlformats.org/officeDocument/2006/relationships" xmlns:p="http://schemas.openxmlformats.org/presentationml/2006/main">
   <p:cSld>
+    <p:bg>
+      <p:bgPr>
+        <a:solidFill>
+          <a:schemeClr val="bg1"/>
+        </a:solidFill>
+        <a:effectLst/>
+      </p:bgPr>
+    </p:bg>
     <p:spTree>
       <p:nvGrpSpPr>
         <p:cNvPr id="1" name=""/>
@@ -4164,6 +4925,115 @@
       </p:grpSpPr>
       <p:sp>
         <p:nvSpPr>
+          <p:cNvPr id="4100" name="Rectangle 70">
+            <a:extLst>
+              <a:ext uri="{FF2B5EF4-FFF2-40B4-BE49-F238E27FC236}">
+                <a16:creationId xmlns:a16="http://schemas.microsoft.com/office/drawing/2014/main" id="{C5E6CFF1-2F42-4E10-9A97-F116F46F53FE}"/>
+              </a:ext>
+              <a:ext uri="{C183D7F6-B498-43B3-948B-1728B52AA6E4}">
+                <adec:decorative xmlns:adec="http://schemas.microsoft.com/office/drawing/2017/decorative" val="1"/>
+              </a:ext>
+            </a:extLst>
+          </p:cNvPr>
+          <p:cNvSpPr>
+            <a:spLocks noGrp="1" noRot="1" noChangeAspect="1" noMove="1" noResize="1" noEditPoints="1" noAdjustHandles="1" noChangeArrowheads="1" noChangeShapeType="1" noTextEdit="1"/>
+          </p:cNvSpPr>
+          <p:nvPr>
+            <p:extLst>
+              <p:ext uri="{386F3935-93C4-4BCD-93E2-E3B085C9AB24}">
+                <p16:designElem xmlns:p16="http://schemas.microsoft.com/office/powerpoint/2015/main" val="1"/>
+              </p:ext>
+            </p:extLst>
+          </p:nvPr>
+        </p:nvSpPr>
+        <p:spPr>
+          <a:xfrm>
+            <a:off x="0" y="0"/>
+            <a:ext cx="12192000" cy="6858000"/>
+          </a:xfrm>
+          <a:prstGeom prst="rect">
+            <a:avLst/>
+          </a:prstGeom>
+          <a:solidFill>
+            <a:srgbClr val="000000"/>
+          </a:solidFill>
+          <a:ln>
+            <a:noFill/>
+          </a:ln>
+        </p:spPr>
+        <p:style>
+          <a:lnRef idx="2">
+            <a:schemeClr val="accent1">
+              <a:shade val="50000"/>
+            </a:schemeClr>
+          </a:lnRef>
+          <a:fillRef idx="1">
+            <a:schemeClr val="accent1"/>
+          </a:fillRef>
+          <a:effectRef idx="0">
+            <a:schemeClr val="accent1"/>
+          </a:effectRef>
+          <a:fontRef idx="minor">
+            <a:schemeClr val="lt1"/>
+          </a:fontRef>
+        </p:style>
+        <p:txBody>
+          <a:bodyPr rtlCol="0" anchor="ctr"/>
+          <a:lstStyle/>
+          <a:p>
+            <a:pPr algn="ctr"/>
+            <a:endParaRPr lang="en-US"/>
+          </a:p>
+        </p:txBody>
+      </p:sp>
+      <p:pic>
+        <p:nvPicPr>
+          <p:cNvPr id="4098" name="Picture 2" descr="Mind the (trust) gap: winning back confidence with data management ...">
+            <a:extLst>
+              <a:ext uri="{FF2B5EF4-FFF2-40B4-BE49-F238E27FC236}">
+                <a16:creationId xmlns:a16="http://schemas.microsoft.com/office/drawing/2014/main" id="{AFFEC725-A447-48DC-AFA0-B20CEF466AA3}"/>
+              </a:ext>
+            </a:extLst>
+          </p:cNvPr>
+          <p:cNvPicPr>
+            <a:picLocks noChangeAspect="1" noChangeArrowheads="1"/>
+          </p:cNvPicPr>
+          <p:nvPr/>
+        </p:nvPicPr>
+        <p:blipFill rotWithShape="1">
+          <a:blip r:embed="rId2">
+            <a:alphaModFix amt="35000"/>
+            <a:extLst>
+              <a:ext uri="{28A0092B-C50C-407E-A947-70E740481C1C}">
+                <a14:useLocalDpi xmlns:a14="http://schemas.microsoft.com/office/drawing/2010/main" val="0"/>
+              </a:ext>
+            </a:extLst>
+          </a:blip>
+          <a:srcRect t="3461" b="11953"/>
+          <a:stretch/>
+        </p:blipFill>
+        <p:spPr bwMode="auto">
+          <a:xfrm>
+            <a:off x="20" y="1"/>
+            <a:ext cx="12191980" cy="6857999"/>
+          </a:xfrm>
+          <a:prstGeom prst="rect">
+            <a:avLst/>
+          </a:prstGeom>
+          <a:noFill/>
+          <a:extLst>
+            <a:ext uri="{909E8E84-426E-40DD-AFC4-6F175D3DCCD1}">
+              <a14:hiddenFill xmlns:a14="http://schemas.microsoft.com/office/drawing/2010/main">
+                <a:solidFill>
+                  <a:srgbClr val="FFFFFF"/>
+                </a:solidFill>
+              </a14:hiddenFill>
+            </a:ext>
+          </a:extLst>
+        </p:spPr>
+      </p:pic>
+      <p:sp>
+        <p:nvSpPr>
           <p:cNvPr id="2" name="Title 1">
             <a:extLst>
               <a:ext uri="{FF2B5EF4-FFF2-40B4-BE49-F238E27FC236}">
@@ -4178,18 +5048,82 @@
             <p:ph type="title"/>
           </p:nvPr>
         </p:nvSpPr>
-        <p:spPr/>
-        <p:txBody>
-          <a:bodyPr/>
-          <a:lstStyle/>
-          <a:p>
-            <a:r>
-              <a:rPr lang="en-US" dirty="0"/>
+        <p:spPr>
+          <a:xfrm>
+            <a:off x="838201" y="1065862"/>
+            <a:ext cx="3313164" cy="4726276"/>
+          </a:xfrm>
+        </p:spPr>
+        <p:txBody>
+          <a:bodyPr>
+            <a:normAutofit/>
+          </a:bodyPr>
+          <a:lstStyle/>
+          <a:p>
+            <a:pPr algn="r"/>
+            <a:r>
+              <a:rPr lang="en-US" dirty="0">
+                <a:solidFill>
+                  <a:srgbClr val="FFFFFF"/>
+                </a:solidFill>
+              </a:rPr>
               <a:t>Questions:</a:t>
             </a:r>
           </a:p>
         </p:txBody>
       </p:sp>
+      <p:cxnSp>
+        <p:nvCxnSpPr>
+          <p:cNvPr id="4101" name="Straight Connector 72">
+            <a:extLst>
+              <a:ext uri="{FF2B5EF4-FFF2-40B4-BE49-F238E27FC236}">
+                <a16:creationId xmlns:a16="http://schemas.microsoft.com/office/drawing/2014/main" id="{67182200-4859-4C8D-BCBB-55B245C28BA3}"/>
+              </a:ext>
+              <a:ext uri="{C183D7F6-B498-43B3-948B-1728B52AA6E4}">
+                <adec:decorative xmlns:adec="http://schemas.microsoft.com/office/drawing/2017/decorative" val="1"/>
+              </a:ext>
+            </a:extLst>
+          </p:cNvPr>
+          <p:cNvCxnSpPr>
+            <a:cxnSpLocks noGrp="1" noRot="1" noChangeAspect="1" noMove="1" noResize="1" noEditPoints="1" noAdjustHandles="1" noChangeArrowheads="1" noChangeShapeType="1"/>
+          </p:cNvCxnSpPr>
+          <p:nvPr>
+            <p:extLst>
+              <p:ext uri="{386F3935-93C4-4BCD-93E2-E3B085C9AB24}">
+                <p16:designElem xmlns:p16="http://schemas.microsoft.com/office/powerpoint/2015/main" val="1"/>
+              </p:ext>
+            </p:extLst>
+          </p:nvPr>
+        </p:nvCxnSpPr>
+        <p:spPr>
+          <a:xfrm>
+            <a:off x="4653372" y="2286000"/>
+            <a:ext cx="0" cy="2286000"/>
+          </a:xfrm>
+          <a:prstGeom prst="line">
+            <a:avLst/>
+          </a:prstGeom>
+          <a:ln w="15875">
+            <a:solidFill>
+              <a:srgbClr val="FFFFFF"/>
+            </a:solidFill>
+          </a:ln>
+        </p:spPr>
+        <p:style>
+          <a:lnRef idx="1">
+            <a:schemeClr val="accent1"/>
+          </a:lnRef>
+          <a:fillRef idx="0">
+            <a:schemeClr val="accent1"/>
+          </a:fillRef>
+          <a:effectRef idx="0">
+            <a:schemeClr val="accent1"/>
+          </a:effectRef>
+          <a:fontRef idx="minor">
+            <a:schemeClr val="tx1"/>
+          </a:fontRef>
+        </p:style>
+      </p:cxnSp>
       <p:sp>
         <p:nvSpPr>
           <p:cNvPr id="3" name="Content Placeholder 2">
@@ -4206,38 +5140,69 @@
             <p:ph idx="1"/>
           </p:nvPr>
         </p:nvSpPr>
-        <p:spPr/>
-        <p:txBody>
-          <a:bodyPr/>
-          <a:lstStyle/>
-          <a:p>
-            <a:r>
-              <a:rPr lang="en-US" dirty="0"/>
-              <a:t>Does attending a private institution guarantee a higher salary upon degree completion?</a:t>
-            </a:r>
-          </a:p>
-          <a:p>
-            <a:r>
-              <a:rPr lang="en-US" dirty="0"/>
-              <a:t>Does attending a private institution guarantee a higher Return on Investment (ROI)?</a:t>
-            </a:r>
-          </a:p>
-          <a:p>
-            <a:r>
-              <a:rPr lang="en-US" dirty="0"/>
-              <a:t>Does more expensive tuition cost guarantee a higher ROI?</a:t>
-            </a:r>
-          </a:p>
-          <a:p>
-            <a:r>
-              <a:rPr lang="en-US" dirty="0"/>
-              <a:t>Does the geographic location of the university impact the earnings potentials?</a:t>
-            </a:r>
-          </a:p>
-          <a:p>
-            <a:r>
-              <a:rPr lang="en-US" dirty="0"/>
-              <a:t>What college majors command higher salaries upon degree completion?</a:t>
+        <p:spPr>
+          <a:xfrm>
+            <a:off x="5155379" y="1065862"/>
+            <a:ext cx="5744685" cy="4726276"/>
+          </a:xfrm>
+        </p:spPr>
+        <p:txBody>
+          <a:bodyPr anchor="ctr">
+            <a:normAutofit/>
+          </a:bodyPr>
+          <a:lstStyle/>
+          <a:p>
+            <a:r>
+              <a:rPr lang="en-US" sz="2000" dirty="0">
+                <a:solidFill>
+                  <a:srgbClr val="FFFFFF"/>
+                </a:solidFill>
+              </a:rPr>
+              <a:t>What’s the best university to attend for a higher starting &amp; mid-career salary?</a:t>
+            </a:r>
+          </a:p>
+          <a:p>
+            <a:r>
+              <a:rPr lang="en-US" sz="2000" dirty="0">
+                <a:solidFill>
+                  <a:srgbClr val="FFFFFF"/>
+                </a:solidFill>
+              </a:rPr>
+              <a:t>Which region gives you the best return on investment (ROI) once graduating from university? </a:t>
+            </a:r>
+          </a:p>
+          <a:p>
+            <a:pPr marL="914400" lvl="2" indent="0">
+              <a:buNone/>
+            </a:pPr>
+            <a:r>
+              <a:rPr lang="en-US" sz="1200" dirty="0">
+                <a:solidFill>
+                  <a:srgbClr val="FFFFFF"/>
+                </a:solidFill>
+              </a:rPr>
+              <a:t>*Assuming you work in the same region after graduating.</a:t>
+            </a:r>
+          </a:p>
+          <a:p>
+            <a:pPr lvl="1"/>
+            <a:r>
+              <a:rPr lang="en-US" sz="2000" dirty="0">
+                <a:solidFill>
+                  <a:srgbClr val="FFFFFF"/>
+                </a:solidFill>
+              </a:rPr>
+              <a:t>Does geographic location of the university have any bearing on the earning potential?</a:t>
+            </a:r>
+          </a:p>
+          <a:p>
+            <a:r>
+              <a:rPr lang="en-US" sz="2000" dirty="0">
+                <a:solidFill>
+                  <a:srgbClr val="FFFFFF"/>
+                </a:solidFill>
+              </a:rPr>
+              <a:t>Does a higher tuition cost guarantee a greater ROI?</a:t>
             </a:r>
           </a:p>
         </p:txBody>
@@ -4250,14 +5215,22 @@
     </p:extLst>
   </p:cSld>
   <p:clrMapOvr>
-    <a:masterClrMapping/>
+    <a:overrideClrMapping bg1="dk1" tx1="lt1" bg2="dk2" tx2="lt2" accent1="accent1" accent2="accent2" accent3="accent3" accent4="accent4" accent5="accent5" accent6="accent6" hlink="hlink" folHlink="folHlink"/>
   </p:clrMapOvr>
 </p:sld>
 </file>
 
-<file path=ppt/slides/slide6.xml><?xml version="1.0" encoding="utf-8"?>
+<file path=ppt/slides/slide5.xml><?xml version="1.0" encoding="utf-8"?>
 <p:sld xmlns:a="http://schemas.openxmlformats.org/drawingml/2006/main" xmlns:r="http://schemas.openxmlformats.org/officeDocument/2006/relationships" xmlns:p="http://schemas.openxmlformats.org/presentationml/2006/main">
   <p:cSld>
+    <p:bg>
+      <p:bgPr>
+        <a:solidFill>
+          <a:schemeClr val="bg1"/>
+        </a:solidFill>
+        <a:effectLst/>
+      </p:bgPr>
+    </p:bg>
     <p:spTree>
       <p:nvGrpSpPr>
         <p:cNvPr id="1" name=""/>
@@ -4274,10 +5247,80 @@
       </p:grpSpPr>
       <p:sp>
         <p:nvSpPr>
+          <p:cNvPr id="23" name="Rectangle 22">
+            <a:extLst>
+              <a:ext uri="{FF2B5EF4-FFF2-40B4-BE49-F238E27FC236}">
+                <a16:creationId xmlns:a16="http://schemas.microsoft.com/office/drawing/2014/main" id="{E8A8EAB8-D2FF-444D-B34B-7D32F106AD0E}"/>
+              </a:ext>
+              <a:ext uri="{C183D7F6-B498-43B3-948B-1728B52AA6E4}">
+                <adec:decorative xmlns:adec="http://schemas.microsoft.com/office/drawing/2017/decorative" val="1"/>
+              </a:ext>
+            </a:extLst>
+          </p:cNvPr>
+          <p:cNvSpPr>
+            <a:spLocks noGrp="1" noRot="1" noChangeAspect="1" noMove="1" noResize="1" noEditPoints="1" noAdjustHandles="1" noChangeArrowheads="1" noChangeShapeType="1" noTextEdit="1"/>
+          </p:cNvSpPr>
+          <p:nvPr>
+            <p:extLst>
+              <p:ext uri="{386F3935-93C4-4BCD-93E2-E3B085C9AB24}">
+                <p16:designElem xmlns:p16="http://schemas.microsoft.com/office/powerpoint/2015/main" val="1"/>
+              </p:ext>
+            </p:extLst>
+          </p:nvPr>
+        </p:nvSpPr>
+        <p:spPr>
+          <a:xfrm>
+            <a:off x="0" y="0"/>
+            <a:ext cx="12192000" cy="6858000"/>
+          </a:xfrm>
+          <a:prstGeom prst="rect">
+            <a:avLst/>
+          </a:prstGeom>
+          <a:solidFill>
+            <a:schemeClr val="tx1">
+              <a:lumMod val="95000"/>
+              <a:lumOff val="5000"/>
+            </a:schemeClr>
+          </a:solidFill>
+          <a:ln>
+            <a:noFill/>
+          </a:ln>
+        </p:spPr>
+        <p:style>
+          <a:lnRef idx="2">
+            <a:schemeClr val="accent1">
+              <a:shade val="50000"/>
+            </a:schemeClr>
+          </a:lnRef>
+          <a:fillRef idx="1">
+            <a:schemeClr val="accent1"/>
+          </a:fillRef>
+          <a:effectRef idx="0">
+            <a:schemeClr val="accent1"/>
+          </a:effectRef>
+          <a:fontRef idx="minor">
+            <a:schemeClr val="lt1"/>
+          </a:fontRef>
+        </p:style>
+        <p:txBody>
+          <a:bodyPr rtlCol="0" anchor="ctr"/>
+          <a:lstStyle/>
+          <a:p>
+            <a:pPr algn="ctr"/>
+            <a:endParaRPr lang="en-US" dirty="0">
+              <a:solidFill>
+                <a:schemeClr val="bg1"/>
+              </a:solidFill>
+            </a:endParaRPr>
+          </a:p>
+        </p:txBody>
+      </p:sp>
+      <p:sp>
+        <p:nvSpPr>
           <p:cNvPr id="2" name="Title 1">
             <a:extLst>
               <a:ext uri="{FF2B5EF4-FFF2-40B4-BE49-F238E27FC236}">
-                <a16:creationId xmlns:a16="http://schemas.microsoft.com/office/drawing/2014/main" id="{25FCE990-6391-4ED0-AA3E-F60033CDC1F6}"/>
+                <a16:creationId xmlns:a16="http://schemas.microsoft.com/office/drawing/2014/main" id="{181F20A9-D433-488F-BDE3-8E3D97A39781}"/>
               </a:ext>
             </a:extLst>
           </p:cNvPr>
@@ -4288,24 +5331,87 @@
             <p:ph type="title"/>
           </p:nvPr>
         </p:nvSpPr>
-        <p:spPr/>
-        <p:txBody>
-          <a:bodyPr/>
-          <a:lstStyle/>
-          <a:p>
-            <a:r>
-              <a:rPr lang="en-US" dirty="0"/>
-              <a:t>Questions &amp; Data</a:t>
-            </a:r>
-          </a:p>
-        </p:txBody>
-      </p:sp>
-      <p:sp>
-        <p:nvSpPr>
-          <p:cNvPr id="3" name="Content Placeholder 2">
-            <a:extLst>
-              <a:ext uri="{FF2B5EF4-FFF2-40B4-BE49-F238E27FC236}">
-                <a16:creationId xmlns:a16="http://schemas.microsoft.com/office/drawing/2014/main" id="{2DA9D7A0-008E-4687-BEF4-59BB76315294}"/>
+        <p:spPr>
+          <a:xfrm>
+            <a:off x="838200" y="448721"/>
+            <a:ext cx="4707671" cy="1225650"/>
+          </a:xfrm>
+        </p:spPr>
+        <p:txBody>
+          <a:bodyPr vert="horz" lIns="91440" tIns="45720" rIns="91440" bIns="45720" rtlCol="0" anchor="b">
+            <a:normAutofit/>
+          </a:bodyPr>
+          <a:lstStyle/>
+          <a:p>
+            <a:r>
+              <a:rPr lang="en-US" sz="3800">
+                <a:solidFill>
+                  <a:schemeClr val="bg1"/>
+                </a:solidFill>
+              </a:rPr>
+              <a:t>Data Exploration</a:t>
+            </a:r>
+          </a:p>
+        </p:txBody>
+      </p:sp>
+      <p:cxnSp>
+        <p:nvCxnSpPr>
+          <p:cNvPr id="25" name="Straight Connector 24">
+            <a:extLst>
+              <a:ext uri="{FF2B5EF4-FFF2-40B4-BE49-F238E27FC236}">
+                <a16:creationId xmlns:a16="http://schemas.microsoft.com/office/drawing/2014/main" id="{EEA38897-7BA3-4408-8083-3235339C4A60}"/>
+              </a:ext>
+              <a:ext uri="{C183D7F6-B498-43B3-948B-1728B52AA6E4}">
+                <adec:decorative xmlns:adec="http://schemas.microsoft.com/office/drawing/2017/decorative" val="1"/>
+              </a:ext>
+            </a:extLst>
+          </p:cNvPr>
+          <p:cNvCxnSpPr>
+            <a:cxnSpLocks noGrp="1" noRot="1" noChangeAspect="1" noMove="1" noResize="1" noEditPoints="1" noAdjustHandles="1" noChangeArrowheads="1" noChangeShapeType="1"/>
+          </p:cNvCxnSpPr>
+          <p:nvPr>
+            <p:extLst>
+              <p:ext uri="{386F3935-93C4-4BCD-93E2-E3B085C9AB24}">
+                <p16:designElem xmlns:p16="http://schemas.microsoft.com/office/powerpoint/2015/main" val="1"/>
+              </p:ext>
+            </p:extLst>
+          </p:nvPr>
+        </p:nvCxnSpPr>
+        <p:spPr>
+          <a:xfrm flipH="1">
+            <a:off x="831873" y="1749756"/>
+            <a:ext cx="4718304" cy="0"/>
+          </a:xfrm>
+          <a:prstGeom prst="line">
+            <a:avLst/>
+          </a:prstGeom>
+          <a:ln w="12700">
+            <a:solidFill>
+              <a:schemeClr val="accent2"/>
+            </a:solidFill>
+          </a:ln>
+        </p:spPr>
+        <p:style>
+          <a:lnRef idx="1">
+            <a:schemeClr val="accent1"/>
+          </a:lnRef>
+          <a:fillRef idx="0">
+            <a:schemeClr val="accent1"/>
+          </a:fillRef>
+          <a:effectRef idx="0">
+            <a:schemeClr val="accent1"/>
+          </a:effectRef>
+          <a:fontRef idx="minor">
+            <a:schemeClr val="tx1"/>
+          </a:fontRef>
+        </p:style>
+      </p:cxnSp>
+      <p:sp>
+        <p:nvSpPr>
+          <p:cNvPr id="15" name="Content Placeholder 14">
+            <a:extLst>
+              <a:ext uri="{FF2B5EF4-FFF2-40B4-BE49-F238E27FC236}">
+                <a16:creationId xmlns:a16="http://schemas.microsoft.com/office/drawing/2014/main" id="{27DEA384-A959-464F-AEBB-586FF88DA4DF}"/>
               </a:ext>
             </a:extLst>
           </p:cNvPr>
@@ -4316,62 +5422,146 @@
             <p:ph idx="1"/>
           </p:nvPr>
         </p:nvSpPr>
-        <p:spPr/>
-        <p:txBody>
-          <a:bodyPr/>
-          <a:lstStyle/>
-          <a:p>
-            <a:r>
-              <a:rPr lang="en-US" dirty="0"/>
-              <a:t>Data that is needed to satisfy the questions:</a:t>
-            </a:r>
-          </a:p>
-          <a:p>
-            <a:pPr lvl="1"/>
-            <a:r>
-              <a:rPr lang="en-US" dirty="0"/>
-              <a:t>Empirical verifiable information from reliable sources.</a:t>
-            </a:r>
-          </a:p>
-          <a:p>
-            <a:pPr lvl="1"/>
-            <a:r>
-              <a:rPr lang="en-US" dirty="0"/>
-              <a:t>Bureau of labor statistics to satisfy salary information</a:t>
-            </a:r>
-          </a:p>
-          <a:p>
-            <a:pPr lvl="1"/>
-            <a:r>
-              <a:rPr lang="en-US" dirty="0"/>
-              <a:t>Statistical collected data for university tuition, excluding room/board, financial aid, debt, books &amp; fees</a:t>
-            </a:r>
-          </a:p>
-          <a:p>
-            <a:pPr lvl="1"/>
-            <a:r>
-              <a:rPr lang="en-US" dirty="0"/>
-              <a:t>Assumptions that the degree will only take 4 years to complete (</a:t>
-            </a:r>
-            <a:r>
-              <a:rPr lang="en-US" dirty="0">
-                <a:highlight>
-                  <a:srgbClr val="FFFF00"/>
-                </a:highlight>
+        <p:spPr>
+          <a:xfrm>
+            <a:off x="897769" y="1909192"/>
+            <a:ext cx="4586513" cy="3647710"/>
+          </a:xfrm>
+        </p:spPr>
+        <p:txBody>
+          <a:bodyPr>
+            <a:normAutofit/>
+          </a:bodyPr>
+          <a:lstStyle/>
+          <a:p>
+            <a:pPr marL="0" indent="0">
+              <a:buNone/>
+            </a:pPr>
+            <a:r>
+              <a:rPr lang="en-US" sz="2000" dirty="0">
+                <a:solidFill>
+                  <a:schemeClr val="bg1"/>
+                </a:solidFill>
               </a:rPr>
-              <a:t>I found research that 80% of degree seeking individuals takes an average of 6 years, so need to specify that this is only for 4 years, the additional years increases the tuition cost</a:t>
-            </a:r>
-            <a:r>
-              <a:rPr lang="en-US" dirty="0"/>
-              <a:t>)</a:t>
-            </a:r>
-          </a:p>
-        </p:txBody>
-      </p:sp>
+              <a:t>We searched major sites (e.g. Bureau of Labor Statistics, Kaggle, PayScale, etc.) to gather data related to higher education. Specifically utilizing sources that included entry-level median salary, cost of tuition, and states/region. Overall, we wanted to focus on what universities would have the best return on investment (ROI) compared to tuition costs.</a:t>
+            </a:r>
+          </a:p>
+          <a:p>
+            <a:pPr marL="0" indent="0">
+              <a:buNone/>
+            </a:pPr>
+            <a:r>
+              <a:rPr lang="en-US" sz="1400" dirty="0">
+                <a:solidFill>
+                  <a:schemeClr val="bg1"/>
+                </a:solidFill>
+              </a:rPr>
+              <a:t>*Sources are listed on slide 10</a:t>
+            </a:r>
+          </a:p>
+        </p:txBody>
+      </p:sp>
+      <p:cxnSp>
+        <p:nvCxnSpPr>
+          <p:cNvPr id="27" name="Straight Connector 26">
+            <a:extLst>
+              <a:ext uri="{FF2B5EF4-FFF2-40B4-BE49-F238E27FC236}">
+                <a16:creationId xmlns:a16="http://schemas.microsoft.com/office/drawing/2014/main" id="{F11AD06B-AB20-4097-8606-5DA00DBACE88}"/>
+              </a:ext>
+              <a:ext uri="{C183D7F6-B498-43B3-948B-1728B52AA6E4}">
+                <adec:decorative xmlns:adec="http://schemas.microsoft.com/office/drawing/2017/decorative" val="1"/>
+              </a:ext>
+            </a:extLst>
+          </p:cNvPr>
+          <p:cNvCxnSpPr>
+            <a:cxnSpLocks noGrp="1" noRot="1" noChangeAspect="1" noMove="1" noResize="1" noEditPoints="1" noAdjustHandles="1" noChangeArrowheads="1" noChangeShapeType="1"/>
+          </p:cNvCxnSpPr>
+          <p:nvPr>
+            <p:extLst>
+              <p:ext uri="{386F3935-93C4-4BCD-93E2-E3B085C9AB24}">
+                <p16:designElem xmlns:p16="http://schemas.microsoft.com/office/powerpoint/2015/main" val="1"/>
+              </p:ext>
+            </p:extLst>
+          </p:nvPr>
+        </p:nvCxnSpPr>
+        <p:spPr>
+          <a:xfrm flipH="1">
+            <a:off x="834027" y="5707672"/>
+            <a:ext cx="4713997" cy="0"/>
+          </a:xfrm>
+          <a:prstGeom prst="line">
+            <a:avLst/>
+          </a:prstGeom>
+          <a:ln w="12700">
+            <a:solidFill>
+              <a:schemeClr val="accent2"/>
+            </a:solidFill>
+          </a:ln>
+        </p:spPr>
+        <p:style>
+          <a:lnRef idx="1">
+            <a:schemeClr val="accent1"/>
+          </a:lnRef>
+          <a:fillRef idx="0">
+            <a:schemeClr val="accent1"/>
+          </a:fillRef>
+          <a:effectRef idx="0">
+            <a:schemeClr val="accent1"/>
+          </a:effectRef>
+          <a:fontRef idx="minor">
+            <a:schemeClr val="tx1"/>
+          </a:fontRef>
+        </p:style>
+      </p:cxnSp>
+      <p:pic>
+        <p:nvPicPr>
+          <p:cNvPr id="4" name="Picture 2" descr="Mind the (trust) gap: winning back confidence with data management ...">
+            <a:extLst>
+              <a:ext uri="{FF2B5EF4-FFF2-40B4-BE49-F238E27FC236}">
+                <a16:creationId xmlns:a16="http://schemas.microsoft.com/office/drawing/2014/main" id="{63E85D1E-1B8A-41E6-9B3D-BF1BBA49F181}"/>
+              </a:ext>
+            </a:extLst>
+          </p:cNvPr>
+          <p:cNvPicPr>
+            <a:picLocks noChangeAspect="1" noChangeArrowheads="1"/>
+          </p:cNvPicPr>
+          <p:nvPr/>
+        </p:nvPicPr>
+        <p:blipFill rotWithShape="1">
+          <a:blip r:embed="rId2">
+            <a:extLst>
+              <a:ext uri="{28A0092B-C50C-407E-A947-70E740481C1C}">
+                <a14:useLocalDpi xmlns:a14="http://schemas.microsoft.com/office/drawing/2010/main" val="0"/>
+              </a:ext>
+            </a:extLst>
+          </a:blip>
+          <a:srcRect l="12680" r="32373"/>
+          <a:stretch/>
+        </p:blipFill>
+        <p:spPr bwMode="auto">
+          <a:xfrm>
+            <a:off x="6525453" y="10"/>
+            <a:ext cx="5666547" cy="6857990"/>
+          </a:xfrm>
+          <a:prstGeom prst="rect">
+            <a:avLst/>
+          </a:prstGeom>
+          <a:noFill/>
+          <a:extLst>
+            <a:ext uri="{909E8E84-426E-40DD-AFC4-6F175D3DCCD1}">
+              <a14:hiddenFill xmlns:a14="http://schemas.microsoft.com/office/drawing/2010/main">
+                <a:solidFill>
+                  <a:srgbClr val="FFFFFF"/>
+                </a:solidFill>
+              </a14:hiddenFill>
+            </a:ext>
+          </a:extLst>
+        </p:spPr>
+      </p:pic>
     </p:spTree>
     <p:extLst>
       <p:ext uri="{BB962C8B-B14F-4D97-AF65-F5344CB8AC3E}">
-        <p14:creationId xmlns:p14="http://schemas.microsoft.com/office/powerpoint/2010/main" val="3838206852"/>
+        <p14:creationId xmlns:p14="http://schemas.microsoft.com/office/powerpoint/2010/main" val="3994787966"/>
       </p:ext>
     </p:extLst>
   </p:cSld>
@@ -4381,9 +5571,17 @@
 </p:sld>
 </file>
 
-<file path=ppt/slides/slide7.xml><?xml version="1.0" encoding="utf-8"?>
+<file path=ppt/slides/slide6.xml><?xml version="1.0" encoding="utf-8"?>
 <p:sld xmlns:a="http://schemas.openxmlformats.org/drawingml/2006/main" xmlns:r="http://schemas.openxmlformats.org/officeDocument/2006/relationships" xmlns:p="http://schemas.openxmlformats.org/presentationml/2006/main">
   <p:cSld>
+    <p:bg>
+      <p:bgPr>
+        <a:solidFill>
+          <a:schemeClr val="bg1"/>
+        </a:solidFill>
+        <a:effectLst/>
+      </p:bgPr>
+    </p:bg>
     <p:spTree>
       <p:nvGrpSpPr>
         <p:cNvPr id="1" name=""/>
@@ -4400,10 +5598,119 @@
       </p:grpSpPr>
       <p:sp>
         <p:nvSpPr>
+          <p:cNvPr id="71" name="Rectangle 70">
+            <a:extLst>
+              <a:ext uri="{FF2B5EF4-FFF2-40B4-BE49-F238E27FC236}">
+                <a16:creationId xmlns:a16="http://schemas.microsoft.com/office/drawing/2014/main" id="{C5E6CFF1-2F42-4E10-9A97-F116F46F53FE}"/>
+              </a:ext>
+              <a:ext uri="{C183D7F6-B498-43B3-948B-1728B52AA6E4}">
+                <adec:decorative xmlns:adec="http://schemas.microsoft.com/office/drawing/2017/decorative" val="1"/>
+              </a:ext>
+            </a:extLst>
+          </p:cNvPr>
+          <p:cNvSpPr>
+            <a:spLocks noGrp="1" noRot="1" noChangeAspect="1" noMove="1" noResize="1" noEditPoints="1" noAdjustHandles="1" noChangeArrowheads="1" noChangeShapeType="1" noTextEdit="1"/>
+          </p:cNvSpPr>
+          <p:nvPr>
+            <p:extLst>
+              <p:ext uri="{386F3935-93C4-4BCD-93E2-E3B085C9AB24}">
+                <p16:designElem xmlns:p16="http://schemas.microsoft.com/office/powerpoint/2015/main" val="1"/>
+              </p:ext>
+            </p:extLst>
+          </p:nvPr>
+        </p:nvSpPr>
+        <p:spPr>
+          <a:xfrm>
+            <a:off x="0" y="0"/>
+            <a:ext cx="12192000" cy="6858000"/>
+          </a:xfrm>
+          <a:prstGeom prst="rect">
+            <a:avLst/>
+          </a:prstGeom>
+          <a:solidFill>
+            <a:srgbClr val="000000"/>
+          </a:solidFill>
+          <a:ln>
+            <a:noFill/>
+          </a:ln>
+        </p:spPr>
+        <p:style>
+          <a:lnRef idx="2">
+            <a:schemeClr val="accent1">
+              <a:shade val="50000"/>
+            </a:schemeClr>
+          </a:lnRef>
+          <a:fillRef idx="1">
+            <a:schemeClr val="accent1"/>
+          </a:fillRef>
+          <a:effectRef idx="0">
+            <a:schemeClr val="accent1"/>
+          </a:effectRef>
+          <a:fontRef idx="minor">
+            <a:schemeClr val="lt1"/>
+          </a:fontRef>
+        </p:style>
+        <p:txBody>
+          <a:bodyPr rtlCol="0" anchor="ctr"/>
+          <a:lstStyle/>
+          <a:p>
+            <a:pPr algn="ctr"/>
+            <a:endParaRPr lang="en-US"/>
+          </a:p>
+        </p:txBody>
+      </p:sp>
+      <p:pic>
+        <p:nvPicPr>
+          <p:cNvPr id="5122" name="Picture 2" descr="Mind the (trust) gap: winning back confidence with data management ...">
+            <a:extLst>
+              <a:ext uri="{FF2B5EF4-FFF2-40B4-BE49-F238E27FC236}">
+                <a16:creationId xmlns:a16="http://schemas.microsoft.com/office/drawing/2014/main" id="{BB7B0CB6-2003-4187-AA14-50ED95FDE9C8}"/>
+              </a:ext>
+            </a:extLst>
+          </p:cNvPr>
+          <p:cNvPicPr>
+            <a:picLocks noChangeAspect="1" noChangeArrowheads="1"/>
+          </p:cNvPicPr>
+          <p:nvPr/>
+        </p:nvPicPr>
+        <p:blipFill rotWithShape="1">
+          <a:blip r:embed="rId2">
+            <a:alphaModFix amt="35000"/>
+            <a:extLst>
+              <a:ext uri="{28A0092B-C50C-407E-A947-70E740481C1C}">
+                <a14:useLocalDpi xmlns:a14="http://schemas.microsoft.com/office/drawing/2010/main" val="0"/>
+              </a:ext>
+            </a:extLst>
+          </a:blip>
+          <a:srcRect t="3461" b="11953"/>
+          <a:stretch/>
+        </p:blipFill>
+        <p:spPr bwMode="auto">
+          <a:xfrm>
+            <a:off x="20" y="1"/>
+            <a:ext cx="12191980" cy="6857999"/>
+          </a:xfrm>
+          <a:prstGeom prst="rect">
+            <a:avLst/>
+          </a:prstGeom>
+          <a:noFill/>
+          <a:extLst>
+            <a:ext uri="{909E8E84-426E-40DD-AFC4-6F175D3DCCD1}">
+              <a14:hiddenFill xmlns:a14="http://schemas.microsoft.com/office/drawing/2010/main">
+                <a:solidFill>
+                  <a:srgbClr val="FFFFFF"/>
+                </a:solidFill>
+              </a14:hiddenFill>
+            </a:ext>
+          </a:extLst>
+        </p:spPr>
+      </p:pic>
+      <p:sp>
+        <p:nvSpPr>
           <p:cNvPr id="2" name="Title 1">
             <a:extLst>
               <a:ext uri="{FF2B5EF4-FFF2-40B4-BE49-F238E27FC236}">
-                <a16:creationId xmlns:a16="http://schemas.microsoft.com/office/drawing/2014/main" id="{EAF6C44D-BC17-40A4-9FDC-253B8A47ACF4}"/>
+                <a16:creationId xmlns:a16="http://schemas.microsoft.com/office/drawing/2014/main" id="{C9232FF0-DBD0-4B39-A0FA-BCD149C271AF}"/>
               </a:ext>
             </a:extLst>
           </p:cNvPr>
@@ -4414,24 +5721,88 @@
             <p:ph type="title"/>
           </p:nvPr>
         </p:nvSpPr>
-        <p:spPr/>
-        <p:txBody>
-          <a:bodyPr/>
-          <a:lstStyle/>
-          <a:p>
-            <a:r>
-              <a:rPr lang="en-US" dirty="0"/>
-              <a:t>Data Analysis</a:t>
-            </a:r>
-          </a:p>
-        </p:txBody>
-      </p:sp>
+        <p:spPr>
+          <a:xfrm>
+            <a:off x="838201" y="1065862"/>
+            <a:ext cx="3313164" cy="4726276"/>
+          </a:xfrm>
+        </p:spPr>
+        <p:txBody>
+          <a:bodyPr>
+            <a:normAutofit/>
+          </a:bodyPr>
+          <a:lstStyle/>
+          <a:p>
+            <a:pPr algn="r"/>
+            <a:r>
+              <a:rPr lang="en-US" dirty="0">
+                <a:solidFill>
+                  <a:srgbClr val="FFFFFF"/>
+                </a:solidFill>
+              </a:rPr>
+              <a:t>Process: Exploration &amp; Cleanup</a:t>
+            </a:r>
+          </a:p>
+        </p:txBody>
+      </p:sp>
+      <p:cxnSp>
+        <p:nvCxnSpPr>
+          <p:cNvPr id="73" name="Straight Connector 72">
+            <a:extLst>
+              <a:ext uri="{FF2B5EF4-FFF2-40B4-BE49-F238E27FC236}">
+                <a16:creationId xmlns:a16="http://schemas.microsoft.com/office/drawing/2014/main" id="{67182200-4859-4C8D-BCBB-55B245C28BA3}"/>
+              </a:ext>
+              <a:ext uri="{C183D7F6-B498-43B3-948B-1728B52AA6E4}">
+                <adec:decorative xmlns:adec="http://schemas.microsoft.com/office/drawing/2017/decorative" val="1"/>
+              </a:ext>
+            </a:extLst>
+          </p:cNvPr>
+          <p:cNvCxnSpPr>
+            <a:cxnSpLocks noGrp="1" noRot="1" noChangeAspect="1" noMove="1" noResize="1" noEditPoints="1" noAdjustHandles="1" noChangeArrowheads="1" noChangeShapeType="1"/>
+          </p:cNvCxnSpPr>
+          <p:nvPr>
+            <p:extLst>
+              <p:ext uri="{386F3935-93C4-4BCD-93E2-E3B085C9AB24}">
+                <p16:designElem xmlns:p16="http://schemas.microsoft.com/office/powerpoint/2015/main" val="1"/>
+              </p:ext>
+            </p:extLst>
+          </p:nvPr>
+        </p:nvCxnSpPr>
+        <p:spPr>
+          <a:xfrm>
+            <a:off x="4653372" y="2286000"/>
+            <a:ext cx="0" cy="2286000"/>
+          </a:xfrm>
+          <a:prstGeom prst="line">
+            <a:avLst/>
+          </a:prstGeom>
+          <a:ln w="15875">
+            <a:solidFill>
+              <a:srgbClr val="FFFFFF"/>
+            </a:solidFill>
+          </a:ln>
+        </p:spPr>
+        <p:style>
+          <a:lnRef idx="1">
+            <a:schemeClr val="accent1"/>
+          </a:lnRef>
+          <a:fillRef idx="0">
+            <a:schemeClr val="accent1"/>
+          </a:fillRef>
+          <a:effectRef idx="0">
+            <a:schemeClr val="accent1"/>
+          </a:effectRef>
+          <a:fontRef idx="minor">
+            <a:schemeClr val="tx1"/>
+          </a:fontRef>
+        </p:style>
+      </p:cxnSp>
       <p:sp>
         <p:nvSpPr>
           <p:cNvPr id="3" name="Content Placeholder 2">
             <a:extLst>
               <a:ext uri="{FF2B5EF4-FFF2-40B4-BE49-F238E27FC236}">
-                <a16:creationId xmlns:a16="http://schemas.microsoft.com/office/drawing/2014/main" id="{1844F5F8-01AC-4FBD-BCEC-CF00FA1459B7}"/>
+                <a16:creationId xmlns:a16="http://schemas.microsoft.com/office/drawing/2014/main" id="{54C2AC38-6127-4DC9-A60E-4EFEB3B60542}"/>
               </a:ext>
             </a:extLst>
           </p:cNvPr>
@@ -4442,72 +5813,139 @@
             <p:ph idx="1"/>
           </p:nvPr>
         </p:nvSpPr>
-        <p:spPr/>
-        <p:txBody>
-          <a:bodyPr/>
-          <a:lstStyle/>
-          <a:p>
-            <a:r>
-              <a:rPr lang="en-US" dirty="0">
+        <p:spPr>
+          <a:xfrm>
+            <a:off x="5155379" y="1065862"/>
+            <a:ext cx="5744685" cy="4726276"/>
+          </a:xfrm>
+        </p:spPr>
+        <p:txBody>
+          <a:bodyPr anchor="ctr">
+            <a:normAutofit/>
+          </a:bodyPr>
+          <a:lstStyle/>
+          <a:p>
+            <a:r>
+              <a:rPr lang="en-US" sz="1200" dirty="0"/>
+              <a:t>Data that is needed to satisfy the questions:</a:t>
+            </a:r>
+          </a:p>
+          <a:p>
+            <a:pPr lvl="1"/>
+            <a:r>
+              <a:rPr lang="en-US" sz="1200" dirty="0"/>
+              <a:t>Empirical verifiable information from reliable sources.</a:t>
+            </a:r>
+          </a:p>
+          <a:p>
+            <a:pPr lvl="1"/>
+            <a:r>
+              <a:rPr lang="en-US" sz="1200" dirty="0"/>
+              <a:t>Bureau of labor statistics to satisfy salary information</a:t>
+            </a:r>
+          </a:p>
+          <a:p>
+            <a:pPr lvl="1"/>
+            <a:r>
+              <a:rPr lang="en-US" sz="1200" dirty="0"/>
+              <a:t>Statistical collected data for university tuition, excluding room/board, financial aid, debt, books &amp; fees</a:t>
+            </a:r>
+          </a:p>
+          <a:p>
+            <a:pPr lvl="1"/>
+            <a:r>
+              <a:rPr lang="en-US" sz="1200" dirty="0"/>
+              <a:t>Assumptions that the degree will only take 4 years to complete (</a:t>
+            </a:r>
+            <a:r>
+              <a:rPr lang="en-US" sz="1200" dirty="0">
+                <a:solidFill>
+                  <a:schemeClr val="bg1"/>
+                </a:solidFill>
                 <a:highlight>
                   <a:srgbClr val="FFFF00"/>
                 </a:highlight>
               </a:rPr>
-              <a:t>Will complete once we populate with information gleaned from our research.</a:t>
-            </a:r>
-          </a:p>
-          <a:p>
-            <a:r>
-              <a:rPr lang="en-US" dirty="0">
-                <a:highlight>
-                  <a:srgbClr val="FFFF00"/>
-                </a:highlight>
+              <a:t>I found research that 80% of degree seeking individuals takes an average of 6 years, so need to specify that this is only for 4 years, the additional years increases the tuition cost</a:t>
+            </a:r>
+            <a:r>
+              <a:rPr lang="en-US" sz="1200" dirty="0">
+                <a:solidFill>
+                  <a:schemeClr val="bg1"/>
+                </a:solidFill>
               </a:rPr>
-              <a:t>How did we clean up the data?</a:t>
-            </a:r>
-          </a:p>
-          <a:p>
-            <a:endParaRPr lang="en-US" dirty="0">
-              <a:highlight>
-                <a:srgbClr val="FFFF00"/>
-              </a:highlight>
+              <a:t>)</a:t>
+            </a:r>
+          </a:p>
+          <a:p>
+            <a:endParaRPr lang="en-US" sz="2000" dirty="0">
+              <a:solidFill>
+                <a:srgbClr val="FFFFFF"/>
+              </a:solidFill>
             </a:endParaRPr>
           </a:p>
-          <a:p>
-            <a:endParaRPr lang="en-US" dirty="0">
-              <a:highlight>
-                <a:srgbClr val="FFFF00"/>
-              </a:highlight>
-            </a:endParaRPr>
-          </a:p>
-          <a:p>
-            <a:pPr marL="0" indent="0">
-              <a:buNone/>
-            </a:pPr>
-            <a:endParaRPr lang="en-US" dirty="0">
-              <a:highlight>
-                <a:srgbClr val="FFFF00"/>
-              </a:highlight>
-            </a:endParaRPr>
-          </a:p>
-        </p:txBody>
-      </p:sp>
+        </p:txBody>
+      </p:sp>
+      <p:pic>
+        <p:nvPicPr>
+          <p:cNvPr id="7" name="Picture 6" descr="A screenshot of a cell phone&#10;&#10;Description automatically generated">
+            <a:extLst>
+              <a:ext uri="{FF2B5EF4-FFF2-40B4-BE49-F238E27FC236}">
+                <a16:creationId xmlns:a16="http://schemas.microsoft.com/office/drawing/2014/main" id="{F65D658E-FF37-4B75-A5CA-318F70D959F3}"/>
+              </a:ext>
+            </a:extLst>
+          </p:cNvPr>
+          <p:cNvPicPr>
+            <a:picLocks noChangeAspect="1"/>
+          </p:cNvPicPr>
+          <p:nvPr/>
+        </p:nvPicPr>
+        <p:blipFill>
+          <a:blip r:embed="rId3">
+            <a:extLst>
+              <a:ext uri="{28A0092B-C50C-407E-A947-70E740481C1C}">
+                <a14:useLocalDpi xmlns:a14="http://schemas.microsoft.com/office/drawing/2010/main" val="0"/>
+              </a:ext>
+            </a:extLst>
+          </a:blip>
+          <a:stretch>
+            <a:fillRect/>
+          </a:stretch>
+        </p:blipFill>
+        <p:spPr>
+          <a:xfrm>
+            <a:off x="4151365" y="4795837"/>
+            <a:ext cx="6353175" cy="1838325"/>
+          </a:xfrm>
+          <a:prstGeom prst="rect">
+            <a:avLst/>
+          </a:prstGeom>
+        </p:spPr>
+      </p:pic>
     </p:spTree>
     <p:extLst>
       <p:ext uri="{BB962C8B-B14F-4D97-AF65-F5344CB8AC3E}">
-        <p14:creationId xmlns:p14="http://schemas.microsoft.com/office/powerpoint/2010/main" val="1024695393"/>
+        <p14:creationId xmlns:p14="http://schemas.microsoft.com/office/powerpoint/2010/main" val="3351601689"/>
       </p:ext>
     </p:extLst>
   </p:cSld>
   <p:clrMapOvr>
-    <a:masterClrMapping/>
+    <a:overrideClrMapping bg1="dk1" tx1="lt1" bg2="dk2" tx2="lt2" accent1="accent1" accent2="accent2" accent3="accent3" accent4="accent4" accent5="accent5" accent6="accent6" hlink="hlink" folHlink="folHlink"/>
   </p:clrMapOvr>
 </p:sld>
 </file>
 
-<file path=ppt/slides/slide8.xml><?xml version="1.0" encoding="utf-8"?>
+<file path=ppt/slides/slide7.xml><?xml version="1.0" encoding="utf-8"?>
 <p:sld xmlns:a="http://schemas.openxmlformats.org/drawingml/2006/main" xmlns:r="http://schemas.openxmlformats.org/officeDocument/2006/relationships" xmlns:p="http://schemas.openxmlformats.org/presentationml/2006/main">
   <p:cSld>
+    <p:bg>
+      <p:bgPr>
+        <a:solidFill>
+          <a:schemeClr val="bg1"/>
+        </a:solidFill>
+        <a:effectLst/>
+      </p:bgPr>
+    </p:bg>
     <p:spTree>
       <p:nvGrpSpPr>
         <p:cNvPr id="1" name=""/>
@@ -4524,9 +5962,582 @@
       </p:grpSpPr>
       <p:sp>
         <p:nvSpPr>
+          <p:cNvPr id="135" name="Rectangle 134">
+            <a:extLst>
+              <a:ext uri="{FF2B5EF4-FFF2-40B4-BE49-F238E27FC236}">
+                <a16:creationId xmlns:a16="http://schemas.microsoft.com/office/drawing/2014/main" id="{C5E6CFF1-2F42-4E10-9A97-F116F46F53FE}"/>
+              </a:ext>
+              <a:ext uri="{C183D7F6-B498-43B3-948B-1728B52AA6E4}">
+                <adec:decorative xmlns:adec="http://schemas.microsoft.com/office/drawing/2017/decorative" val="1"/>
+              </a:ext>
+            </a:extLst>
+          </p:cNvPr>
+          <p:cNvSpPr>
+            <a:spLocks noGrp="1" noRot="1" noChangeAspect="1" noMove="1" noResize="1" noEditPoints="1" noAdjustHandles="1" noChangeArrowheads="1" noChangeShapeType="1" noTextEdit="1"/>
+          </p:cNvSpPr>
+          <p:nvPr>
+            <p:extLst>
+              <p:ext uri="{386F3935-93C4-4BCD-93E2-E3B085C9AB24}">
+                <p16:designElem xmlns:p16="http://schemas.microsoft.com/office/powerpoint/2015/main" val="1"/>
+              </p:ext>
+            </p:extLst>
+          </p:nvPr>
+        </p:nvSpPr>
+        <p:spPr>
+          <a:xfrm>
+            <a:off x="0" y="0"/>
+            <a:ext cx="12192000" cy="6858000"/>
+          </a:xfrm>
+          <a:prstGeom prst="rect">
+            <a:avLst/>
+          </a:prstGeom>
+          <a:solidFill>
+            <a:srgbClr val="000000"/>
+          </a:solidFill>
+          <a:ln>
+            <a:noFill/>
+          </a:ln>
+        </p:spPr>
+        <p:style>
+          <a:lnRef idx="2">
+            <a:schemeClr val="accent1">
+              <a:shade val="50000"/>
+            </a:schemeClr>
+          </a:lnRef>
+          <a:fillRef idx="1">
+            <a:schemeClr val="accent1"/>
+          </a:fillRef>
+          <a:effectRef idx="0">
+            <a:schemeClr val="accent1"/>
+          </a:effectRef>
+          <a:fontRef idx="minor">
+            <a:schemeClr val="lt1"/>
+          </a:fontRef>
+        </p:style>
+        <p:txBody>
+          <a:bodyPr rtlCol="0" anchor="ctr"/>
+          <a:lstStyle/>
+          <a:p>
+            <a:pPr algn="ctr"/>
+            <a:endParaRPr lang="en-US"/>
+          </a:p>
+        </p:txBody>
+      </p:sp>
+      <p:pic>
+        <p:nvPicPr>
+          <p:cNvPr id="6146" name="Picture 2" descr="Mind the (trust) gap: winning back confidence with data management ...">
+            <a:extLst>
+              <a:ext uri="{FF2B5EF4-FFF2-40B4-BE49-F238E27FC236}">
+                <a16:creationId xmlns:a16="http://schemas.microsoft.com/office/drawing/2014/main" id="{3E75F822-C83E-4340-BCE8-5192492665F6}"/>
+              </a:ext>
+            </a:extLst>
+          </p:cNvPr>
+          <p:cNvPicPr>
+            <a:picLocks noChangeAspect="1" noChangeArrowheads="1"/>
+          </p:cNvPicPr>
+          <p:nvPr/>
+        </p:nvPicPr>
+        <p:blipFill rotWithShape="1">
+          <a:blip r:embed="rId2">
+            <a:alphaModFix amt="35000"/>
+            <a:extLst>
+              <a:ext uri="{28A0092B-C50C-407E-A947-70E740481C1C}">
+                <a14:useLocalDpi xmlns:a14="http://schemas.microsoft.com/office/drawing/2010/main" val="0"/>
+              </a:ext>
+            </a:extLst>
+          </a:blip>
+          <a:srcRect t="3461" b="11953"/>
+          <a:stretch/>
+        </p:blipFill>
+        <p:spPr bwMode="auto">
+          <a:xfrm>
+            <a:off x="20" y="10"/>
+            <a:ext cx="12191979" cy="6857990"/>
+          </a:xfrm>
+          <a:prstGeom prst="rect">
+            <a:avLst/>
+          </a:prstGeom>
+          <a:noFill/>
+          <a:extLst>
+            <a:ext uri="{909E8E84-426E-40DD-AFC4-6F175D3DCCD1}">
+              <a14:hiddenFill xmlns:a14="http://schemas.microsoft.com/office/drawing/2010/main">
+                <a:solidFill>
+                  <a:srgbClr val="FFFFFF"/>
+                </a:solidFill>
+              </a14:hiddenFill>
+            </a:ext>
+          </a:extLst>
+        </p:spPr>
+      </p:pic>
+      <p:sp>
+        <p:nvSpPr>
           <p:cNvPr id="2" name="Title 1">
             <a:extLst>
               <a:ext uri="{FF2B5EF4-FFF2-40B4-BE49-F238E27FC236}">
+                <a16:creationId xmlns:a16="http://schemas.microsoft.com/office/drawing/2014/main" id="{C115CA3D-B20C-4B81-BDF1-C091E08FB8DC}"/>
+              </a:ext>
+            </a:extLst>
+          </p:cNvPr>
+          <p:cNvSpPr>
+            <a:spLocks noGrp="1"/>
+          </p:cNvSpPr>
+          <p:nvPr>
+            <p:ph type="title"/>
+          </p:nvPr>
+        </p:nvSpPr>
+        <p:spPr>
+          <a:xfrm>
+            <a:off x="655218" y="153567"/>
+            <a:ext cx="7996307" cy="1410052"/>
+          </a:xfrm>
+        </p:spPr>
+        <p:txBody>
+          <a:bodyPr>
+            <a:normAutofit/>
+          </a:bodyPr>
+          <a:lstStyle/>
+          <a:p>
+            <a:pPr algn="r"/>
+            <a:r>
+              <a:rPr lang="en-US" sz="4000" dirty="0">
+                <a:solidFill>
+                  <a:srgbClr val="FFFFFF"/>
+                </a:solidFill>
+              </a:rPr>
+              <a:t>Process: Analysis</a:t>
+            </a:r>
+          </a:p>
+        </p:txBody>
+      </p:sp>
+      <p:cxnSp>
+        <p:nvCxnSpPr>
+          <p:cNvPr id="137" name="Straight Connector 136">
+            <a:extLst>
+              <a:ext uri="{FF2B5EF4-FFF2-40B4-BE49-F238E27FC236}">
+                <a16:creationId xmlns:a16="http://schemas.microsoft.com/office/drawing/2014/main" id="{67182200-4859-4C8D-BCBB-55B245C28BA3}"/>
+              </a:ext>
+              <a:ext uri="{C183D7F6-B498-43B3-948B-1728B52AA6E4}">
+                <adec:decorative xmlns:adec="http://schemas.microsoft.com/office/drawing/2017/decorative" val="1"/>
+              </a:ext>
+            </a:extLst>
+          </p:cNvPr>
+          <p:cNvCxnSpPr>
+            <a:cxnSpLocks noGrp="1" noRot="1" noChangeAspect="1" noMove="1" noResize="1" noEditPoints="1" noAdjustHandles="1" noChangeArrowheads="1" noChangeShapeType="1"/>
+          </p:cNvCxnSpPr>
+          <p:nvPr>
+            <p:extLst>
+              <p:ext uri="{386F3935-93C4-4BCD-93E2-E3B085C9AB24}">
+                <p16:designElem xmlns:p16="http://schemas.microsoft.com/office/powerpoint/2015/main" val="1"/>
+              </p:ext>
+            </p:extLst>
+          </p:nvPr>
+        </p:nvCxnSpPr>
+        <p:spPr>
+          <a:xfrm>
+            <a:off x="4653372" y="2286000"/>
+            <a:ext cx="0" cy="2286000"/>
+          </a:xfrm>
+          <a:prstGeom prst="line">
+            <a:avLst/>
+          </a:prstGeom>
+          <a:ln w="15875">
+            <a:solidFill>
+              <a:srgbClr val="FFFFFF"/>
+            </a:solidFill>
+          </a:ln>
+        </p:spPr>
+        <p:style>
+          <a:lnRef idx="1">
+            <a:schemeClr val="accent1"/>
+          </a:lnRef>
+          <a:fillRef idx="0">
+            <a:schemeClr val="accent1"/>
+          </a:fillRef>
+          <a:effectRef idx="0">
+            <a:schemeClr val="accent1"/>
+          </a:effectRef>
+          <a:fontRef idx="minor">
+            <a:schemeClr val="tx1"/>
+          </a:fontRef>
+        </p:style>
+      </p:cxnSp>
+      <p:sp>
+        <p:nvSpPr>
+          <p:cNvPr id="3" name="Content Placeholder 2">
+            <a:extLst>
+              <a:ext uri="{FF2B5EF4-FFF2-40B4-BE49-F238E27FC236}">
+                <a16:creationId xmlns:a16="http://schemas.microsoft.com/office/drawing/2014/main" id="{7FEB7118-8D8E-4ECE-8385-6CA1D9695976}"/>
+              </a:ext>
+            </a:extLst>
+          </p:cNvPr>
+          <p:cNvSpPr>
+            <a:spLocks noGrp="1"/>
+          </p:cNvSpPr>
+          <p:nvPr>
+            <p:ph idx="1"/>
+          </p:nvPr>
+        </p:nvSpPr>
+        <p:spPr>
+          <a:xfrm>
+            <a:off x="5155379" y="1065862"/>
+            <a:ext cx="5744685" cy="4726276"/>
+          </a:xfrm>
+        </p:spPr>
+        <p:txBody>
+          <a:bodyPr anchor="ctr">
+            <a:normAutofit/>
+          </a:bodyPr>
+          <a:lstStyle/>
+          <a:p>
+            <a:r>
+              <a:rPr lang="en-US" sz="2000" dirty="0">
+                <a:solidFill>
+                  <a:srgbClr val="FFFFFF"/>
+                </a:solidFill>
+              </a:rPr>
+              <a:t>An overabundance of information, needed to narrow the scope down.</a:t>
+            </a:r>
+          </a:p>
+          <a:p>
+            <a:r>
+              <a:rPr lang="en-US" sz="2000" dirty="0">
+                <a:solidFill>
+                  <a:srgbClr val="FFFFFF"/>
+                </a:solidFill>
+              </a:rPr>
+              <a:t>University names and descriptions were not consistent across platforms</a:t>
+            </a:r>
+          </a:p>
+          <a:p>
+            <a:r>
+              <a:rPr lang="en-US" sz="2000" dirty="0">
+                <a:solidFill>
+                  <a:srgbClr val="FFFFFF"/>
+                </a:solidFill>
+              </a:rPr>
+              <a:t>ROI can include many things.  Narrowed it down to include only the cost of tuition</a:t>
+            </a:r>
+          </a:p>
+          <a:p>
+            <a:r>
+              <a:rPr lang="en-US" sz="2000" dirty="0">
+                <a:solidFill>
+                  <a:srgbClr val="FFFFFF"/>
+                </a:solidFill>
+              </a:rPr>
+              <a:t>Surprisingly, data regarding cost and earnings was consistent across data sources</a:t>
+            </a:r>
+          </a:p>
+          <a:p>
+            <a:endParaRPr lang="en-US" sz="2000" dirty="0">
+              <a:solidFill>
+                <a:srgbClr val="FFFFFF"/>
+              </a:solidFill>
+            </a:endParaRPr>
+          </a:p>
+        </p:txBody>
+      </p:sp>
+      <p:pic>
+        <p:nvPicPr>
+          <p:cNvPr id="7" name="Picture 6" descr="A screenshot of a social media post&#10;&#10;Description automatically generated">
+            <a:extLst>
+              <a:ext uri="{FF2B5EF4-FFF2-40B4-BE49-F238E27FC236}">
+                <a16:creationId xmlns:a16="http://schemas.microsoft.com/office/drawing/2014/main" id="{36852E00-7C6E-4D47-80DE-EADB1C343559}"/>
+              </a:ext>
+            </a:extLst>
+          </p:cNvPr>
+          <p:cNvPicPr>
+            <a:picLocks noChangeAspect="1"/>
+          </p:cNvPicPr>
+          <p:nvPr/>
+        </p:nvPicPr>
+        <p:blipFill>
+          <a:blip r:embed="rId3">
+            <a:extLst>
+              <a:ext uri="{28A0092B-C50C-407E-A947-70E740481C1C}">
+                <a14:useLocalDpi xmlns:a14="http://schemas.microsoft.com/office/drawing/2010/main" val="0"/>
+              </a:ext>
+            </a:extLst>
+          </a:blip>
+          <a:stretch>
+            <a:fillRect/>
+          </a:stretch>
+        </p:blipFill>
+        <p:spPr>
+          <a:xfrm>
+            <a:off x="97563" y="225402"/>
+            <a:ext cx="3143655" cy="3203598"/>
+          </a:xfrm>
+          <a:prstGeom prst="rect">
+            <a:avLst/>
+          </a:prstGeom>
+        </p:spPr>
+      </p:pic>
+      <p:pic>
+        <p:nvPicPr>
+          <p:cNvPr id="9" name="Picture 8" descr="A screenshot of a cell phone&#10;&#10;Description automatically generated">
+            <a:extLst>
+              <a:ext uri="{FF2B5EF4-FFF2-40B4-BE49-F238E27FC236}">
+                <a16:creationId xmlns:a16="http://schemas.microsoft.com/office/drawing/2014/main" id="{DB4F543B-83CF-4CD5-8231-45960FC7FC6C}"/>
+              </a:ext>
+            </a:extLst>
+          </p:cNvPr>
+          <p:cNvPicPr>
+            <a:picLocks noChangeAspect="1"/>
+          </p:cNvPicPr>
+          <p:nvPr/>
+        </p:nvPicPr>
+        <p:blipFill>
+          <a:blip r:embed="rId4">
+            <a:extLst>
+              <a:ext uri="{28A0092B-C50C-407E-A947-70E740481C1C}">
+                <a14:useLocalDpi xmlns:a14="http://schemas.microsoft.com/office/drawing/2010/main" val="0"/>
+              </a:ext>
+            </a:extLst>
+          </a:blip>
+          <a:stretch>
+            <a:fillRect/>
+          </a:stretch>
+        </p:blipFill>
+        <p:spPr>
+          <a:xfrm>
+            <a:off x="1068449" y="3001347"/>
+            <a:ext cx="3365253" cy="3275433"/>
+          </a:xfrm>
+          <a:prstGeom prst="rect">
+            <a:avLst/>
+          </a:prstGeom>
+        </p:spPr>
+      </p:pic>
+    </p:spTree>
+    <p:extLst>
+      <p:ext uri="{BB962C8B-B14F-4D97-AF65-F5344CB8AC3E}">
+        <p14:creationId xmlns:p14="http://schemas.microsoft.com/office/powerpoint/2010/main" val="2704209859"/>
+      </p:ext>
+    </p:extLst>
+  </p:cSld>
+  <p:clrMapOvr>
+    <a:overrideClrMapping bg1="dk1" tx1="lt1" bg2="dk2" tx2="lt2" accent1="accent1" accent2="accent2" accent3="accent3" accent4="accent4" accent5="accent5" accent6="accent6" hlink="hlink" folHlink="folHlink"/>
+  </p:clrMapOvr>
+</p:sld>
+</file>
+
+<file path=ppt/slides/slide8.xml><?xml version="1.0" encoding="utf-8"?>
+<p:sld xmlns:a="http://schemas.openxmlformats.org/drawingml/2006/main" xmlns:r="http://schemas.openxmlformats.org/officeDocument/2006/relationships" xmlns:p="http://schemas.openxmlformats.org/presentationml/2006/main">
+  <p:cSld>
+    <p:bg>
+      <p:bgPr>
+        <a:solidFill>
+          <a:schemeClr val="bg1"/>
+        </a:solidFill>
+        <a:effectLst/>
+      </p:bgPr>
+    </p:bg>
+    <p:spTree>
+      <p:nvGrpSpPr>
+        <p:cNvPr id="1" name=""/>
+        <p:cNvGrpSpPr/>
+        <p:nvPr/>
+      </p:nvGrpSpPr>
+      <p:grpSpPr>
+        <a:xfrm>
+          <a:off x="0" y="0"/>
+          <a:ext cx="0" cy="0"/>
+          <a:chOff x="0" y="0"/>
+          <a:chExt cx="0" cy="0"/>
+        </a:xfrm>
+      </p:grpSpPr>
+      <p:sp useBgFill="1">
+        <p:nvSpPr>
+          <p:cNvPr id="71" name="Rectangle 70">
+            <a:extLst>
+              <a:ext uri="{FF2B5EF4-FFF2-40B4-BE49-F238E27FC236}">
+                <a16:creationId xmlns:a16="http://schemas.microsoft.com/office/drawing/2014/main" id="{0671A8AE-40A1-4631-A6B8-581AFF065482}"/>
+              </a:ext>
+              <a:ext uri="{C183D7F6-B498-43B3-948B-1728B52AA6E4}">
+                <adec:decorative xmlns:adec="http://schemas.microsoft.com/office/drawing/2017/decorative" val="1"/>
+              </a:ext>
+            </a:extLst>
+          </p:cNvPr>
+          <p:cNvSpPr>
+            <a:spLocks noGrp="1" noRot="1" noChangeAspect="1" noMove="1" noResize="1" noEditPoints="1" noAdjustHandles="1" noChangeArrowheads="1" noChangeShapeType="1" noTextEdit="1"/>
+          </p:cNvSpPr>
+          <p:nvPr>
+            <p:extLst>
+              <p:ext uri="{386F3935-93C4-4BCD-93E2-E3B085C9AB24}">
+                <p16:designElem xmlns:p16="http://schemas.microsoft.com/office/powerpoint/2015/main" val="1"/>
+              </p:ext>
+            </p:extLst>
+          </p:nvPr>
+        </p:nvSpPr>
+        <p:spPr>
+          <a:xfrm>
+            <a:off x="0" y="0"/>
+            <a:ext cx="12192000" cy="6858000"/>
+          </a:xfrm>
+          <a:prstGeom prst="rect">
+            <a:avLst/>
+          </a:prstGeom>
+          <a:ln>
+            <a:noFill/>
+          </a:ln>
+        </p:spPr>
+        <p:style>
+          <a:lnRef idx="2">
+            <a:schemeClr val="accent1">
+              <a:shade val="50000"/>
+            </a:schemeClr>
+          </a:lnRef>
+          <a:fillRef idx="1">
+            <a:schemeClr val="accent1"/>
+          </a:fillRef>
+          <a:effectRef idx="0">
+            <a:schemeClr val="accent1"/>
+          </a:effectRef>
+          <a:fontRef idx="minor">
+            <a:schemeClr val="lt1"/>
+          </a:fontRef>
+        </p:style>
+        <p:txBody>
+          <a:bodyPr rtlCol="0" anchor="ctr"/>
+          <a:lstStyle/>
+          <a:p>
+            <a:pPr algn="ctr"/>
+            <a:endParaRPr lang="en-US"/>
+          </a:p>
+        </p:txBody>
+      </p:sp>
+      <p:pic>
+        <p:nvPicPr>
+          <p:cNvPr id="9218" name="Picture 2" descr="Mind the (trust) gap: winning back confidence with data management ...">
+            <a:extLst>
+              <a:ext uri="{FF2B5EF4-FFF2-40B4-BE49-F238E27FC236}">
+                <a16:creationId xmlns:a16="http://schemas.microsoft.com/office/drawing/2014/main" id="{36DF6E59-50AC-46DE-8A0A-689F68DBC8E3}"/>
+              </a:ext>
+            </a:extLst>
+          </p:cNvPr>
+          <p:cNvPicPr>
+            <a:picLocks noChangeAspect="1" noChangeArrowheads="1"/>
+          </p:cNvPicPr>
+          <p:nvPr/>
+        </p:nvPicPr>
+        <p:blipFill rotWithShape="1">
+          <a:blip r:embed="rId2">
+            <a:extLst>
+              <a:ext uri="{28A0092B-C50C-407E-A947-70E740481C1C}">
+                <a14:useLocalDpi xmlns:a14="http://schemas.microsoft.com/office/drawing/2010/main" val="0"/>
+              </a:ext>
+            </a:extLst>
+          </a:blip>
+          <a:srcRect t="3451" r="23585" b="5640"/>
+          <a:stretch/>
+        </p:blipFill>
+        <p:spPr bwMode="auto">
+          <a:xfrm>
+            <a:off x="3523488" y="10"/>
+            <a:ext cx="8668512" cy="6857990"/>
+          </a:xfrm>
+          <a:prstGeom prst="rect">
+            <a:avLst/>
+          </a:prstGeom>
+          <a:noFill/>
+          <a:extLst>
+            <a:ext uri="{909E8E84-426E-40DD-AFC4-6F175D3DCCD1}">
+              <a14:hiddenFill xmlns:a14="http://schemas.microsoft.com/office/drawing/2010/main">
+                <a:solidFill>
+                  <a:srgbClr val="FFFFFF"/>
+                </a:solidFill>
+              </a14:hiddenFill>
+            </a:ext>
+          </a:extLst>
+        </p:spPr>
+      </p:pic>
+      <p:sp>
+        <p:nvSpPr>
+          <p:cNvPr id="73" name="Rectangle 72">
+            <a:extLst>
+              <a:ext uri="{FF2B5EF4-FFF2-40B4-BE49-F238E27FC236}">
+                <a16:creationId xmlns:a16="http://schemas.microsoft.com/office/drawing/2014/main" id="{AB58EF07-17C2-48CF-ABB0-EEF1F17CB8F0}"/>
+              </a:ext>
+              <a:ext uri="{C183D7F6-B498-43B3-948B-1728B52AA6E4}">
+                <adec:decorative xmlns:adec="http://schemas.microsoft.com/office/drawing/2017/decorative" val="1"/>
+              </a:ext>
+            </a:extLst>
+          </p:cNvPr>
+          <p:cNvSpPr>
+            <a:spLocks noGrp="1" noRot="1" noChangeAspect="1" noMove="1" noResize="1" noEditPoints="1" noAdjustHandles="1" noChangeArrowheads="1" noChangeShapeType="1" noTextEdit="1"/>
+          </p:cNvSpPr>
+          <p:nvPr>
+            <p:extLst>
+              <p:ext uri="{386F3935-93C4-4BCD-93E2-E3B085C9AB24}">
+                <p16:designElem xmlns:p16="http://schemas.microsoft.com/office/powerpoint/2015/main" val="1"/>
+              </p:ext>
+            </p:extLst>
+          </p:nvPr>
+        </p:nvSpPr>
+        <p:spPr>
+          <a:xfrm>
+            <a:off x="3" y="0"/>
+            <a:ext cx="9339206" cy="6858000"/>
+          </a:xfrm>
+          <a:prstGeom prst="rect">
+            <a:avLst/>
+          </a:prstGeom>
+          <a:gradFill>
+            <a:gsLst>
+              <a:gs pos="58000">
+                <a:schemeClr val="bg1"/>
+              </a:gs>
+              <a:gs pos="33000">
+                <a:schemeClr val="bg1">
+                  <a:alpha val="64000"/>
+                </a:schemeClr>
+              </a:gs>
+              <a:gs pos="0">
+                <a:schemeClr val="bg1">
+                  <a:alpha val="0"/>
+                </a:schemeClr>
+              </a:gs>
+              <a:gs pos="100000">
+                <a:schemeClr val="bg1"/>
+              </a:gs>
+            </a:gsLst>
+            <a:lin ang="10800000" scaled="0"/>
+          </a:gradFill>
+          <a:ln>
+            <a:noFill/>
+          </a:ln>
+        </p:spPr>
+        <p:style>
+          <a:lnRef idx="2">
+            <a:schemeClr val="accent1">
+              <a:shade val="50000"/>
+            </a:schemeClr>
+          </a:lnRef>
+          <a:fillRef idx="1">
+            <a:schemeClr val="accent1"/>
+          </a:fillRef>
+          <a:effectRef idx="0">
+            <a:schemeClr val="accent1"/>
+          </a:effectRef>
+          <a:fontRef idx="minor">
+            <a:schemeClr val="lt1"/>
+          </a:fontRef>
+        </p:style>
+        <p:txBody>
+          <a:bodyPr rtlCol="0" anchor="ctr"/>
+          <a:lstStyle/>
+          <a:p>
+            <a:pPr algn="ctr"/>
+            <a:endParaRPr lang="en-US" dirty="0"/>
+          </a:p>
+        </p:txBody>
+      </p:sp>
+      <p:sp>
+        <p:nvSpPr>
+          <p:cNvPr id="2" name="Title 1">
+            <a:extLst>
+              <a:ext uri="{FF2B5EF4-FFF2-40B4-BE49-F238E27FC236}">
                 <a16:creationId xmlns:a16="http://schemas.microsoft.com/office/drawing/2014/main" id="{0858D08D-A084-4AE2-89DA-D1FCA795959A}"/>
               </a:ext>
             </a:extLst>
@@ -4540,18 +6551,22 @@
         </p:nvSpPr>
         <p:spPr>
           <a:xfrm>
-            <a:off x="1524000" y="1122363"/>
-            <a:ext cx="9144000" cy="1151605"/>
-          </a:xfrm>
-        </p:spPr>
-        <p:txBody>
-          <a:bodyPr/>
-          <a:lstStyle/>
-          <a:p>
-            <a:r>
-              <a:rPr lang="en-US" dirty="0"/>
-              <a:t>Conclusion</a:t>
-            </a:r>
+            <a:off x="7583356" y="3140183"/>
+            <a:ext cx="4023360" cy="1208141"/>
+          </a:xfrm>
+        </p:spPr>
+        <p:txBody>
+          <a:bodyPr anchor="b">
+            <a:normAutofit/>
+          </a:bodyPr>
+          <a:lstStyle/>
+          <a:p>
+            <a:pPr algn="l"/>
+            <a:r>
+              <a:rPr lang="en-US" sz="4400" dirty="0"/>
+              <a:t>Findings</a:t>
+            </a:r>
+            <a:endParaRPr lang="en-US" sz="4800" dirty="0"/>
           </a:p>
         </p:txBody>
       </p:sp>
@@ -4571,12 +6586,181 @@
             <p:ph type="subTitle" idx="1"/>
           </p:nvPr>
         </p:nvSpPr>
-        <p:spPr/>
-        <p:txBody>
-          <a:bodyPr/>
-          <a:lstStyle/>
-          <a:p>
-            <a:endParaRPr lang="en-US" dirty="0"/>
+        <p:spPr>
+          <a:xfrm>
+            <a:off x="481029" y="1065319"/>
+            <a:ext cx="4023359" cy="3283005"/>
+          </a:xfrm>
+        </p:spPr>
+        <p:txBody>
+          <a:bodyPr>
+            <a:normAutofit/>
+          </a:bodyPr>
+          <a:lstStyle/>
+          <a:p>
+            <a:pPr algn="l"/>
+            <a:endParaRPr lang="en-US" sz="2000" dirty="0"/>
+          </a:p>
+        </p:txBody>
+      </p:sp>
+      <p:sp>
+        <p:nvSpPr>
+          <p:cNvPr id="75" name="Rectangle 74">
+            <a:extLst>
+              <a:ext uri="{FF2B5EF4-FFF2-40B4-BE49-F238E27FC236}">
+                <a16:creationId xmlns:a16="http://schemas.microsoft.com/office/drawing/2014/main" id="{AF2F604E-43BE-4DC3-B983-E071523364F8}"/>
+              </a:ext>
+              <a:ext uri="{C183D7F6-B498-43B3-948B-1728B52AA6E4}">
+                <adec:decorative xmlns:adec="http://schemas.microsoft.com/office/drawing/2017/decorative" val="1"/>
+              </a:ext>
+            </a:extLst>
+          </p:cNvPr>
+          <p:cNvSpPr>
+            <a:spLocks noGrp="1" noRot="1" noChangeAspect="1" noMove="1" noResize="1" noEditPoints="1" noAdjustHandles="1" noChangeArrowheads="1" noChangeShapeType="1" noTextEdit="1"/>
+          </p:cNvSpPr>
+          <p:nvPr>
+            <p:extLst>
+              <p:ext uri="{386F3935-93C4-4BCD-93E2-E3B085C9AB24}">
+                <p16:designElem xmlns:p16="http://schemas.microsoft.com/office/powerpoint/2015/main" val="1"/>
+              </p:ext>
+            </p:extLst>
+          </p:nvPr>
+        </p:nvSpPr>
+        <p:spPr>
+          <a:xfrm rot="5400000">
+            <a:off x="759921" y="346791"/>
+            <a:ext cx="146304" cy="704088"/>
+          </a:xfrm>
+          <a:prstGeom prst="rect">
+            <a:avLst/>
+          </a:prstGeom>
+          <a:solidFill>
+            <a:schemeClr val="accent2"/>
+          </a:solidFill>
+          <a:ln>
+            <a:noFill/>
+          </a:ln>
+        </p:spPr>
+        <p:style>
+          <a:lnRef idx="2">
+            <a:schemeClr val="accent1">
+              <a:shade val="50000"/>
+            </a:schemeClr>
+          </a:lnRef>
+          <a:fillRef idx="1">
+            <a:schemeClr val="accent1"/>
+          </a:fillRef>
+          <a:effectRef idx="0">
+            <a:schemeClr val="accent1"/>
+          </a:effectRef>
+          <a:fontRef idx="minor">
+            <a:schemeClr val="lt1"/>
+          </a:fontRef>
+        </p:style>
+        <p:txBody>
+          <a:bodyPr rtlCol="0" anchor="ctr"/>
+          <a:lstStyle/>
+          <a:p>
+            <a:pPr algn="ctr"/>
+            <a:endParaRPr lang="en-US">
+              <a:solidFill>
+                <a:prstClr val="white"/>
+              </a:solidFill>
+              <a:latin typeface="Calibri" panose="020F0502020204030204"/>
+            </a:endParaRPr>
+          </a:p>
+        </p:txBody>
+      </p:sp>
+      <p:sp>
+        <p:nvSpPr>
+          <p:cNvPr id="77" name="Rectangle 76">
+            <a:extLst>
+              <a:ext uri="{FF2B5EF4-FFF2-40B4-BE49-F238E27FC236}">
+                <a16:creationId xmlns:a16="http://schemas.microsoft.com/office/drawing/2014/main" id="{08C9B587-E65E-4B52-B37C-ABEBB6E87928}"/>
+              </a:ext>
+              <a:ext uri="{C183D7F6-B498-43B3-948B-1728B52AA6E4}">
+                <adec:decorative xmlns:adec="http://schemas.microsoft.com/office/drawing/2017/decorative" val="1"/>
+              </a:ext>
+            </a:extLst>
+          </p:cNvPr>
+          <p:cNvSpPr>
+            <a:spLocks noGrp="1" noRot="1" noChangeAspect="1" noMove="1" noResize="1" noEditPoints="1" noAdjustHandles="1" noChangeArrowheads="1" noChangeShapeType="1" noTextEdit="1"/>
+          </p:cNvSpPr>
+          <p:nvPr>
+            <p:extLst>
+              <p:ext uri="{386F3935-93C4-4BCD-93E2-E3B085C9AB24}">
+                <p16:designElem xmlns:p16="http://schemas.microsoft.com/office/powerpoint/2015/main" val="1"/>
+              </p:ext>
+            </p:extLst>
+          </p:nvPr>
+        </p:nvSpPr>
+        <p:spPr>
+          <a:xfrm>
+            <a:off x="481029" y="4546920"/>
+            <a:ext cx="3977640" cy="18288"/>
+          </a:xfrm>
+          <a:prstGeom prst="rect">
+            <a:avLst/>
+          </a:prstGeom>
+          <a:solidFill>
+            <a:schemeClr val="tx1"/>
+          </a:solidFill>
+          <a:ln w="3175">
+            <a:noFill/>
+          </a:ln>
+          <a:effectLst/>
+        </p:spPr>
+        <p:style>
+          <a:lnRef idx="2">
+            <a:schemeClr val="accent1">
+              <a:shade val="50000"/>
+            </a:schemeClr>
+          </a:lnRef>
+          <a:fillRef idx="1">
+            <a:schemeClr val="accent1"/>
+          </a:fillRef>
+          <a:effectRef idx="0">
+            <a:schemeClr val="accent1"/>
+          </a:effectRef>
+          <a:fontRef idx="minor">
+            <a:schemeClr val="lt1"/>
+          </a:fontRef>
+        </p:style>
+        <p:txBody>
+          <a:bodyPr rtlCol="0" anchor="ctr"/>
+          <a:lstStyle/>
+          <a:p>
+            <a:pPr marL="0" marR="0" lvl="0" indent="0" algn="ctr" defTabSz="914400" rtl="0" eaLnBrk="1" fontAlgn="auto" latinLnBrk="0" hangingPunct="1">
+              <a:lnSpc>
+                <a:spcPct val="100000"/>
+              </a:lnSpc>
+              <a:spcBef>
+                <a:spcPts val="0"/>
+              </a:spcBef>
+              <a:spcAft>
+                <a:spcPts val="0"/>
+              </a:spcAft>
+              <a:buClrTx/>
+              <a:buSzTx/>
+              <a:buFontTx/>
+              <a:buNone/>
+              <a:tabLst/>
+              <a:defRPr/>
+            </a:pPr>
+            <a:endParaRPr kumimoji="0" lang="en-US" sz="1800" b="0" i="0" u="none" strike="noStrike" kern="1200" cap="none" spc="0" normalizeH="0" baseline="0" noProof="0">
+              <a:ln>
+                <a:noFill/>
+              </a:ln>
+              <a:solidFill>
+                <a:prstClr val="white"/>
+              </a:solidFill>
+              <a:effectLst/>
+              <a:uLnTx/>
+              <a:uFillTx/>
+              <a:latin typeface="Calibri" panose="020F0502020204030204"/>
+              <a:ea typeface="+mn-ea"/>
+              <a:cs typeface="+mn-cs"/>
+            </a:endParaRPr>
           </a:p>
         </p:txBody>
       </p:sp>
@@ -4588,7 +6772,427 @@
     </p:extLst>
   </p:cSld>
   <p:clrMapOvr>
-    <a:masterClrMapping/>
+    <a:overrideClrMapping bg1="dk1" tx1="lt1" bg2="dk2" tx2="lt2" accent1="accent1" accent2="accent2" accent3="accent3" accent4="accent4" accent5="accent5" accent6="accent6" hlink="hlink" folHlink="folHlink"/>
+  </p:clrMapOvr>
+</p:sld>
+</file>
+
+<file path=ppt/slides/slide9.xml><?xml version="1.0" encoding="utf-8"?>
+<p:sld xmlns:a="http://schemas.openxmlformats.org/drawingml/2006/main" xmlns:r="http://schemas.openxmlformats.org/officeDocument/2006/relationships" xmlns:p="http://schemas.openxmlformats.org/presentationml/2006/main">
+  <p:cSld>
+    <p:bg>
+      <p:bgPr>
+        <a:solidFill>
+          <a:schemeClr val="bg1"/>
+        </a:solidFill>
+        <a:effectLst/>
+      </p:bgPr>
+    </p:bg>
+    <p:spTree>
+      <p:nvGrpSpPr>
+        <p:cNvPr id="1" name=""/>
+        <p:cNvGrpSpPr/>
+        <p:nvPr/>
+      </p:nvGrpSpPr>
+      <p:grpSpPr>
+        <a:xfrm>
+          <a:off x="0" y="0"/>
+          <a:ext cx="0" cy="0"/>
+          <a:chOff x="0" y="0"/>
+          <a:chExt cx="0" cy="0"/>
+        </a:xfrm>
+      </p:grpSpPr>
+      <p:sp useBgFill="1">
+        <p:nvSpPr>
+          <p:cNvPr id="78" name="Rectangle 77">
+            <a:extLst>
+              <a:ext uri="{FF2B5EF4-FFF2-40B4-BE49-F238E27FC236}">
+                <a16:creationId xmlns:a16="http://schemas.microsoft.com/office/drawing/2014/main" id="{526E0BFB-CDF1-4990-8C11-AC849311E0A8}"/>
+              </a:ext>
+              <a:ext uri="{C183D7F6-B498-43B3-948B-1728B52AA6E4}">
+                <adec:decorative xmlns:adec="http://schemas.microsoft.com/office/drawing/2017/decorative" val="1"/>
+              </a:ext>
+            </a:extLst>
+          </p:cNvPr>
+          <p:cNvSpPr>
+            <a:spLocks noGrp="1" noRot="1" noChangeAspect="1" noMove="1" noResize="1" noEditPoints="1" noAdjustHandles="1" noChangeArrowheads="1" noChangeShapeType="1" noTextEdit="1"/>
+          </p:cNvSpPr>
+          <p:nvPr>
+            <p:extLst>
+              <p:ext uri="{386F3935-93C4-4BCD-93E2-E3B085C9AB24}">
+                <p16:designElem xmlns:p16="http://schemas.microsoft.com/office/powerpoint/2015/main" val="1"/>
+              </p:ext>
+            </p:extLst>
+          </p:nvPr>
+        </p:nvSpPr>
+        <p:spPr>
+          <a:xfrm>
+            <a:off x="0" y="0"/>
+            <a:ext cx="12192000" cy="6858000"/>
+          </a:xfrm>
+          <a:prstGeom prst="rect">
+            <a:avLst/>
+          </a:prstGeom>
+          <a:ln>
+            <a:noFill/>
+          </a:ln>
+        </p:spPr>
+        <p:style>
+          <a:lnRef idx="2">
+            <a:schemeClr val="accent1">
+              <a:shade val="50000"/>
+            </a:schemeClr>
+          </a:lnRef>
+          <a:fillRef idx="1">
+            <a:schemeClr val="accent1"/>
+          </a:fillRef>
+          <a:effectRef idx="0">
+            <a:schemeClr val="accent1"/>
+          </a:effectRef>
+          <a:fontRef idx="minor">
+            <a:schemeClr val="lt1"/>
+          </a:fontRef>
+        </p:style>
+        <p:txBody>
+          <a:bodyPr rtlCol="0" anchor="ctr"/>
+          <a:lstStyle/>
+          <a:p>
+            <a:pPr algn="ctr"/>
+            <a:endParaRPr lang="en-US"/>
+          </a:p>
+        </p:txBody>
+      </p:sp>
+      <p:pic>
+        <p:nvPicPr>
+          <p:cNvPr id="1028" name="Picture 4" descr="Mind the (trust) gap: winning back confidence with data management ...">
+            <a:extLst>
+              <a:ext uri="{FF2B5EF4-FFF2-40B4-BE49-F238E27FC236}">
+                <a16:creationId xmlns:a16="http://schemas.microsoft.com/office/drawing/2014/main" id="{E1DF26D8-0627-419F-ACC2-FF823309784B}"/>
+              </a:ext>
+            </a:extLst>
+          </p:cNvPr>
+          <p:cNvPicPr>
+            <a:picLocks noChangeAspect="1" noChangeArrowheads="1"/>
+          </p:cNvPicPr>
+          <p:nvPr/>
+        </p:nvPicPr>
+        <p:blipFill rotWithShape="1">
+          <a:blip r:embed="rId2">
+            <a:extLst>
+              <a:ext uri="{28A0092B-C50C-407E-A947-70E740481C1C}">
+                <a14:useLocalDpi xmlns:a14="http://schemas.microsoft.com/office/drawing/2010/main" val="0"/>
+              </a:ext>
+            </a:extLst>
+          </a:blip>
+          <a:srcRect l="13949" r="3402" b="1675"/>
+          <a:stretch/>
+        </p:blipFill>
+        <p:spPr bwMode="auto">
+          <a:xfrm>
+            <a:off x="-2" y="10"/>
+            <a:ext cx="8668512" cy="6857990"/>
+          </a:xfrm>
+          <a:prstGeom prst="rect">
+            <a:avLst/>
+          </a:prstGeom>
+          <a:noFill/>
+          <a:extLst>
+            <a:ext uri="{909E8E84-426E-40DD-AFC4-6F175D3DCCD1}">
+              <a14:hiddenFill xmlns:a14="http://schemas.microsoft.com/office/drawing/2010/main">
+                <a:solidFill>
+                  <a:srgbClr val="FFFFFF"/>
+                </a:solidFill>
+              </a14:hiddenFill>
+            </a:ext>
+          </a:extLst>
+        </p:spPr>
+      </p:pic>
+      <p:sp>
+        <p:nvSpPr>
+          <p:cNvPr id="80" name="Rectangle 79">
+            <a:extLst>
+              <a:ext uri="{FF2B5EF4-FFF2-40B4-BE49-F238E27FC236}">
+                <a16:creationId xmlns:a16="http://schemas.microsoft.com/office/drawing/2014/main" id="{6069A1F8-9BEB-4786-9694-FC48B2D75D21}"/>
+              </a:ext>
+              <a:ext uri="{C183D7F6-B498-43B3-948B-1728B52AA6E4}">
+                <adec:decorative xmlns:adec="http://schemas.microsoft.com/office/drawing/2017/decorative" val="1"/>
+              </a:ext>
+            </a:extLst>
+          </p:cNvPr>
+          <p:cNvSpPr>
+            <a:spLocks noGrp="1" noRot="1" noChangeAspect="1" noMove="1" noResize="1" noEditPoints="1" noAdjustHandles="1" noChangeArrowheads="1" noChangeShapeType="1" noTextEdit="1"/>
+          </p:cNvSpPr>
+          <p:nvPr>
+            <p:extLst>
+              <p:ext uri="{386F3935-93C4-4BCD-93E2-E3B085C9AB24}">
+                <p16:designElem xmlns:p16="http://schemas.microsoft.com/office/powerpoint/2015/main" val="1"/>
+              </p:ext>
+            </p:extLst>
+          </p:nvPr>
+        </p:nvSpPr>
+        <p:spPr>
+          <a:xfrm flipH="1">
+            <a:off x="2788244" y="0"/>
+            <a:ext cx="9403756" cy="6858000"/>
+          </a:xfrm>
+          <a:prstGeom prst="rect">
+            <a:avLst/>
+          </a:prstGeom>
+          <a:gradFill>
+            <a:gsLst>
+              <a:gs pos="58000">
+                <a:schemeClr val="bg1"/>
+              </a:gs>
+              <a:gs pos="30000">
+                <a:schemeClr val="bg1">
+                  <a:alpha val="64000"/>
+                </a:schemeClr>
+              </a:gs>
+              <a:gs pos="0">
+                <a:schemeClr val="bg1">
+                  <a:alpha val="0"/>
+                </a:schemeClr>
+              </a:gs>
+              <a:gs pos="100000">
+                <a:schemeClr val="bg1"/>
+              </a:gs>
+            </a:gsLst>
+            <a:lin ang="10800000" scaled="0"/>
+          </a:gradFill>
+          <a:ln>
+            <a:noFill/>
+          </a:ln>
+        </p:spPr>
+        <p:style>
+          <a:lnRef idx="2">
+            <a:schemeClr val="accent1">
+              <a:shade val="50000"/>
+            </a:schemeClr>
+          </a:lnRef>
+          <a:fillRef idx="1">
+            <a:schemeClr val="accent1"/>
+          </a:fillRef>
+          <a:effectRef idx="0">
+            <a:schemeClr val="accent1"/>
+          </a:effectRef>
+          <a:fontRef idx="minor">
+            <a:schemeClr val="lt1"/>
+          </a:fontRef>
+        </p:style>
+        <p:txBody>
+          <a:bodyPr rtlCol="0" anchor="ctr"/>
+          <a:lstStyle/>
+          <a:p>
+            <a:pPr algn="ctr"/>
+            <a:endParaRPr lang="en-US" dirty="0"/>
+          </a:p>
+        </p:txBody>
+      </p:sp>
+      <p:sp>
+        <p:nvSpPr>
+          <p:cNvPr id="2" name="Title 1">
+            <a:extLst>
+              <a:ext uri="{FF2B5EF4-FFF2-40B4-BE49-F238E27FC236}">
+                <a16:creationId xmlns:a16="http://schemas.microsoft.com/office/drawing/2014/main" id="{AFAA695B-32ED-4960-98DA-19B23B8391CC}"/>
+              </a:ext>
+            </a:extLst>
+          </p:cNvPr>
+          <p:cNvSpPr>
+            <a:spLocks noGrp="1"/>
+          </p:cNvSpPr>
+          <p:nvPr>
+            <p:ph type="title"/>
+          </p:nvPr>
+        </p:nvSpPr>
+        <p:spPr>
+          <a:xfrm>
+            <a:off x="7848600" y="1122363"/>
+            <a:ext cx="4023360" cy="3204134"/>
+          </a:xfrm>
+        </p:spPr>
+        <p:txBody>
+          <a:bodyPr vert="horz" lIns="91440" tIns="45720" rIns="91440" bIns="45720" rtlCol="0" anchor="b">
+            <a:normAutofit/>
+          </a:bodyPr>
+          <a:lstStyle/>
+          <a:p>
+            <a:r>
+              <a:rPr lang="en-US" sz="6000" b="1" dirty="0"/>
+              <a:t>Q&amp;A</a:t>
+            </a:r>
+          </a:p>
+        </p:txBody>
+      </p:sp>
+      <p:sp>
+        <p:nvSpPr>
+          <p:cNvPr id="82" name="Rectangle 81">
+            <a:extLst>
+              <a:ext uri="{FF2B5EF4-FFF2-40B4-BE49-F238E27FC236}">
+                <a16:creationId xmlns:a16="http://schemas.microsoft.com/office/drawing/2014/main" id="{AF2F604E-43BE-4DC3-B983-E071523364F8}"/>
+              </a:ext>
+              <a:ext uri="{C183D7F6-B498-43B3-948B-1728B52AA6E4}">
+                <adec:decorative xmlns:adec="http://schemas.microsoft.com/office/drawing/2017/decorative" val="1"/>
+              </a:ext>
+            </a:extLst>
+          </p:cNvPr>
+          <p:cNvSpPr>
+            <a:spLocks noGrp="1" noRot="1" noChangeAspect="1" noMove="1" noResize="1" noEditPoints="1" noAdjustHandles="1" noChangeArrowheads="1" noChangeShapeType="1" noTextEdit="1"/>
+          </p:cNvSpPr>
+          <p:nvPr>
+            <p:extLst>
+              <p:ext uri="{386F3935-93C4-4BCD-93E2-E3B085C9AB24}">
+                <p16:designElem xmlns:p16="http://schemas.microsoft.com/office/powerpoint/2015/main" val="1"/>
+              </p:ext>
+            </p:extLst>
+          </p:nvPr>
+        </p:nvSpPr>
+        <p:spPr>
+          <a:xfrm rot="5400000">
+            <a:off x="8130540" y="346791"/>
+            <a:ext cx="146304" cy="704088"/>
+          </a:xfrm>
+          <a:prstGeom prst="rect">
+            <a:avLst/>
+          </a:prstGeom>
+          <a:solidFill>
+            <a:schemeClr val="accent2"/>
+          </a:solidFill>
+          <a:ln>
+            <a:noFill/>
+          </a:ln>
+        </p:spPr>
+        <p:style>
+          <a:lnRef idx="2">
+            <a:schemeClr val="accent1">
+              <a:shade val="50000"/>
+            </a:schemeClr>
+          </a:lnRef>
+          <a:fillRef idx="1">
+            <a:schemeClr val="accent1"/>
+          </a:fillRef>
+          <a:effectRef idx="0">
+            <a:schemeClr val="accent1"/>
+          </a:effectRef>
+          <a:fontRef idx="minor">
+            <a:schemeClr val="lt1"/>
+          </a:fontRef>
+        </p:style>
+        <p:txBody>
+          <a:bodyPr rtlCol="0" anchor="ctr"/>
+          <a:lstStyle/>
+          <a:p>
+            <a:pPr algn="ctr"/>
+            <a:endParaRPr lang="en-US">
+              <a:solidFill>
+                <a:prstClr val="white"/>
+              </a:solidFill>
+              <a:latin typeface="Calibri" panose="020F0502020204030204"/>
+            </a:endParaRPr>
+          </a:p>
+        </p:txBody>
+      </p:sp>
+      <p:sp>
+        <p:nvSpPr>
+          <p:cNvPr id="84" name="Rectangle 83">
+            <a:extLst>
+              <a:ext uri="{FF2B5EF4-FFF2-40B4-BE49-F238E27FC236}">
+                <a16:creationId xmlns:a16="http://schemas.microsoft.com/office/drawing/2014/main" id="{08C9B587-E65E-4B52-B37C-ABEBB6E87928}"/>
+              </a:ext>
+              <a:ext uri="{C183D7F6-B498-43B3-948B-1728B52AA6E4}">
+                <adec:decorative xmlns:adec="http://schemas.microsoft.com/office/drawing/2017/decorative" val="1"/>
+              </a:ext>
+            </a:extLst>
+          </p:cNvPr>
+          <p:cNvSpPr>
+            <a:spLocks noGrp="1" noRot="1" noChangeAspect="1" noMove="1" noResize="1" noEditPoints="1" noAdjustHandles="1" noChangeArrowheads="1" noChangeShapeType="1" noTextEdit="1"/>
+          </p:cNvSpPr>
+          <p:nvPr>
+            <p:extLst>
+              <p:ext uri="{386F3935-93C4-4BCD-93E2-E3B085C9AB24}">
+                <p16:designElem xmlns:p16="http://schemas.microsoft.com/office/powerpoint/2015/main" val="1"/>
+              </p:ext>
+            </p:extLst>
+          </p:nvPr>
+        </p:nvSpPr>
+        <p:spPr>
+          <a:xfrm>
+            <a:off x="7851648" y="4546920"/>
+            <a:ext cx="4023360" cy="18288"/>
+          </a:xfrm>
+          <a:prstGeom prst="rect">
+            <a:avLst/>
+          </a:prstGeom>
+          <a:solidFill>
+            <a:schemeClr val="tx1"/>
+          </a:solidFill>
+          <a:ln w="3175">
+            <a:noFill/>
+          </a:ln>
+          <a:effectLst/>
+        </p:spPr>
+        <p:style>
+          <a:lnRef idx="2">
+            <a:schemeClr val="accent1">
+              <a:shade val="50000"/>
+            </a:schemeClr>
+          </a:lnRef>
+          <a:fillRef idx="1">
+            <a:schemeClr val="accent1"/>
+          </a:fillRef>
+          <a:effectRef idx="0">
+            <a:schemeClr val="accent1"/>
+          </a:effectRef>
+          <a:fontRef idx="minor">
+            <a:schemeClr val="lt1"/>
+          </a:fontRef>
+        </p:style>
+        <p:txBody>
+          <a:bodyPr rtlCol="0" anchor="ctr"/>
+          <a:lstStyle/>
+          <a:p>
+            <a:pPr marL="0" marR="0" lvl="0" indent="0" algn="ctr" defTabSz="914400" rtl="0" eaLnBrk="1" fontAlgn="auto" latinLnBrk="0" hangingPunct="1">
+              <a:lnSpc>
+                <a:spcPct val="100000"/>
+              </a:lnSpc>
+              <a:spcBef>
+                <a:spcPts val="0"/>
+              </a:spcBef>
+              <a:spcAft>
+                <a:spcPts val="0"/>
+              </a:spcAft>
+              <a:buClrTx/>
+              <a:buSzTx/>
+              <a:buFontTx/>
+              <a:buNone/>
+              <a:tabLst/>
+              <a:defRPr/>
+            </a:pPr>
+            <a:endParaRPr kumimoji="0" lang="en-US" sz="1800" b="0" i="0" u="none" strike="noStrike" kern="1200" cap="none" spc="0" normalizeH="0" baseline="0" noProof="0">
+              <a:ln>
+                <a:noFill/>
+              </a:ln>
+              <a:solidFill>
+                <a:prstClr val="white"/>
+              </a:solidFill>
+              <a:effectLst/>
+              <a:uLnTx/>
+              <a:uFillTx/>
+              <a:latin typeface="Calibri" panose="020F0502020204030204"/>
+              <a:ea typeface="+mn-ea"/>
+              <a:cs typeface="+mn-cs"/>
+            </a:endParaRPr>
+          </a:p>
+        </p:txBody>
+      </p:sp>
+    </p:spTree>
+    <p:extLst>
+      <p:ext uri="{BB962C8B-B14F-4D97-AF65-F5344CB8AC3E}">
+        <p14:creationId xmlns:p14="http://schemas.microsoft.com/office/powerpoint/2010/main" val="3219638386"/>
+      </p:ext>
+    </p:extLst>
+  </p:cSld>
+  <p:clrMapOvr>
+    <a:overrideClrMapping bg1="dk1" tx1="lt1" bg2="dk2" tx2="lt2" accent1="accent1" accent2="accent2" accent3="accent3" accent4="accent4" accent5="accent5" accent6="accent6" hlink="hlink" folHlink="folHlink"/>
   </p:clrMapOvr>
 </p:sld>
 </file>
@@ -4634,18 +7238,18 @@
         <a:srgbClr val="954F72"/>
       </a:folHlink>
     </a:clrScheme>
-    <a:fontScheme name="Office">
+    <a:fontScheme name="Constantia-Franklin Gothic Book">
       <a:majorFont>
-        <a:latin typeface="Calibri Light" panose="020F0302020204030204"/>
+        <a:latin typeface="Constantia" panose="02030602050306030303"/>
         <a:ea typeface=""/>
         <a:cs typeface=""/>
-        <a:font script="Jpan" typeface="游ゴシック Light"/>
-        <a:font script="Hang" typeface="맑은 고딕"/>
-        <a:font script="Hans" typeface="等线 Light"/>
-        <a:font script="Hant" typeface="新細明體"/>
+        <a:font script="Jpan" typeface="HG明朝E"/>
+        <a:font script="Hang" typeface="궁서"/>
+        <a:font script="Hans" typeface="华文新魏"/>
+        <a:font script="Hant" typeface="標楷體"/>
         <a:font script="Arab" typeface="Times New Roman"/>
         <a:font script="Hebr" typeface="Times New Roman"/>
-        <a:font script="Thai" typeface="Angsana New"/>
+        <a:font script="Thai" typeface="Browallia New"/>
         <a:font script="Ethi" typeface="Nyala"/>
         <a:font script="Beng" typeface="Vrinda"/>
         <a:font script="Gujr" typeface="Shruti"/>
@@ -4669,35 +7273,18 @@
         <a:font script="Viet" typeface="Times New Roman"/>
         <a:font script="Uigh" typeface="Microsoft Uighur"/>
         <a:font script="Geor" typeface="Sylfaen"/>
-        <a:font script="Armn" typeface="Arial"/>
-        <a:font script="Bugi" typeface="Leelawadee UI"/>
-        <a:font script="Bopo" typeface="Microsoft JhengHei"/>
-        <a:font script="Java" typeface="Javanese Text"/>
-        <a:font script="Lisu" typeface="Segoe UI"/>
-        <a:font script="Mymr" typeface="Myanmar Text"/>
-        <a:font script="Nkoo" typeface="Ebrima"/>
-        <a:font script="Olck" typeface="Nirmala UI"/>
-        <a:font script="Osma" typeface="Ebrima"/>
-        <a:font script="Phag" typeface="Phagspa"/>
-        <a:font script="Syrn" typeface="Estrangelo Edessa"/>
-        <a:font script="Syrj" typeface="Estrangelo Edessa"/>
-        <a:font script="Syre" typeface="Estrangelo Edessa"/>
-        <a:font script="Sora" typeface="Nirmala UI"/>
-        <a:font script="Tale" typeface="Microsoft Tai Le"/>
-        <a:font script="Talu" typeface="Microsoft New Tai Lue"/>
-        <a:font script="Tfng" typeface="Ebrima"/>
       </a:majorFont>
       <a:minorFont>
-        <a:latin typeface="Calibri" panose="020F0502020204030204"/>
+        <a:latin typeface="Franklin Gothic Book" panose="020B0503020102020204"/>
         <a:ea typeface=""/>
         <a:cs typeface=""/>
-        <a:font script="Jpan" typeface="游ゴシック"/>
-        <a:font script="Hang" typeface="맑은 고딕"/>
-        <a:font script="Hans" typeface="等线"/>
-        <a:font script="Hant" typeface="新細明體"/>
-        <a:font script="Arab" typeface="Arial"/>
-        <a:font script="Hebr" typeface="Arial"/>
-        <a:font script="Thai" typeface="Cordia New"/>
+        <a:font script="Jpan" typeface="HGｺﾞｼｯｸE"/>
+        <a:font script="Hang" typeface="돋움"/>
+        <a:font script="Hans" typeface="华文楷体"/>
+        <a:font script="Hant" typeface="微軟正黑體"/>
+        <a:font script="Arab" typeface="Tahoma"/>
+        <a:font script="Hebr" typeface="Aharoni"/>
+        <a:font script="Thai" typeface="LilyUPC"/>
         <a:font script="Ethi" typeface="Nyala"/>
         <a:font script="Beng" typeface="Vrinda"/>
         <a:font script="Gujr" typeface="Shruti"/>
@@ -4718,26 +7305,9 @@
         <a:font script="Laoo" typeface="DokChampa"/>
         <a:font script="Sinh" typeface="Iskoola Pota"/>
         <a:font script="Mong" typeface="Mongolian Baiti"/>
-        <a:font script="Viet" typeface="Arial"/>
+        <a:font script="Viet" typeface="Tahoma"/>
         <a:font script="Uigh" typeface="Microsoft Uighur"/>
         <a:font script="Geor" typeface="Sylfaen"/>
-        <a:font script="Armn" typeface="Arial"/>
-        <a:font script="Bugi" typeface="Leelawadee UI"/>
-        <a:font script="Bopo" typeface="Microsoft JhengHei"/>
-        <a:font script="Java" typeface="Javanese Text"/>
-        <a:font script="Lisu" typeface="Segoe UI"/>
-        <a:font script="Mymr" typeface="Myanmar Text"/>
-        <a:font script="Nkoo" typeface="Ebrima"/>
-        <a:font script="Olck" typeface="Nirmala UI"/>
-        <a:font script="Osma" typeface="Ebrima"/>
-        <a:font script="Phag" typeface="Phagspa"/>
-        <a:font script="Syrn" typeface="Estrangelo Edessa"/>
-        <a:font script="Syrj" typeface="Estrangelo Edessa"/>
-        <a:font script="Syre" typeface="Estrangelo Edessa"/>
-        <a:font script="Sora" typeface="Nirmala UI"/>
-        <a:font script="Tale" typeface="Microsoft Tai Le"/>
-        <a:font script="Talu" typeface="Microsoft New Tai Lue"/>
-        <a:font script="Tfng" typeface="Ebrima"/>
       </a:minorFont>
     </a:fontScheme>
     <a:fmtScheme name="Office">

</xml_diff>